<commit_message>
Add context figure and explanation for RAG's handling of hallucination
</commit_message>
<xml_diff>
--- a/presentation.pptx
+++ b/presentation.pptx
@@ -5,7 +5,7 @@
     <p:sldMasterId id="2147483648" r:id="rId1"/>
   </p:sldMasterIdLst>
   <p:notesMasterIdLst>
-    <p:notesMasterId r:id="rId12"/>
+    <p:notesMasterId r:id="rId15"/>
   </p:notesMasterIdLst>
   <p:sldIdLst>
     <p:sldId id="256" r:id="rId2"/>
@@ -13,11 +13,14 @@
     <p:sldId id="258" r:id="rId4"/>
     <p:sldId id="266" r:id="rId5"/>
     <p:sldId id="259" r:id="rId6"/>
-    <p:sldId id="264" r:id="rId7"/>
-    <p:sldId id="262" r:id="rId8"/>
-    <p:sldId id="263" r:id="rId9"/>
-    <p:sldId id="265" r:id="rId10"/>
-    <p:sldId id="267" r:id="rId11"/>
+    <p:sldId id="268" r:id="rId7"/>
+    <p:sldId id="269" r:id="rId8"/>
+    <p:sldId id="264" r:id="rId9"/>
+    <p:sldId id="262" r:id="rId10"/>
+    <p:sldId id="263" r:id="rId11"/>
+    <p:sldId id="265" r:id="rId12"/>
+    <p:sldId id="267" r:id="rId13"/>
+    <p:sldId id="270" r:id="rId14"/>
   </p:sldIdLst>
   <p:sldSz cx="12192000" cy="6858000"/>
   <p:notesSz cx="6858000" cy="9144000"/>
@@ -12719,7 +12722,7 @@
           <a:p>
             <a:fld id="{8BE58E95-EC7B-40AC-BB93-DEEA60F90372}" type="datetimeFigureOut">
               <a:rPr lang="en-US" smtClean="0"/>
-              <a:t>1/6/2025</a:t>
+              <a:t>1/7/2025</a:t>
             </a:fld>
             <a:endParaRPr lang="en-US"/>
           </a:p>
@@ -13136,7 +13139,7 @@
           <a:p>
             <a:fld id="{DB9CD3E3-4554-45C0-BDBE-EFE41514EE60}" type="datetime1">
               <a:rPr lang="pt-PT" smtClean="0"/>
-              <a:t>06/01/2025</a:t>
+              <a:t>07/01/2025</a:t>
             </a:fld>
             <a:endParaRPr lang="en-US"/>
           </a:p>
@@ -13336,7 +13339,7 @@
           <a:p>
             <a:fld id="{FC2B05B8-5F77-4821-AC28-FB433D40C7EA}" type="datetime1">
               <a:rPr lang="pt-PT" smtClean="0"/>
-              <a:t>06/01/2025</a:t>
+              <a:t>07/01/2025</a:t>
             </a:fld>
             <a:endParaRPr lang="en-US"/>
           </a:p>
@@ -13546,7 +13549,7 @@
           <a:p>
             <a:fld id="{290F7819-3EAC-483F-B2F1-E6AE3D8038B8}" type="datetime1">
               <a:rPr lang="pt-PT" smtClean="0"/>
-              <a:t>06/01/2025</a:t>
+              <a:t>07/01/2025</a:t>
             </a:fld>
             <a:endParaRPr lang="en-US"/>
           </a:p>
@@ -13746,7 +13749,7 @@
           <a:p>
             <a:fld id="{678963C3-A4A7-490D-BC7C-0C1727FA616F}" type="datetime1">
               <a:rPr lang="pt-PT" smtClean="0"/>
-              <a:t>06/01/2025</a:t>
+              <a:t>07/01/2025</a:t>
             </a:fld>
             <a:endParaRPr lang="en-US"/>
           </a:p>
@@ -14022,7 +14025,7 @@
           <a:p>
             <a:fld id="{F6568116-F47A-4DBF-B3B1-4938B9F9DAF9}" type="datetime1">
               <a:rPr lang="pt-PT" smtClean="0"/>
-              <a:t>06/01/2025</a:t>
+              <a:t>07/01/2025</a:t>
             </a:fld>
             <a:endParaRPr lang="en-US"/>
           </a:p>
@@ -14290,7 +14293,7 @@
           <a:p>
             <a:fld id="{C72430AF-CE08-4344-B806-C4819C764FEE}" type="datetime1">
               <a:rPr lang="pt-PT" smtClean="0"/>
-              <a:t>06/01/2025</a:t>
+              <a:t>07/01/2025</a:t>
             </a:fld>
             <a:endParaRPr lang="en-US"/>
           </a:p>
@@ -14705,7 +14708,7 @@
           <a:p>
             <a:fld id="{165A4BD1-92BE-408E-A68B-6FA644E1C80F}" type="datetime1">
               <a:rPr lang="pt-PT" smtClean="0"/>
-              <a:t>06/01/2025</a:t>
+              <a:t>07/01/2025</a:t>
             </a:fld>
             <a:endParaRPr lang="en-US"/>
           </a:p>
@@ -14847,7 +14850,7 @@
           <a:p>
             <a:fld id="{8323F8A4-7545-46F5-A793-1A1F73A30A67}" type="datetime1">
               <a:rPr lang="pt-PT" smtClean="0"/>
-              <a:t>06/01/2025</a:t>
+              <a:t>07/01/2025</a:t>
             </a:fld>
             <a:endParaRPr lang="en-US"/>
           </a:p>
@@ -14960,7 +14963,7 @@
           <a:p>
             <a:fld id="{CD6E6FA4-7F46-48B2-9EF1-97841FDFCDE1}" type="datetime1">
               <a:rPr lang="pt-PT" smtClean="0"/>
-              <a:t>06/01/2025</a:t>
+              <a:t>07/01/2025</a:t>
             </a:fld>
             <a:endParaRPr lang="en-US"/>
           </a:p>
@@ -15273,7 +15276,7 @@
           <a:p>
             <a:fld id="{AFB509F4-78C6-43A5-906C-E86E5CD4B474}" type="datetime1">
               <a:rPr lang="pt-PT" smtClean="0"/>
-              <a:t>06/01/2025</a:t>
+              <a:t>07/01/2025</a:t>
             </a:fld>
             <a:endParaRPr lang="en-US"/>
           </a:p>
@@ -15562,7 +15565,7 @@
           <a:p>
             <a:fld id="{17D103B2-7B84-4B05-A5EF-B837ADA66F3D}" type="datetime1">
               <a:rPr lang="pt-PT" smtClean="0"/>
-              <a:t>06/01/2025</a:t>
+              <a:t>07/01/2025</a:t>
             </a:fld>
             <a:endParaRPr lang="en-US"/>
           </a:p>
@@ -15805,7 +15808,7 @@
           <a:p>
             <a:fld id="{B038CF50-A468-4267-BAC2-474E7695B37E}" type="datetime1">
               <a:rPr lang="pt-PT" smtClean="0"/>
-              <a:t>06/01/2025</a:t>
+              <a:t>07/01/2025</a:t>
             </a:fld>
             <a:endParaRPr lang="en-US"/>
           </a:p>
@@ -16891,7 +16894,7 @@
                   <a:spcPts val="600"/>
                 </a:spcAft>
               </a:pPr>
-              <a:t>06/01/2025</a:t>
+              <a:t>07/01/2025</a:t>
             </a:fld>
             <a:endParaRPr lang="en-US">
               <a:solidFill>
@@ -17143,6 +17146,1234 @@
       </p:grpSpPr>
       <p:sp useBgFill="1">
         <p:nvSpPr>
+          <p:cNvPr id="11" name="Rectangle 10">
+            <a:extLst>
+              <a:ext uri="{FF2B5EF4-FFF2-40B4-BE49-F238E27FC236}">
+                <a16:creationId xmlns:a16="http://schemas.microsoft.com/office/drawing/2014/main" id="{89A320C9-9735-4D13-8279-C1C674841392}"/>
+              </a:ext>
+              <a:ext uri="{C183D7F6-B498-43B3-948B-1728B52AA6E4}">
+                <adec:decorative xmlns:adec="http://schemas.microsoft.com/office/drawing/2017/decorative" val="1"/>
+              </a:ext>
+            </a:extLst>
+          </p:cNvPr>
+          <p:cNvSpPr>
+            <a:spLocks noGrp="1" noRot="1" noChangeAspect="1" noMove="1" noResize="1" noEditPoints="1" noAdjustHandles="1" noChangeArrowheads="1" noChangeShapeType="1" noTextEdit="1"/>
+          </p:cNvSpPr>
+          <p:nvPr>
+            <p:extLst>
+              <p:ext uri="{386F3935-93C4-4BCD-93E2-E3B085C9AB24}">
+                <p16:designElem xmlns:p16="http://schemas.microsoft.com/office/powerpoint/2015/main" val="1"/>
+              </p:ext>
+            </p:extLst>
+          </p:nvPr>
+        </p:nvSpPr>
+        <p:spPr>
+          <a:xfrm>
+            <a:off x="0" y="0"/>
+            <a:ext cx="12192000" cy="6858000"/>
+          </a:xfrm>
+          <a:prstGeom prst="rect">
+            <a:avLst/>
+          </a:prstGeom>
+          <a:ln>
+            <a:noFill/>
+          </a:ln>
+        </p:spPr>
+        <p:style>
+          <a:lnRef idx="2">
+            <a:schemeClr val="accent1">
+              <a:shade val="50000"/>
+            </a:schemeClr>
+          </a:lnRef>
+          <a:fillRef idx="1">
+            <a:schemeClr val="accent1"/>
+          </a:fillRef>
+          <a:effectRef idx="0">
+            <a:schemeClr val="accent1"/>
+          </a:effectRef>
+          <a:fontRef idx="minor">
+            <a:schemeClr val="lt1"/>
+          </a:fontRef>
+        </p:style>
+        <p:txBody>
+          <a:bodyPr rtlCol="0" anchor="ctr"/>
+          <a:lstStyle/>
+          <a:p>
+            <a:pPr algn="ctr"/>
+            <a:endParaRPr lang="en-US"/>
+          </a:p>
+        </p:txBody>
+      </p:sp>
+      <p:sp useBgFill="1">
+        <p:nvSpPr>
+          <p:cNvPr id="13" name="Rectangle 12">
+            <a:extLst>
+              <a:ext uri="{FF2B5EF4-FFF2-40B4-BE49-F238E27FC236}">
+                <a16:creationId xmlns:a16="http://schemas.microsoft.com/office/drawing/2014/main" id="{92544CF4-9B52-4A7B-A4B3-88C72729B77D}"/>
+              </a:ext>
+              <a:ext uri="{C183D7F6-B498-43B3-948B-1728B52AA6E4}">
+                <adec:decorative xmlns:adec="http://schemas.microsoft.com/office/drawing/2017/decorative" val="1"/>
+              </a:ext>
+            </a:extLst>
+          </p:cNvPr>
+          <p:cNvSpPr>
+            <a:spLocks noGrp="1" noRot="1" noChangeAspect="1" noMove="1" noResize="1" noEditPoints="1" noAdjustHandles="1" noChangeArrowheads="1" noChangeShapeType="1" noTextEdit="1"/>
+          </p:cNvSpPr>
+          <p:nvPr>
+            <p:extLst>
+              <p:ext uri="{386F3935-93C4-4BCD-93E2-E3B085C9AB24}">
+                <p16:designElem xmlns:p16="http://schemas.microsoft.com/office/powerpoint/2015/main" val="1"/>
+              </p:ext>
+            </p:extLst>
+          </p:nvPr>
+        </p:nvSpPr>
+        <p:spPr>
+          <a:xfrm>
+            <a:off x="558209" y="7126"/>
+            <a:ext cx="11167447" cy="2018806"/>
+          </a:xfrm>
+          <a:prstGeom prst="rect">
+            <a:avLst/>
+          </a:prstGeom>
+          <a:ln w="9525">
+            <a:solidFill>
+              <a:srgbClr val="DEDEDE"/>
+            </a:solidFill>
+          </a:ln>
+          <a:effectLst>
+            <a:outerShdw blurRad="50800" dist="38100" dir="2700000" algn="tl" rotWithShape="0">
+              <a:schemeClr val="bg1">
+                <a:lumMod val="85000"/>
+                <a:alpha val="50000"/>
+              </a:schemeClr>
+            </a:outerShdw>
+          </a:effectLst>
+        </p:spPr>
+        <p:style>
+          <a:lnRef idx="2">
+            <a:schemeClr val="accent1">
+              <a:shade val="50000"/>
+            </a:schemeClr>
+          </a:lnRef>
+          <a:fillRef idx="1">
+            <a:schemeClr val="accent1"/>
+          </a:fillRef>
+          <a:effectRef idx="0">
+            <a:schemeClr val="accent1"/>
+          </a:effectRef>
+          <a:fontRef idx="minor">
+            <a:schemeClr val="lt1"/>
+          </a:fontRef>
+        </p:style>
+        <p:txBody>
+          <a:bodyPr rtlCol="0" anchor="ctr"/>
+          <a:lstStyle/>
+          <a:p>
+            <a:pPr marL="0" marR="0" lvl="0" indent="0" algn="ctr" defTabSz="914400" rtl="0" eaLnBrk="1" fontAlgn="auto" latinLnBrk="0" hangingPunct="1">
+              <a:lnSpc>
+                <a:spcPct val="100000"/>
+              </a:lnSpc>
+              <a:spcBef>
+                <a:spcPts val="0"/>
+              </a:spcBef>
+              <a:spcAft>
+                <a:spcPts val="0"/>
+              </a:spcAft>
+              <a:buClrTx/>
+              <a:buSzTx/>
+              <a:buFontTx/>
+              <a:buNone/>
+              <a:tabLst/>
+              <a:defRPr/>
+            </a:pPr>
+            <a:endParaRPr kumimoji="0" lang="en-US" sz="1800" b="0" i="0" u="none" strike="noStrike" kern="1200" cap="none" spc="0" normalizeH="0" baseline="0" noProof="0">
+              <a:ln>
+                <a:noFill/>
+              </a:ln>
+              <a:solidFill>
+                <a:prstClr val="white"/>
+              </a:solidFill>
+              <a:effectLst/>
+              <a:uLnTx/>
+              <a:uFillTx/>
+              <a:latin typeface="Calibri" panose="020F0502020204030204"/>
+              <a:ea typeface="+mn-ea"/>
+              <a:cs typeface="+mn-cs"/>
+            </a:endParaRPr>
+          </a:p>
+        </p:txBody>
+      </p:sp>
+      <p:sp useBgFill="1">
+        <p:nvSpPr>
+          <p:cNvPr id="15" name="Rectangle 14">
+            <a:extLst>
+              <a:ext uri="{FF2B5EF4-FFF2-40B4-BE49-F238E27FC236}">
+                <a16:creationId xmlns:a16="http://schemas.microsoft.com/office/drawing/2014/main" id="{E75862C5-5C00-4421-BC7B-9B7B86DBC80D}"/>
+              </a:ext>
+              <a:ext uri="{C183D7F6-B498-43B3-948B-1728B52AA6E4}">
+                <adec:decorative xmlns:adec="http://schemas.microsoft.com/office/drawing/2017/decorative" val="1"/>
+              </a:ext>
+            </a:extLst>
+          </p:cNvPr>
+          <p:cNvSpPr>
+            <a:spLocks noGrp="1" noRot="1" noChangeAspect="1" noMove="1" noResize="1" noEditPoints="1" noAdjustHandles="1" noChangeArrowheads="1" noChangeShapeType="1" noTextEdit="1"/>
+          </p:cNvSpPr>
+          <p:nvPr>
+            <p:extLst>
+              <p:ext uri="{386F3935-93C4-4BCD-93E2-E3B085C9AB24}">
+                <p16:designElem xmlns:p16="http://schemas.microsoft.com/office/powerpoint/2015/main" val="1"/>
+              </p:ext>
+            </p:extLst>
+          </p:nvPr>
+        </p:nvSpPr>
+        <p:spPr>
+          <a:xfrm>
+            <a:off x="566928" y="0"/>
+            <a:ext cx="11155680" cy="2011680"/>
+          </a:xfrm>
+          <a:prstGeom prst="rect">
+            <a:avLst/>
+          </a:prstGeom>
+          <a:ln w="9525">
+            <a:noFill/>
+          </a:ln>
+          <a:effectLst/>
+        </p:spPr>
+        <p:style>
+          <a:lnRef idx="2">
+            <a:schemeClr val="accent1">
+              <a:shade val="50000"/>
+            </a:schemeClr>
+          </a:lnRef>
+          <a:fillRef idx="1">
+            <a:schemeClr val="accent1"/>
+          </a:fillRef>
+          <a:effectRef idx="0">
+            <a:schemeClr val="accent1"/>
+          </a:effectRef>
+          <a:fontRef idx="minor">
+            <a:schemeClr val="lt1"/>
+          </a:fontRef>
+        </p:style>
+        <p:txBody>
+          <a:bodyPr rtlCol="0" anchor="ctr"/>
+          <a:lstStyle/>
+          <a:p>
+            <a:pPr marL="0" marR="0" lvl="0" indent="0" algn="ctr" defTabSz="914400" rtl="0" eaLnBrk="1" fontAlgn="auto" latinLnBrk="0" hangingPunct="1">
+              <a:lnSpc>
+                <a:spcPct val="100000"/>
+              </a:lnSpc>
+              <a:spcBef>
+                <a:spcPts val="0"/>
+              </a:spcBef>
+              <a:spcAft>
+                <a:spcPts val="0"/>
+              </a:spcAft>
+              <a:buClrTx/>
+              <a:buSzTx/>
+              <a:buFontTx/>
+              <a:buNone/>
+              <a:tabLst/>
+              <a:defRPr/>
+            </a:pPr>
+            <a:endParaRPr kumimoji="0" lang="en-US" sz="1800" b="0" i="0" u="none" strike="noStrike" kern="1200" cap="none" spc="0" normalizeH="0" baseline="0" noProof="0">
+              <a:ln>
+                <a:noFill/>
+              </a:ln>
+              <a:solidFill>
+                <a:prstClr val="white"/>
+              </a:solidFill>
+              <a:effectLst/>
+              <a:uLnTx/>
+              <a:uFillTx/>
+              <a:latin typeface="Calibri" panose="020F0502020204030204"/>
+              <a:ea typeface="+mn-ea"/>
+              <a:cs typeface="+mn-cs"/>
+            </a:endParaRPr>
+          </a:p>
+        </p:txBody>
+      </p:sp>
+      <p:sp>
+        <p:nvSpPr>
+          <p:cNvPr id="2" name="Título 1">
+            <a:extLst>
+              <a:ext uri="{FF2B5EF4-FFF2-40B4-BE49-F238E27FC236}">
+                <a16:creationId xmlns:a16="http://schemas.microsoft.com/office/drawing/2014/main" id="{4D2E0B97-BC45-0EB7-84D7-9E7FFEAC951C}"/>
+              </a:ext>
+            </a:extLst>
+          </p:cNvPr>
+          <p:cNvSpPr>
+            <a:spLocks noGrp="1"/>
+          </p:cNvSpPr>
+          <p:nvPr>
+            <p:ph type="title"/>
+          </p:nvPr>
+        </p:nvSpPr>
+        <p:spPr>
+          <a:xfrm>
+            <a:off x="1115568" y="548640"/>
+            <a:ext cx="10168128" cy="1179576"/>
+          </a:xfrm>
+        </p:spPr>
+        <p:txBody>
+          <a:bodyPr>
+            <a:normAutofit/>
+          </a:bodyPr>
+          <a:lstStyle/>
+          <a:p>
+            <a:r>
+              <a:rPr lang="en-US" sz="4000"/>
+              <a:t>RAG Use Cases</a:t>
+            </a:r>
+          </a:p>
+        </p:txBody>
+      </p:sp>
+      <p:sp>
+        <p:nvSpPr>
+          <p:cNvPr id="17" name="Rectangle 16">
+            <a:extLst>
+              <a:ext uri="{FF2B5EF4-FFF2-40B4-BE49-F238E27FC236}">
+                <a16:creationId xmlns:a16="http://schemas.microsoft.com/office/drawing/2014/main" id="{089440EF-9BE9-4AE9-8C28-00B02296CDB6}"/>
+              </a:ext>
+              <a:ext uri="{C183D7F6-B498-43B3-948B-1728B52AA6E4}">
+                <adec:decorative xmlns:adec="http://schemas.microsoft.com/office/drawing/2017/decorative" val="1"/>
+              </a:ext>
+            </a:extLst>
+          </p:cNvPr>
+          <p:cNvSpPr>
+            <a:spLocks noGrp="1" noRot="1" noChangeAspect="1" noMove="1" noResize="1" noEditPoints="1" noAdjustHandles="1" noChangeArrowheads="1" noChangeShapeType="1" noTextEdit="1"/>
+          </p:cNvSpPr>
+          <p:nvPr>
+            <p:extLst>
+              <p:ext uri="{386F3935-93C4-4BCD-93E2-E3B085C9AB24}">
+                <p16:designElem xmlns:p16="http://schemas.microsoft.com/office/powerpoint/2015/main" val="1"/>
+              </p:ext>
+            </p:extLst>
+          </p:nvPr>
+        </p:nvSpPr>
+        <p:spPr>
+          <a:xfrm>
+            <a:off x="498834" y="758952"/>
+            <a:ext cx="128016" cy="704088"/>
+          </a:xfrm>
+          <a:prstGeom prst="rect">
+            <a:avLst/>
+          </a:prstGeom>
+          <a:solidFill>
+            <a:schemeClr val="accent2"/>
+          </a:solidFill>
+          <a:ln>
+            <a:noFill/>
+          </a:ln>
+        </p:spPr>
+        <p:style>
+          <a:lnRef idx="2">
+            <a:schemeClr val="accent1">
+              <a:shade val="50000"/>
+            </a:schemeClr>
+          </a:lnRef>
+          <a:fillRef idx="1">
+            <a:schemeClr val="accent1"/>
+          </a:fillRef>
+          <a:effectRef idx="0">
+            <a:schemeClr val="accent1"/>
+          </a:effectRef>
+          <a:fontRef idx="minor">
+            <a:schemeClr val="lt1"/>
+          </a:fontRef>
+        </p:style>
+        <p:txBody>
+          <a:bodyPr rtlCol="0" anchor="ctr"/>
+          <a:lstStyle/>
+          <a:p>
+            <a:pPr algn="ctr"/>
+            <a:endParaRPr lang="en-US">
+              <a:solidFill>
+                <a:prstClr val="white"/>
+              </a:solidFill>
+              <a:latin typeface="Calibri" panose="020F0502020204030204"/>
+            </a:endParaRPr>
+          </a:p>
+        </p:txBody>
+      </p:sp>
+      <p:sp>
+        <p:nvSpPr>
+          <p:cNvPr id="4" name="Marcador de Posição da Data 3">
+            <a:extLst>
+              <a:ext uri="{FF2B5EF4-FFF2-40B4-BE49-F238E27FC236}">
+                <a16:creationId xmlns:a16="http://schemas.microsoft.com/office/drawing/2014/main" id="{4D7D4788-FCFF-4456-AA36-D07FCB4562D3}"/>
+              </a:ext>
+            </a:extLst>
+          </p:cNvPr>
+          <p:cNvSpPr>
+            <a:spLocks noGrp="1"/>
+          </p:cNvSpPr>
+          <p:nvPr>
+            <p:ph type="dt" sz="half" idx="10"/>
+          </p:nvPr>
+        </p:nvSpPr>
+        <p:spPr>
+          <a:xfrm>
+            <a:off x="1115568" y="6356350"/>
+            <a:ext cx="2743200" cy="365125"/>
+          </a:xfrm>
+        </p:spPr>
+        <p:txBody>
+          <a:bodyPr>
+            <a:normAutofit/>
+          </a:bodyPr>
+          <a:lstStyle/>
+          <a:p>
+            <a:pPr>
+              <a:spcAft>
+                <a:spcPts val="600"/>
+              </a:spcAft>
+            </a:pPr>
+            <a:fld id="{678963C3-A4A7-490D-BC7C-0C1727FA616F}" type="datetime1">
+              <a:rPr lang="pt-PT">
+                <a:solidFill>
+                  <a:schemeClr val="tx1">
+                    <a:lumMod val="50000"/>
+                    <a:lumOff val="50000"/>
+                  </a:schemeClr>
+                </a:solidFill>
+              </a:rPr>
+              <a:pPr>
+                <a:spcAft>
+                  <a:spcPts val="600"/>
+                </a:spcAft>
+              </a:pPr>
+              <a:t>07/01/2025</a:t>
+            </a:fld>
+            <a:endParaRPr lang="en-US">
+              <a:solidFill>
+                <a:schemeClr val="tx1">
+                  <a:lumMod val="50000"/>
+                  <a:lumOff val="50000"/>
+                </a:schemeClr>
+              </a:solidFill>
+            </a:endParaRPr>
+          </a:p>
+        </p:txBody>
+      </p:sp>
+      <p:sp>
+        <p:nvSpPr>
+          <p:cNvPr id="5" name="Marcador de Posição do Número do Diapositivo 4">
+            <a:extLst>
+              <a:ext uri="{FF2B5EF4-FFF2-40B4-BE49-F238E27FC236}">
+                <a16:creationId xmlns:a16="http://schemas.microsoft.com/office/drawing/2014/main" id="{21D12795-3FE9-87E2-B087-46D382F297CA}"/>
+              </a:ext>
+            </a:extLst>
+          </p:cNvPr>
+          <p:cNvSpPr>
+            <a:spLocks noGrp="1"/>
+          </p:cNvSpPr>
+          <p:nvPr>
+            <p:ph type="sldNum" sz="quarter" idx="12"/>
+          </p:nvPr>
+        </p:nvSpPr>
+        <p:spPr>
+          <a:xfrm>
+            <a:off x="8540496" y="6356350"/>
+            <a:ext cx="2743200" cy="365125"/>
+          </a:xfrm>
+        </p:spPr>
+        <p:txBody>
+          <a:bodyPr>
+            <a:normAutofit/>
+          </a:bodyPr>
+          <a:lstStyle/>
+          <a:p>
+            <a:pPr>
+              <a:spcAft>
+                <a:spcPts val="600"/>
+              </a:spcAft>
+            </a:pPr>
+            <a:fld id="{7CE2990B-2BD6-473B-898B-9D3C32B6543D}" type="slidenum">
+              <a:rPr lang="en-US">
+                <a:solidFill>
+                  <a:schemeClr val="tx1">
+                    <a:lumMod val="50000"/>
+                    <a:lumOff val="50000"/>
+                  </a:schemeClr>
+                </a:solidFill>
+              </a:rPr>
+              <a:pPr>
+                <a:spcAft>
+                  <a:spcPts val="600"/>
+                </a:spcAft>
+              </a:pPr>
+              <a:t>10</a:t>
+            </a:fld>
+            <a:endParaRPr lang="en-US">
+              <a:solidFill>
+                <a:schemeClr val="tx1">
+                  <a:lumMod val="50000"/>
+                  <a:lumOff val="50000"/>
+                </a:schemeClr>
+              </a:solidFill>
+            </a:endParaRPr>
+          </a:p>
+        </p:txBody>
+      </p:sp>
+      <p:graphicFrame>
+        <p:nvGraphicFramePr>
+          <p:cNvPr id="7" name="Marcador de Posição de Conteúdo 2">
+            <a:extLst>
+              <a:ext uri="{FF2B5EF4-FFF2-40B4-BE49-F238E27FC236}">
+                <a16:creationId xmlns:a16="http://schemas.microsoft.com/office/drawing/2014/main" id="{E32D5D97-13E1-94BA-A327-6553055B8C24}"/>
+              </a:ext>
+            </a:extLst>
+          </p:cNvPr>
+          <p:cNvGraphicFramePr>
+            <a:graphicFrameLocks noGrp="1"/>
+          </p:cNvGraphicFramePr>
+          <p:nvPr>
+            <p:ph idx="1"/>
+            <p:extLst>
+              <p:ext uri="{D42A27DB-BD31-4B8C-83A1-F6EECF244321}">
+                <p14:modId xmlns:p14="http://schemas.microsoft.com/office/powerpoint/2010/main" val="138854078"/>
+              </p:ext>
+            </p:extLst>
+          </p:nvPr>
+        </p:nvGraphicFramePr>
+        <p:xfrm>
+          <a:off x="1115568" y="2269730"/>
+          <a:ext cx="10168128" cy="3993910"/>
+        </p:xfrm>
+        <a:graphic>
+          <a:graphicData uri="http://schemas.openxmlformats.org/drawingml/2006/diagram">
+            <dgm:relIds xmlns:dgm="http://schemas.openxmlformats.org/drawingml/2006/diagram" xmlns:r="http://schemas.openxmlformats.org/officeDocument/2006/relationships" r:dm="rId2" r:lo="rId3" r:qs="rId4" r:cs="rId5"/>
+          </a:graphicData>
+        </a:graphic>
+      </p:graphicFrame>
+    </p:spTree>
+    <p:extLst>
+      <p:ext uri="{BB962C8B-B14F-4D97-AF65-F5344CB8AC3E}">
+        <p14:creationId xmlns:p14="http://schemas.microsoft.com/office/powerpoint/2010/main" val="919802635"/>
+      </p:ext>
+    </p:extLst>
+  </p:cSld>
+  <p:clrMapOvr>
+    <a:masterClrMapping/>
+  </p:clrMapOvr>
+</p:sld>
+</file>
+
+<file path=ppt/slides/slide11.xml><?xml version="1.0" encoding="utf-8"?>
+<p:sld xmlns:a="http://schemas.openxmlformats.org/drawingml/2006/main" xmlns:r="http://schemas.openxmlformats.org/officeDocument/2006/relationships" xmlns:p="http://schemas.openxmlformats.org/presentationml/2006/main">
+  <p:cSld>
+    <p:bg>
+      <p:bgPr>
+        <a:solidFill>
+          <a:schemeClr val="bg1"/>
+        </a:solidFill>
+        <a:effectLst/>
+      </p:bgPr>
+    </p:bg>
+    <p:spTree>
+      <p:nvGrpSpPr>
+        <p:cNvPr id="1" name=""/>
+        <p:cNvGrpSpPr/>
+        <p:nvPr/>
+      </p:nvGrpSpPr>
+      <p:grpSpPr>
+        <a:xfrm>
+          <a:off x="0" y="0"/>
+          <a:ext cx="0" cy="0"/>
+          <a:chOff x="0" y="0"/>
+          <a:chExt cx="0" cy="0"/>
+        </a:xfrm>
+      </p:grpSpPr>
+      <p:sp useBgFill="1">
+        <p:nvSpPr>
+          <p:cNvPr id="11" name="Rectangle 10">
+            <a:extLst>
+              <a:ext uri="{FF2B5EF4-FFF2-40B4-BE49-F238E27FC236}">
+                <a16:creationId xmlns:a16="http://schemas.microsoft.com/office/drawing/2014/main" id="{7517A47C-B2E5-4B79-8061-D74B1311AF6E}"/>
+              </a:ext>
+              <a:ext uri="{C183D7F6-B498-43B3-948B-1728B52AA6E4}">
+                <adec:decorative xmlns:adec="http://schemas.microsoft.com/office/drawing/2017/decorative" val="1"/>
+              </a:ext>
+            </a:extLst>
+          </p:cNvPr>
+          <p:cNvSpPr>
+            <a:spLocks noGrp="1" noRot="1" noChangeAspect="1" noMove="1" noResize="1" noEditPoints="1" noAdjustHandles="1" noChangeArrowheads="1" noChangeShapeType="1" noTextEdit="1"/>
+          </p:cNvSpPr>
+          <p:nvPr>
+            <p:extLst>
+              <p:ext uri="{386F3935-93C4-4BCD-93E2-E3B085C9AB24}">
+                <p16:designElem xmlns:p16="http://schemas.microsoft.com/office/powerpoint/2015/main" val="1"/>
+              </p:ext>
+            </p:extLst>
+          </p:nvPr>
+        </p:nvSpPr>
+        <p:spPr>
+          <a:xfrm>
+            <a:off x="0" y="0"/>
+            <a:ext cx="12192000" cy="6858000"/>
+          </a:xfrm>
+          <a:prstGeom prst="rect">
+            <a:avLst/>
+          </a:prstGeom>
+          <a:ln>
+            <a:noFill/>
+          </a:ln>
+        </p:spPr>
+        <p:style>
+          <a:lnRef idx="2">
+            <a:schemeClr val="accent1">
+              <a:shade val="50000"/>
+            </a:schemeClr>
+          </a:lnRef>
+          <a:fillRef idx="1">
+            <a:schemeClr val="accent1"/>
+          </a:fillRef>
+          <a:effectRef idx="0">
+            <a:schemeClr val="accent1"/>
+          </a:effectRef>
+          <a:fontRef idx="minor">
+            <a:schemeClr val="lt1"/>
+          </a:fontRef>
+        </p:style>
+        <p:txBody>
+          <a:bodyPr rtlCol="0" anchor="ctr"/>
+          <a:lstStyle/>
+          <a:p>
+            <a:pPr algn="ctr"/>
+            <a:endParaRPr lang="en-US"/>
+          </a:p>
+        </p:txBody>
+      </p:sp>
+      <p:sp useBgFill="1">
+        <p:nvSpPr>
+          <p:cNvPr id="13" name="Freeform: Shape 12">
+            <a:extLst>
+              <a:ext uri="{FF2B5EF4-FFF2-40B4-BE49-F238E27FC236}">
+                <a16:creationId xmlns:a16="http://schemas.microsoft.com/office/drawing/2014/main" id="{C505E780-2083-4CB5-A42A-5E0E2908ECC3}"/>
+              </a:ext>
+              <a:ext uri="{C183D7F6-B498-43B3-948B-1728B52AA6E4}">
+                <adec:decorative xmlns:adec="http://schemas.microsoft.com/office/drawing/2017/decorative" val="1"/>
+              </a:ext>
+            </a:extLst>
+          </p:cNvPr>
+          <p:cNvSpPr>
+            <a:spLocks noGrp="1" noRot="1" noChangeAspect="1" noMove="1" noResize="1" noEditPoints="1" noAdjustHandles="1" noChangeArrowheads="1" noChangeShapeType="1" noTextEdit="1"/>
+          </p:cNvSpPr>
+          <p:nvPr>
+            <p:extLst>
+              <p:ext uri="{386F3935-93C4-4BCD-93E2-E3B085C9AB24}">
+                <p16:designElem xmlns:p16="http://schemas.microsoft.com/office/powerpoint/2015/main" val="1"/>
+              </p:ext>
+            </p:extLst>
+          </p:nvPr>
+        </p:nvSpPr>
+        <p:spPr>
+          <a:xfrm>
+            <a:off x="-1" y="0"/>
+            <a:ext cx="4818889" cy="6858000"/>
+          </a:xfrm>
+          <a:custGeom>
+            <a:avLst/>
+            <a:gdLst>
+              <a:gd name="connsiteX0" fmla="*/ 0 w 4818889"/>
+              <a:gd name="connsiteY0" fmla="*/ 0 h 6858000"/>
+              <a:gd name="connsiteX1" fmla="*/ 3605911 w 4818889"/>
+              <a:gd name="connsiteY1" fmla="*/ 0 h 6858000"/>
+              <a:gd name="connsiteX2" fmla="*/ 3668894 w 4818889"/>
+              <a:gd name="connsiteY2" fmla="*/ 69271 h 6858000"/>
+              <a:gd name="connsiteX3" fmla="*/ 4818889 w 4818889"/>
+              <a:gd name="connsiteY3" fmla="*/ 3429000 h 6858000"/>
+              <a:gd name="connsiteX4" fmla="*/ 3668894 w 4818889"/>
+              <a:gd name="connsiteY4" fmla="*/ 6788730 h 6858000"/>
+              <a:gd name="connsiteX5" fmla="*/ 3605911 w 4818889"/>
+              <a:gd name="connsiteY5" fmla="*/ 6858000 h 6858000"/>
+              <a:gd name="connsiteX6" fmla="*/ 0 w 4818889"/>
+              <a:gd name="connsiteY6" fmla="*/ 6858000 h 6858000"/>
+            </a:gdLst>
+            <a:ahLst/>
+            <a:cxnLst>
+              <a:cxn ang="0">
+                <a:pos x="connsiteX0" y="connsiteY0"/>
+              </a:cxn>
+              <a:cxn ang="0">
+                <a:pos x="connsiteX1" y="connsiteY1"/>
+              </a:cxn>
+              <a:cxn ang="0">
+                <a:pos x="connsiteX2" y="connsiteY2"/>
+              </a:cxn>
+              <a:cxn ang="0">
+                <a:pos x="connsiteX3" y="connsiteY3"/>
+              </a:cxn>
+              <a:cxn ang="0">
+                <a:pos x="connsiteX4" y="connsiteY4"/>
+              </a:cxn>
+              <a:cxn ang="0">
+                <a:pos x="connsiteX5" y="connsiteY5"/>
+              </a:cxn>
+              <a:cxn ang="0">
+                <a:pos x="connsiteX6" y="connsiteY6"/>
+              </a:cxn>
+            </a:cxnLst>
+            <a:rect l="l" t="t" r="r" b="b"/>
+            <a:pathLst>
+              <a:path w="4818889" h="6858000">
+                <a:moveTo>
+                  <a:pt x="0" y="0"/>
+                </a:moveTo>
+                <a:lnTo>
+                  <a:pt x="3605911" y="0"/>
+                </a:lnTo>
+                <a:lnTo>
+                  <a:pt x="3668894" y="69271"/>
+                </a:lnTo>
+                <a:cubicBezTo>
+                  <a:pt x="4379420" y="929100"/>
+                  <a:pt x="4818889" y="2116944"/>
+                  <a:pt x="4818889" y="3429000"/>
+                </a:cubicBezTo>
+                <a:cubicBezTo>
+                  <a:pt x="4818889" y="4741056"/>
+                  <a:pt x="4379420" y="5928900"/>
+                  <a:pt x="3668894" y="6788730"/>
+                </a:cubicBezTo>
+                <a:lnTo>
+                  <a:pt x="3605911" y="6858000"/>
+                </a:lnTo>
+                <a:lnTo>
+                  <a:pt x="0" y="6858000"/>
+                </a:lnTo>
+                <a:close/>
+              </a:path>
+            </a:pathLst>
+          </a:custGeom>
+          <a:ln w="9525">
+            <a:solidFill>
+              <a:srgbClr val="EFEFEF"/>
+            </a:solidFill>
+          </a:ln>
+          <a:effectLst>
+            <a:outerShdw blurRad="88900" dist="38100" algn="l" rotWithShape="0">
+              <a:schemeClr val="bg1">
+                <a:lumMod val="85000"/>
+                <a:alpha val="50000"/>
+              </a:schemeClr>
+            </a:outerShdw>
+          </a:effectLst>
+        </p:spPr>
+        <p:style>
+          <a:lnRef idx="2">
+            <a:schemeClr val="accent1">
+              <a:shade val="50000"/>
+            </a:schemeClr>
+          </a:lnRef>
+          <a:fillRef idx="1">
+            <a:schemeClr val="accent1"/>
+          </a:fillRef>
+          <a:effectRef idx="0">
+            <a:schemeClr val="accent1"/>
+          </a:effectRef>
+          <a:fontRef idx="minor">
+            <a:schemeClr val="lt1"/>
+          </a:fontRef>
+        </p:style>
+        <p:txBody>
+          <a:bodyPr wrap="square" rtlCol="0" anchor="ctr">
+            <a:noAutofit/>
+          </a:bodyPr>
+          <a:lstStyle/>
+          <a:p>
+            <a:pPr marL="0" marR="0" lvl="0" indent="0" algn="ctr" defTabSz="914400" rtl="0" eaLnBrk="1" fontAlgn="auto" latinLnBrk="0" hangingPunct="1">
+              <a:lnSpc>
+                <a:spcPct val="100000"/>
+              </a:lnSpc>
+              <a:spcBef>
+                <a:spcPts val="0"/>
+              </a:spcBef>
+              <a:spcAft>
+                <a:spcPts val="0"/>
+              </a:spcAft>
+              <a:buClrTx/>
+              <a:buSzTx/>
+              <a:buFontTx/>
+              <a:buNone/>
+              <a:tabLst/>
+              <a:defRPr/>
+            </a:pPr>
+            <a:endParaRPr kumimoji="0" lang="en-US" sz="1800" b="0" i="0" u="none" strike="noStrike" kern="1200" cap="none" spc="0" normalizeH="0" baseline="0" noProof="0">
+              <a:ln>
+                <a:noFill/>
+              </a:ln>
+              <a:solidFill>
+                <a:prstClr val="white"/>
+              </a:solidFill>
+              <a:effectLst/>
+              <a:uLnTx/>
+              <a:uFillTx/>
+              <a:latin typeface="Calibri" panose="020F0502020204030204"/>
+              <a:ea typeface="+mn-ea"/>
+              <a:cs typeface="+mn-cs"/>
+            </a:endParaRPr>
+          </a:p>
+        </p:txBody>
+      </p:sp>
+      <p:sp useBgFill="1">
+        <p:nvSpPr>
+          <p:cNvPr id="15" name="Freeform: Shape 14">
+            <a:extLst>
+              <a:ext uri="{FF2B5EF4-FFF2-40B4-BE49-F238E27FC236}">
+                <a16:creationId xmlns:a16="http://schemas.microsoft.com/office/drawing/2014/main" id="{D2C0AE1C-0118-41AE-8A10-7CDCBF10E96F}"/>
+              </a:ext>
+              <a:ext uri="{C183D7F6-B498-43B3-948B-1728B52AA6E4}">
+                <adec:decorative xmlns:adec="http://schemas.microsoft.com/office/drawing/2017/decorative" val="1"/>
+              </a:ext>
+            </a:extLst>
+          </p:cNvPr>
+          <p:cNvSpPr>
+            <a:spLocks noGrp="1" noRot="1" noChangeAspect="1" noMove="1" noResize="1" noEditPoints="1" noAdjustHandles="1" noChangeArrowheads="1" noChangeShapeType="1" noTextEdit="1"/>
+          </p:cNvSpPr>
+          <p:nvPr>
+            <p:extLst>
+              <p:ext uri="{386F3935-93C4-4BCD-93E2-E3B085C9AB24}">
+                <p16:designElem xmlns:p16="http://schemas.microsoft.com/office/powerpoint/2015/main" val="1"/>
+              </p:ext>
+            </p:extLst>
+          </p:nvPr>
+        </p:nvSpPr>
+        <p:spPr>
+          <a:xfrm>
+            <a:off x="1" y="0"/>
+            <a:ext cx="4811477" cy="6858000"/>
+          </a:xfrm>
+          <a:custGeom>
+            <a:avLst/>
+            <a:gdLst>
+              <a:gd name="connsiteX0" fmla="*/ 0 w 4811477"/>
+              <a:gd name="connsiteY0" fmla="*/ 0 h 6858000"/>
+              <a:gd name="connsiteX1" fmla="*/ 3598499 w 4811477"/>
+              <a:gd name="connsiteY1" fmla="*/ 0 h 6858000"/>
+              <a:gd name="connsiteX2" fmla="*/ 3661482 w 4811477"/>
+              <a:gd name="connsiteY2" fmla="*/ 69271 h 6858000"/>
+              <a:gd name="connsiteX3" fmla="*/ 4811477 w 4811477"/>
+              <a:gd name="connsiteY3" fmla="*/ 3429000 h 6858000"/>
+              <a:gd name="connsiteX4" fmla="*/ 3661482 w 4811477"/>
+              <a:gd name="connsiteY4" fmla="*/ 6788730 h 6858000"/>
+              <a:gd name="connsiteX5" fmla="*/ 3598499 w 4811477"/>
+              <a:gd name="connsiteY5" fmla="*/ 6858000 h 6858000"/>
+              <a:gd name="connsiteX6" fmla="*/ 0 w 4811477"/>
+              <a:gd name="connsiteY6" fmla="*/ 6858000 h 6858000"/>
+            </a:gdLst>
+            <a:ahLst/>
+            <a:cxnLst>
+              <a:cxn ang="0">
+                <a:pos x="connsiteX0" y="connsiteY0"/>
+              </a:cxn>
+              <a:cxn ang="0">
+                <a:pos x="connsiteX1" y="connsiteY1"/>
+              </a:cxn>
+              <a:cxn ang="0">
+                <a:pos x="connsiteX2" y="connsiteY2"/>
+              </a:cxn>
+              <a:cxn ang="0">
+                <a:pos x="connsiteX3" y="connsiteY3"/>
+              </a:cxn>
+              <a:cxn ang="0">
+                <a:pos x="connsiteX4" y="connsiteY4"/>
+              </a:cxn>
+              <a:cxn ang="0">
+                <a:pos x="connsiteX5" y="connsiteY5"/>
+              </a:cxn>
+              <a:cxn ang="0">
+                <a:pos x="connsiteX6" y="connsiteY6"/>
+              </a:cxn>
+            </a:cxnLst>
+            <a:rect l="l" t="t" r="r" b="b"/>
+            <a:pathLst>
+              <a:path w="4811477" h="6858000">
+                <a:moveTo>
+                  <a:pt x="0" y="0"/>
+                </a:moveTo>
+                <a:lnTo>
+                  <a:pt x="3598499" y="0"/>
+                </a:lnTo>
+                <a:lnTo>
+                  <a:pt x="3661482" y="69271"/>
+                </a:lnTo>
+                <a:cubicBezTo>
+                  <a:pt x="4372008" y="929100"/>
+                  <a:pt x="4811477" y="2116944"/>
+                  <a:pt x="4811477" y="3429000"/>
+                </a:cubicBezTo>
+                <a:cubicBezTo>
+                  <a:pt x="4811477" y="4741056"/>
+                  <a:pt x="4372008" y="5928900"/>
+                  <a:pt x="3661482" y="6788730"/>
+                </a:cubicBezTo>
+                <a:lnTo>
+                  <a:pt x="3598499" y="6858000"/>
+                </a:lnTo>
+                <a:lnTo>
+                  <a:pt x="0" y="6858000"/>
+                </a:lnTo>
+                <a:close/>
+              </a:path>
+            </a:pathLst>
+          </a:custGeom>
+          <a:ln w="9525">
+            <a:noFill/>
+          </a:ln>
+          <a:effectLst/>
+        </p:spPr>
+        <p:style>
+          <a:lnRef idx="2">
+            <a:schemeClr val="accent1">
+              <a:shade val="50000"/>
+            </a:schemeClr>
+          </a:lnRef>
+          <a:fillRef idx="1">
+            <a:schemeClr val="accent1"/>
+          </a:fillRef>
+          <a:effectRef idx="0">
+            <a:schemeClr val="accent1"/>
+          </a:effectRef>
+          <a:fontRef idx="minor">
+            <a:schemeClr val="lt1"/>
+          </a:fontRef>
+        </p:style>
+        <p:txBody>
+          <a:bodyPr wrap="square" rtlCol="0" anchor="ctr">
+            <a:noAutofit/>
+          </a:bodyPr>
+          <a:lstStyle/>
+          <a:p>
+            <a:pPr marL="0" marR="0" lvl="0" indent="0" algn="ctr" defTabSz="914400" rtl="0" eaLnBrk="1" fontAlgn="auto" latinLnBrk="0" hangingPunct="1">
+              <a:lnSpc>
+                <a:spcPct val="100000"/>
+              </a:lnSpc>
+              <a:spcBef>
+                <a:spcPts val="0"/>
+              </a:spcBef>
+              <a:spcAft>
+                <a:spcPts val="0"/>
+              </a:spcAft>
+              <a:buClrTx/>
+              <a:buSzTx/>
+              <a:buFontTx/>
+              <a:buNone/>
+              <a:tabLst/>
+              <a:defRPr/>
+            </a:pPr>
+            <a:endParaRPr kumimoji="0" lang="en-US" sz="1800" b="0" i="0" u="none" strike="noStrike" kern="1200" cap="none" spc="0" normalizeH="0" baseline="0" noProof="0">
+              <a:ln>
+                <a:noFill/>
+              </a:ln>
+              <a:solidFill>
+                <a:prstClr val="white"/>
+              </a:solidFill>
+              <a:effectLst/>
+              <a:uLnTx/>
+              <a:uFillTx/>
+              <a:latin typeface="Calibri" panose="020F0502020204030204"/>
+              <a:ea typeface="+mn-ea"/>
+              <a:cs typeface="+mn-cs"/>
+            </a:endParaRPr>
+          </a:p>
+        </p:txBody>
+      </p:sp>
+      <p:sp>
+        <p:nvSpPr>
+          <p:cNvPr id="2" name="Título 1">
+            <a:extLst>
+              <a:ext uri="{FF2B5EF4-FFF2-40B4-BE49-F238E27FC236}">
+                <a16:creationId xmlns:a16="http://schemas.microsoft.com/office/drawing/2014/main" id="{0D46C4FD-1C27-CD85-FB15-8172CB5F19DA}"/>
+              </a:ext>
+            </a:extLst>
+          </p:cNvPr>
+          <p:cNvSpPr>
+            <a:spLocks noGrp="1"/>
+          </p:cNvSpPr>
+          <p:nvPr>
+            <p:ph type="title"/>
+          </p:nvPr>
+        </p:nvSpPr>
+        <p:spPr>
+          <a:xfrm>
+            <a:off x="621792" y="1161288"/>
+            <a:ext cx="3602736" cy="4526280"/>
+          </a:xfrm>
+        </p:spPr>
+        <p:txBody>
+          <a:bodyPr>
+            <a:normAutofit/>
+          </a:bodyPr>
+          <a:lstStyle/>
+          <a:p>
+            <a:r>
+              <a:rPr lang="en-US" sz="4000"/>
+              <a:t>Future of RAG</a:t>
+            </a:r>
+          </a:p>
+        </p:txBody>
+      </p:sp>
+      <p:sp>
+        <p:nvSpPr>
+          <p:cNvPr id="17" name="Rectangle 16">
+            <a:extLst>
+              <a:ext uri="{FF2B5EF4-FFF2-40B4-BE49-F238E27FC236}">
+                <a16:creationId xmlns:a16="http://schemas.microsoft.com/office/drawing/2014/main" id="{463EEC44-1BA3-44ED-81FC-A644B04B2A44}"/>
+              </a:ext>
+              <a:ext uri="{C183D7F6-B498-43B3-948B-1728B52AA6E4}">
+                <adec:decorative xmlns:adec="http://schemas.microsoft.com/office/drawing/2017/decorative" val="1"/>
+              </a:ext>
+            </a:extLst>
+          </p:cNvPr>
+          <p:cNvSpPr>
+            <a:spLocks noGrp="1" noRot="1" noChangeAspect="1" noMove="1" noResize="1" noEditPoints="1" noAdjustHandles="1" noChangeArrowheads="1" noChangeShapeType="1" noTextEdit="1"/>
+          </p:cNvSpPr>
+          <p:nvPr>
+            <p:extLst>
+              <p:ext uri="{386F3935-93C4-4BCD-93E2-E3B085C9AB24}">
+                <p16:designElem xmlns:p16="http://schemas.microsoft.com/office/powerpoint/2015/main" val="1"/>
+              </p:ext>
+            </p:extLst>
+          </p:nvPr>
+        </p:nvSpPr>
+        <p:spPr>
+          <a:xfrm>
+            <a:off x="0" y="3081528"/>
+            <a:ext cx="128016" cy="704088"/>
+          </a:xfrm>
+          <a:prstGeom prst="rect">
+            <a:avLst/>
+          </a:prstGeom>
+          <a:solidFill>
+            <a:schemeClr val="accent2"/>
+          </a:solidFill>
+          <a:ln>
+            <a:noFill/>
+          </a:ln>
+        </p:spPr>
+        <p:style>
+          <a:lnRef idx="2">
+            <a:schemeClr val="accent1">
+              <a:shade val="50000"/>
+            </a:schemeClr>
+          </a:lnRef>
+          <a:fillRef idx="1">
+            <a:schemeClr val="accent1"/>
+          </a:fillRef>
+          <a:effectRef idx="0">
+            <a:schemeClr val="accent1"/>
+          </a:effectRef>
+          <a:fontRef idx="minor">
+            <a:schemeClr val="lt1"/>
+          </a:fontRef>
+        </p:style>
+        <p:txBody>
+          <a:bodyPr rtlCol="0" anchor="ctr"/>
+          <a:lstStyle/>
+          <a:p>
+            <a:pPr algn="ctr"/>
+            <a:endParaRPr lang="en-US">
+              <a:solidFill>
+                <a:prstClr val="white"/>
+              </a:solidFill>
+              <a:latin typeface="Calibri" panose="020F0502020204030204"/>
+            </a:endParaRPr>
+          </a:p>
+        </p:txBody>
+      </p:sp>
+      <p:sp>
+        <p:nvSpPr>
+          <p:cNvPr id="4" name="Marcador de Posição da Data 3">
+            <a:extLst>
+              <a:ext uri="{FF2B5EF4-FFF2-40B4-BE49-F238E27FC236}">
+                <a16:creationId xmlns:a16="http://schemas.microsoft.com/office/drawing/2014/main" id="{9319B61A-DBC9-0EF9-85C1-467932CB5D6E}"/>
+              </a:ext>
+            </a:extLst>
+          </p:cNvPr>
+          <p:cNvSpPr>
+            <a:spLocks noGrp="1"/>
+          </p:cNvSpPr>
+          <p:nvPr>
+            <p:ph type="dt" sz="half" idx="10"/>
+          </p:nvPr>
+        </p:nvSpPr>
+        <p:spPr>
+          <a:xfrm>
+            <a:off x="621792" y="6356350"/>
+            <a:ext cx="2743200" cy="365125"/>
+          </a:xfrm>
+        </p:spPr>
+        <p:txBody>
+          <a:bodyPr>
+            <a:normAutofit/>
+          </a:bodyPr>
+          <a:lstStyle/>
+          <a:p>
+            <a:pPr>
+              <a:spcAft>
+                <a:spcPts val="600"/>
+              </a:spcAft>
+            </a:pPr>
+            <a:fld id="{678963C3-A4A7-490D-BC7C-0C1727FA616F}" type="datetime1">
+              <a:rPr lang="pt-PT">
+                <a:solidFill>
+                  <a:schemeClr val="tx1">
+                    <a:lumMod val="50000"/>
+                    <a:lumOff val="50000"/>
+                  </a:schemeClr>
+                </a:solidFill>
+              </a:rPr>
+              <a:pPr>
+                <a:spcAft>
+                  <a:spcPts val="600"/>
+                </a:spcAft>
+              </a:pPr>
+              <a:t>07/01/2025</a:t>
+            </a:fld>
+            <a:endParaRPr lang="en-US">
+              <a:solidFill>
+                <a:schemeClr val="tx1">
+                  <a:lumMod val="50000"/>
+                  <a:lumOff val="50000"/>
+                </a:schemeClr>
+              </a:solidFill>
+            </a:endParaRPr>
+          </a:p>
+        </p:txBody>
+      </p:sp>
+      <p:sp>
+        <p:nvSpPr>
+          <p:cNvPr id="5" name="Marcador de Posição do Número do Diapositivo 4">
+            <a:extLst>
+              <a:ext uri="{FF2B5EF4-FFF2-40B4-BE49-F238E27FC236}">
+                <a16:creationId xmlns:a16="http://schemas.microsoft.com/office/drawing/2014/main" id="{1825CB70-104A-729E-4D6D-928CAB0CEA5B}"/>
+              </a:ext>
+            </a:extLst>
+          </p:cNvPr>
+          <p:cNvSpPr>
+            <a:spLocks noGrp="1"/>
+          </p:cNvSpPr>
+          <p:nvPr>
+            <p:ph type="sldNum" sz="quarter" idx="12"/>
+          </p:nvPr>
+        </p:nvSpPr>
+        <p:spPr>
+          <a:xfrm>
+            <a:off x="8801100" y="6356350"/>
+            <a:ext cx="2743200" cy="365125"/>
+          </a:xfrm>
+        </p:spPr>
+        <p:txBody>
+          <a:bodyPr>
+            <a:normAutofit/>
+          </a:bodyPr>
+          <a:lstStyle/>
+          <a:p>
+            <a:pPr>
+              <a:spcAft>
+                <a:spcPts val="600"/>
+              </a:spcAft>
+            </a:pPr>
+            <a:fld id="{7CE2990B-2BD6-473B-898B-9D3C32B6543D}" type="slidenum">
+              <a:rPr lang="en-US">
+                <a:solidFill>
+                  <a:schemeClr val="tx1">
+                    <a:lumMod val="50000"/>
+                    <a:lumOff val="50000"/>
+                  </a:schemeClr>
+                </a:solidFill>
+              </a:rPr>
+              <a:pPr>
+                <a:spcAft>
+                  <a:spcPts val="600"/>
+                </a:spcAft>
+              </a:pPr>
+              <a:t>11</a:t>
+            </a:fld>
+            <a:endParaRPr lang="en-US">
+              <a:solidFill>
+                <a:schemeClr val="tx1">
+                  <a:lumMod val="50000"/>
+                  <a:lumOff val="50000"/>
+                </a:schemeClr>
+              </a:solidFill>
+            </a:endParaRPr>
+          </a:p>
+        </p:txBody>
+      </p:sp>
+      <p:graphicFrame>
+        <p:nvGraphicFramePr>
+          <p:cNvPr id="7" name="Marcador de Posição de Conteúdo 2">
+            <a:extLst>
+              <a:ext uri="{FF2B5EF4-FFF2-40B4-BE49-F238E27FC236}">
+                <a16:creationId xmlns:a16="http://schemas.microsoft.com/office/drawing/2014/main" id="{2A1CEF7E-ACC0-1F5F-F390-5F95ED7A2E0A}"/>
+              </a:ext>
+            </a:extLst>
+          </p:cNvPr>
+          <p:cNvGraphicFramePr>
+            <a:graphicFrameLocks noGrp="1"/>
+          </p:cNvGraphicFramePr>
+          <p:nvPr>
+            <p:ph idx="1"/>
+            <p:extLst>
+              <p:ext uri="{D42A27DB-BD31-4B8C-83A1-F6EECF244321}">
+                <p14:modId xmlns:p14="http://schemas.microsoft.com/office/powerpoint/2010/main" val="777714790"/>
+              </p:ext>
+            </p:extLst>
+          </p:nvPr>
+        </p:nvGraphicFramePr>
+        <p:xfrm>
+          <a:off x="5303520" y="676656"/>
+          <a:ext cx="6364224" cy="5513832"/>
+        </p:xfrm>
+        <a:graphic>
+          <a:graphicData uri="http://schemas.openxmlformats.org/drawingml/2006/diagram">
+            <dgm:relIds xmlns:dgm="http://schemas.openxmlformats.org/drawingml/2006/diagram" xmlns:r="http://schemas.openxmlformats.org/officeDocument/2006/relationships" r:dm="rId2" r:lo="rId3" r:qs="rId4" r:cs="rId5"/>
+          </a:graphicData>
+        </a:graphic>
+      </p:graphicFrame>
+    </p:spTree>
+    <p:extLst>
+      <p:ext uri="{BB962C8B-B14F-4D97-AF65-F5344CB8AC3E}">
+        <p14:creationId xmlns:p14="http://schemas.microsoft.com/office/powerpoint/2010/main" val="529962619"/>
+      </p:ext>
+    </p:extLst>
+  </p:cSld>
+  <p:clrMapOvr>
+    <a:masterClrMapping/>
+  </p:clrMapOvr>
+</p:sld>
+</file>
+
+<file path=ppt/slides/slide12.xml><?xml version="1.0" encoding="utf-8"?>
+<p:sld xmlns:a="http://schemas.openxmlformats.org/drawingml/2006/main" xmlns:r="http://schemas.openxmlformats.org/officeDocument/2006/relationships" xmlns:p="http://schemas.openxmlformats.org/presentationml/2006/main">
+  <p:cSld>
+    <p:bg>
+      <p:bgPr>
+        <a:solidFill>
+          <a:schemeClr val="bg1"/>
+        </a:solidFill>
+        <a:effectLst/>
+      </p:bgPr>
+    </p:bg>
+    <p:spTree>
+      <p:nvGrpSpPr>
+        <p:cNvPr id="1" name=""/>
+        <p:cNvGrpSpPr/>
+        <p:nvPr/>
+      </p:nvGrpSpPr>
+      <p:grpSpPr>
+        <a:xfrm>
+          <a:off x="0" y="0"/>
+          <a:ext cx="0" cy="0"/>
+          <a:chOff x="0" y="0"/>
+          <a:chExt cx="0" cy="0"/>
+        </a:xfrm>
+      </p:grpSpPr>
+      <p:sp useBgFill="1">
+        <p:nvSpPr>
           <p:cNvPr id="10" name="Rectangle 9">
             <a:extLst>
               <a:ext uri="{FF2B5EF4-FFF2-40B4-BE49-F238E27FC236}">
@@ -17733,7 +18964,7 @@
                   <a:spcPts val="600"/>
                 </a:spcAft>
               </a:pPr>
-              <a:t>06/01/2025</a:t>
+              <a:t>07/01/2025</a:t>
             </a:fld>
             <a:endParaRPr lang="en-US">
               <a:solidFill>
@@ -17793,7 +19024,7 @@
                   <a:spcPts val="600"/>
                 </a:spcAft>
               </a:pPr>
-              <a:t>10</a:t>
+              <a:t>12</a:t>
             </a:fld>
             <a:endParaRPr lang="en-US">
               <a:solidFill>
@@ -17810,6 +19041,537 @@
     <p:extLst>
       <p:ext uri="{BB962C8B-B14F-4D97-AF65-F5344CB8AC3E}">
         <p14:creationId xmlns:p14="http://schemas.microsoft.com/office/powerpoint/2010/main" val="1181903439"/>
+      </p:ext>
+    </p:extLst>
+  </p:cSld>
+  <p:clrMapOvr>
+    <a:masterClrMapping/>
+  </p:clrMapOvr>
+</p:sld>
+</file>
+
+<file path=ppt/slides/slide13.xml><?xml version="1.0" encoding="utf-8"?>
+<p:sld xmlns:a="http://schemas.openxmlformats.org/drawingml/2006/main" xmlns:r="http://schemas.openxmlformats.org/officeDocument/2006/relationships" xmlns:p="http://schemas.openxmlformats.org/presentationml/2006/main">
+  <p:cSld>
+    <p:bg>
+      <p:bgPr>
+        <a:solidFill>
+          <a:schemeClr val="bg1"/>
+        </a:solidFill>
+        <a:effectLst/>
+      </p:bgPr>
+    </p:bg>
+    <p:spTree>
+      <p:nvGrpSpPr>
+        <p:cNvPr id="1" name=""/>
+        <p:cNvGrpSpPr/>
+        <p:nvPr/>
+      </p:nvGrpSpPr>
+      <p:grpSpPr>
+        <a:xfrm>
+          <a:off x="0" y="0"/>
+          <a:ext cx="0" cy="0"/>
+          <a:chOff x="0" y="0"/>
+          <a:chExt cx="0" cy="0"/>
+        </a:xfrm>
+      </p:grpSpPr>
+      <p:sp useBgFill="1">
+        <p:nvSpPr>
+          <p:cNvPr id="18" name="Rectangle 17">
+            <a:extLst>
+              <a:ext uri="{FF2B5EF4-FFF2-40B4-BE49-F238E27FC236}">
+                <a16:creationId xmlns:a16="http://schemas.microsoft.com/office/drawing/2014/main" id="{E91DC736-0EF8-4F87-9146-EBF1D2EE4D3D}"/>
+              </a:ext>
+              <a:ext uri="{C183D7F6-B498-43B3-948B-1728B52AA6E4}">
+                <adec:decorative xmlns:adec="http://schemas.microsoft.com/office/drawing/2017/decorative" val="1"/>
+              </a:ext>
+            </a:extLst>
+          </p:cNvPr>
+          <p:cNvSpPr>
+            <a:spLocks noGrp="1" noRot="1" noChangeAspect="1" noMove="1" noResize="1" noEditPoints="1" noAdjustHandles="1" noChangeArrowheads="1" noChangeShapeType="1" noTextEdit="1"/>
+          </p:cNvSpPr>
+          <p:nvPr>
+            <p:extLst>
+              <p:ext uri="{386F3935-93C4-4BCD-93E2-E3B085C9AB24}">
+                <p16:designElem xmlns:p16="http://schemas.microsoft.com/office/powerpoint/2015/main" val="1"/>
+              </p:ext>
+            </p:extLst>
+          </p:nvPr>
+        </p:nvSpPr>
+        <p:spPr>
+          <a:xfrm>
+            <a:off x="0" y="0"/>
+            <a:ext cx="12192000" cy="6858000"/>
+          </a:xfrm>
+          <a:prstGeom prst="rect">
+            <a:avLst/>
+          </a:prstGeom>
+          <a:ln>
+            <a:noFill/>
+          </a:ln>
+        </p:spPr>
+        <p:style>
+          <a:lnRef idx="2">
+            <a:schemeClr val="accent1">
+              <a:shade val="50000"/>
+            </a:schemeClr>
+          </a:lnRef>
+          <a:fillRef idx="1">
+            <a:schemeClr val="accent1"/>
+          </a:fillRef>
+          <a:effectRef idx="0">
+            <a:schemeClr val="accent1"/>
+          </a:effectRef>
+          <a:fontRef idx="minor">
+            <a:schemeClr val="lt1"/>
+          </a:fontRef>
+        </p:style>
+        <p:txBody>
+          <a:bodyPr rtlCol="0" anchor="ctr"/>
+          <a:lstStyle/>
+          <a:p>
+            <a:pPr algn="ctr"/>
+            <a:endParaRPr lang="en-US"/>
+          </a:p>
+        </p:txBody>
+      </p:sp>
+      <p:pic>
+        <p:nvPicPr>
+          <p:cNvPr id="7" name="Picture 6" descr="Ponto de interrogação amarelo">
+            <a:extLst>
+              <a:ext uri="{FF2B5EF4-FFF2-40B4-BE49-F238E27FC236}">
+                <a16:creationId xmlns:a16="http://schemas.microsoft.com/office/drawing/2014/main" id="{48435D07-B21B-249B-0A13-9A46E7C912AF}"/>
+              </a:ext>
+            </a:extLst>
+          </p:cNvPr>
+          <p:cNvPicPr>
+            <a:picLocks noChangeAspect="1"/>
+          </p:cNvPicPr>
+          <p:nvPr/>
+        </p:nvPicPr>
+        <p:blipFill>
+          <a:blip r:embed="rId2"/>
+          <a:srcRect l="1061" t="639" r="23584" b="1"/>
+          <a:stretch/>
+        </p:blipFill>
+        <p:spPr>
+          <a:xfrm>
+            <a:off x="3523488" y="10"/>
+            <a:ext cx="8668512" cy="6857990"/>
+          </a:xfrm>
+          <a:prstGeom prst="rect">
+            <a:avLst/>
+          </a:prstGeom>
+        </p:spPr>
+      </p:pic>
+      <p:sp>
+        <p:nvSpPr>
+          <p:cNvPr id="20" name="Rectangle 19">
+            <a:extLst>
+              <a:ext uri="{FF2B5EF4-FFF2-40B4-BE49-F238E27FC236}">
+                <a16:creationId xmlns:a16="http://schemas.microsoft.com/office/drawing/2014/main" id="{097CD68E-23E3-4007-8847-CD0944C4F7BE}"/>
+              </a:ext>
+              <a:ext uri="{C183D7F6-B498-43B3-948B-1728B52AA6E4}">
+                <adec:decorative xmlns:adec="http://schemas.microsoft.com/office/drawing/2017/decorative" val="1"/>
+              </a:ext>
+            </a:extLst>
+          </p:cNvPr>
+          <p:cNvSpPr>
+            <a:spLocks noGrp="1" noRot="1" noChangeAspect="1" noMove="1" noResize="1" noEditPoints="1" noAdjustHandles="1" noChangeArrowheads="1" noChangeShapeType="1" noTextEdit="1"/>
+          </p:cNvSpPr>
+          <p:nvPr>
+            <p:extLst>
+              <p:ext uri="{386F3935-93C4-4BCD-93E2-E3B085C9AB24}">
+                <p16:designElem xmlns:p16="http://schemas.microsoft.com/office/powerpoint/2015/main" val="1"/>
+              </p:ext>
+            </p:extLst>
+          </p:nvPr>
+        </p:nvSpPr>
+        <p:spPr>
+          <a:xfrm>
+            <a:off x="0" y="0"/>
+            <a:ext cx="9756601" cy="6858000"/>
+          </a:xfrm>
+          <a:prstGeom prst="rect">
+            <a:avLst/>
+          </a:prstGeom>
+          <a:gradFill>
+            <a:gsLst>
+              <a:gs pos="58000">
+                <a:schemeClr val="bg1"/>
+              </a:gs>
+              <a:gs pos="35000">
+                <a:schemeClr val="bg1">
+                  <a:alpha val="79000"/>
+                </a:schemeClr>
+              </a:gs>
+              <a:gs pos="19000">
+                <a:schemeClr val="bg1">
+                  <a:alpha val="38000"/>
+                </a:schemeClr>
+              </a:gs>
+              <a:gs pos="0">
+                <a:schemeClr val="bg1">
+                  <a:alpha val="0"/>
+                </a:schemeClr>
+              </a:gs>
+              <a:gs pos="100000">
+                <a:schemeClr val="bg1"/>
+              </a:gs>
+            </a:gsLst>
+            <a:lin ang="10800000" scaled="0"/>
+          </a:gradFill>
+          <a:ln>
+            <a:noFill/>
+          </a:ln>
+        </p:spPr>
+        <p:style>
+          <a:lnRef idx="2">
+            <a:schemeClr val="accent1">
+              <a:shade val="50000"/>
+            </a:schemeClr>
+          </a:lnRef>
+          <a:fillRef idx="1">
+            <a:schemeClr val="accent1"/>
+          </a:fillRef>
+          <a:effectRef idx="0">
+            <a:schemeClr val="accent1"/>
+          </a:effectRef>
+          <a:fontRef idx="minor">
+            <a:schemeClr val="lt1"/>
+          </a:fontRef>
+        </p:style>
+        <p:txBody>
+          <a:bodyPr rtlCol="0" anchor="ctr"/>
+          <a:lstStyle/>
+          <a:p>
+            <a:pPr algn="ctr"/>
+            <a:endParaRPr lang="en-US" dirty="0"/>
+          </a:p>
+        </p:txBody>
+      </p:sp>
+      <p:sp>
+        <p:nvSpPr>
+          <p:cNvPr id="2" name="Título 1">
+            <a:extLst>
+              <a:ext uri="{FF2B5EF4-FFF2-40B4-BE49-F238E27FC236}">
+                <a16:creationId xmlns:a16="http://schemas.microsoft.com/office/drawing/2014/main" id="{D1411ABE-C5F9-AA0D-328B-9C4D1253810D}"/>
+              </a:ext>
+            </a:extLst>
+          </p:cNvPr>
+          <p:cNvSpPr>
+            <a:spLocks noGrp="1"/>
+          </p:cNvSpPr>
+          <p:nvPr>
+            <p:ph type="title"/>
+          </p:nvPr>
+        </p:nvSpPr>
+        <p:spPr>
+          <a:xfrm>
+            <a:off x="477981" y="1122363"/>
+            <a:ext cx="4023360" cy="3204134"/>
+          </a:xfrm>
+        </p:spPr>
+        <p:txBody>
+          <a:bodyPr vert="horz" lIns="91440" tIns="45720" rIns="91440" bIns="45720" rtlCol="0" anchor="b">
+            <a:normAutofit/>
+          </a:bodyPr>
+          <a:lstStyle/>
+          <a:p>
+            <a:r>
+              <a:rPr lang="en-US" sz="4800"/>
+              <a:t>Questions?</a:t>
+            </a:r>
+          </a:p>
+        </p:txBody>
+      </p:sp>
+      <p:sp>
+        <p:nvSpPr>
+          <p:cNvPr id="22" name="Rectangle 21">
+            <a:extLst>
+              <a:ext uri="{FF2B5EF4-FFF2-40B4-BE49-F238E27FC236}">
+                <a16:creationId xmlns:a16="http://schemas.microsoft.com/office/drawing/2014/main" id="{AF2F604E-43BE-4DC3-B983-E071523364F8}"/>
+              </a:ext>
+              <a:ext uri="{C183D7F6-B498-43B3-948B-1728B52AA6E4}">
+                <adec:decorative xmlns:adec="http://schemas.microsoft.com/office/drawing/2017/decorative" val="1"/>
+              </a:ext>
+            </a:extLst>
+          </p:cNvPr>
+          <p:cNvSpPr>
+            <a:spLocks noGrp="1" noRot="1" noChangeAspect="1" noMove="1" noResize="1" noEditPoints="1" noAdjustHandles="1" noChangeArrowheads="1" noChangeShapeType="1" noTextEdit="1"/>
+          </p:cNvSpPr>
+          <p:nvPr>
+            <p:extLst>
+              <p:ext uri="{386F3935-93C4-4BCD-93E2-E3B085C9AB24}">
+                <p16:designElem xmlns:p16="http://schemas.microsoft.com/office/powerpoint/2015/main" val="1"/>
+              </p:ext>
+            </p:extLst>
+          </p:nvPr>
+        </p:nvSpPr>
+        <p:spPr>
+          <a:xfrm rot="5400000">
+            <a:off x="759921" y="346791"/>
+            <a:ext cx="146304" cy="704088"/>
+          </a:xfrm>
+          <a:prstGeom prst="rect">
+            <a:avLst/>
+          </a:prstGeom>
+          <a:solidFill>
+            <a:schemeClr val="accent2"/>
+          </a:solidFill>
+          <a:ln>
+            <a:noFill/>
+          </a:ln>
+        </p:spPr>
+        <p:style>
+          <a:lnRef idx="2">
+            <a:schemeClr val="accent1">
+              <a:shade val="50000"/>
+            </a:schemeClr>
+          </a:lnRef>
+          <a:fillRef idx="1">
+            <a:schemeClr val="accent1"/>
+          </a:fillRef>
+          <a:effectRef idx="0">
+            <a:schemeClr val="accent1"/>
+          </a:effectRef>
+          <a:fontRef idx="minor">
+            <a:schemeClr val="lt1"/>
+          </a:fontRef>
+        </p:style>
+        <p:txBody>
+          <a:bodyPr rtlCol="0" anchor="ctr"/>
+          <a:lstStyle/>
+          <a:p>
+            <a:pPr algn="ctr"/>
+            <a:endParaRPr lang="en-US">
+              <a:solidFill>
+                <a:prstClr val="white"/>
+              </a:solidFill>
+              <a:latin typeface="Calibri" panose="020F0502020204030204"/>
+            </a:endParaRPr>
+          </a:p>
+        </p:txBody>
+      </p:sp>
+      <p:sp>
+        <p:nvSpPr>
+          <p:cNvPr id="24" name="Rectangle 23">
+            <a:extLst>
+              <a:ext uri="{FF2B5EF4-FFF2-40B4-BE49-F238E27FC236}">
+                <a16:creationId xmlns:a16="http://schemas.microsoft.com/office/drawing/2014/main" id="{08C9B587-E65E-4B52-B37C-ABEBB6E87928}"/>
+              </a:ext>
+              <a:ext uri="{C183D7F6-B498-43B3-948B-1728B52AA6E4}">
+                <adec:decorative xmlns:adec="http://schemas.microsoft.com/office/drawing/2017/decorative" val="1"/>
+              </a:ext>
+            </a:extLst>
+          </p:cNvPr>
+          <p:cNvSpPr>
+            <a:spLocks noGrp="1" noRot="1" noChangeAspect="1" noMove="1" noResize="1" noEditPoints="1" noAdjustHandles="1" noChangeArrowheads="1" noChangeShapeType="1" noTextEdit="1"/>
+          </p:cNvSpPr>
+          <p:nvPr>
+            <p:extLst>
+              <p:ext uri="{386F3935-93C4-4BCD-93E2-E3B085C9AB24}">
+                <p16:designElem xmlns:p16="http://schemas.microsoft.com/office/powerpoint/2015/main" val="1"/>
+              </p:ext>
+            </p:extLst>
+          </p:nvPr>
+        </p:nvSpPr>
+        <p:spPr>
+          <a:xfrm>
+            <a:off x="481029" y="4546920"/>
+            <a:ext cx="3977640" cy="18288"/>
+          </a:xfrm>
+          <a:prstGeom prst="rect">
+            <a:avLst/>
+          </a:prstGeom>
+          <a:solidFill>
+            <a:srgbClr val="D5D5D5"/>
+          </a:solidFill>
+          <a:ln w="3175">
+            <a:noFill/>
+          </a:ln>
+          <a:effectLst/>
+        </p:spPr>
+        <p:style>
+          <a:lnRef idx="2">
+            <a:schemeClr val="accent1">
+              <a:shade val="50000"/>
+            </a:schemeClr>
+          </a:lnRef>
+          <a:fillRef idx="1">
+            <a:schemeClr val="accent1"/>
+          </a:fillRef>
+          <a:effectRef idx="0">
+            <a:schemeClr val="accent1"/>
+          </a:effectRef>
+          <a:fontRef idx="minor">
+            <a:schemeClr val="lt1"/>
+          </a:fontRef>
+        </p:style>
+        <p:txBody>
+          <a:bodyPr rtlCol="0" anchor="ctr"/>
+          <a:lstStyle/>
+          <a:p>
+            <a:pPr marL="0" marR="0" lvl="0" indent="0" algn="ctr" defTabSz="914400" rtl="0" eaLnBrk="1" fontAlgn="auto" latinLnBrk="0" hangingPunct="1">
+              <a:lnSpc>
+                <a:spcPct val="100000"/>
+              </a:lnSpc>
+              <a:spcBef>
+                <a:spcPts val="0"/>
+              </a:spcBef>
+              <a:spcAft>
+                <a:spcPts val="0"/>
+              </a:spcAft>
+              <a:buClrTx/>
+              <a:buSzTx/>
+              <a:buFontTx/>
+              <a:buNone/>
+              <a:tabLst/>
+              <a:defRPr/>
+            </a:pPr>
+            <a:endParaRPr kumimoji="0" lang="en-US" sz="1800" b="0" i="0" u="none" strike="noStrike" kern="1200" cap="none" spc="0" normalizeH="0" baseline="0" noProof="0">
+              <a:ln>
+                <a:noFill/>
+              </a:ln>
+              <a:solidFill>
+                <a:prstClr val="white"/>
+              </a:solidFill>
+              <a:effectLst/>
+              <a:uLnTx/>
+              <a:uFillTx/>
+              <a:latin typeface="Calibri" panose="020F0502020204030204"/>
+              <a:ea typeface="+mn-ea"/>
+              <a:cs typeface="+mn-cs"/>
+            </a:endParaRPr>
+          </a:p>
+        </p:txBody>
+      </p:sp>
+      <p:sp>
+        <p:nvSpPr>
+          <p:cNvPr id="4" name="Marcador de Posição da Data 3">
+            <a:extLst>
+              <a:ext uri="{FF2B5EF4-FFF2-40B4-BE49-F238E27FC236}">
+                <a16:creationId xmlns:a16="http://schemas.microsoft.com/office/drawing/2014/main" id="{BC712A31-6940-2DFD-CE84-DF5642EA8A0A}"/>
+              </a:ext>
+            </a:extLst>
+          </p:cNvPr>
+          <p:cNvSpPr>
+            <a:spLocks noGrp="1"/>
+          </p:cNvSpPr>
+          <p:nvPr>
+            <p:ph type="dt" sz="half" idx="10"/>
+          </p:nvPr>
+        </p:nvSpPr>
+        <p:spPr>
+          <a:xfrm>
+            <a:off x="477981" y="6356350"/>
+            <a:ext cx="1214339" cy="365125"/>
+          </a:xfrm>
+        </p:spPr>
+        <p:txBody>
+          <a:bodyPr vert="horz" lIns="91440" tIns="45720" rIns="91440" bIns="45720" rtlCol="0" anchor="ctr">
+            <a:normAutofit/>
+          </a:bodyPr>
+          <a:lstStyle/>
+          <a:p>
+            <a:pPr>
+              <a:spcAft>
+                <a:spcPts val="600"/>
+              </a:spcAft>
+              <a:defRPr/>
+            </a:pPr>
+            <a:fld id="{678963C3-A4A7-490D-BC7C-0C1727FA616F}" type="datetime1">
+              <a:rPr lang="en-US">
+                <a:solidFill>
+                  <a:schemeClr val="tx1">
+                    <a:lumMod val="50000"/>
+                    <a:lumOff val="50000"/>
+                  </a:schemeClr>
+                </a:solidFill>
+                <a:latin typeface="Calibri" panose="020F0502020204030204"/>
+              </a:rPr>
+              <a:pPr>
+                <a:spcAft>
+                  <a:spcPts val="600"/>
+                </a:spcAft>
+                <a:defRPr/>
+              </a:pPr>
+              <a:t>1/7/2025</a:t>
+            </a:fld>
+            <a:endParaRPr lang="en-US">
+              <a:solidFill>
+                <a:schemeClr val="tx1">
+                  <a:lumMod val="50000"/>
+                  <a:lumOff val="50000"/>
+                </a:schemeClr>
+              </a:solidFill>
+              <a:latin typeface="Calibri" panose="020F0502020204030204"/>
+            </a:endParaRPr>
+          </a:p>
+        </p:txBody>
+      </p:sp>
+      <p:sp>
+        <p:nvSpPr>
+          <p:cNvPr id="5" name="Marcador de Posição do Número do Diapositivo 4">
+            <a:extLst>
+              <a:ext uri="{FF2B5EF4-FFF2-40B4-BE49-F238E27FC236}">
+                <a16:creationId xmlns:a16="http://schemas.microsoft.com/office/drawing/2014/main" id="{2A897D6D-9A87-4731-5A09-2CE7D18F3FE4}"/>
+              </a:ext>
+            </a:extLst>
+          </p:cNvPr>
+          <p:cNvSpPr>
+            <a:spLocks noGrp="1"/>
+          </p:cNvSpPr>
+          <p:nvPr>
+            <p:ph type="sldNum" sz="quarter" idx="12"/>
+          </p:nvPr>
+        </p:nvSpPr>
+        <p:spPr>
+          <a:xfrm>
+            <a:off x="8970819" y="6356350"/>
+            <a:ext cx="2743200" cy="365125"/>
+          </a:xfrm>
+        </p:spPr>
+        <p:txBody>
+          <a:bodyPr vert="horz" lIns="91440" tIns="45720" rIns="91440" bIns="45720" rtlCol="0" anchor="ctr">
+            <a:normAutofit/>
+          </a:bodyPr>
+          <a:lstStyle/>
+          <a:p>
+            <a:pPr>
+              <a:spcAft>
+                <a:spcPts val="600"/>
+              </a:spcAft>
+              <a:defRPr/>
+            </a:pPr>
+            <a:fld id="{7CE2990B-2BD6-473B-898B-9D3C32B6543D}" type="slidenum">
+              <a:rPr lang="en-US">
+                <a:solidFill>
+                  <a:schemeClr val="bg1"/>
+                </a:solidFill>
+                <a:latin typeface="Calibri" panose="020F0502020204030204"/>
+              </a:rPr>
+              <a:pPr>
+                <a:spcAft>
+                  <a:spcPts val="600"/>
+                </a:spcAft>
+                <a:defRPr/>
+              </a:pPr>
+              <a:t>13</a:t>
+            </a:fld>
+            <a:endParaRPr lang="en-US">
+              <a:solidFill>
+                <a:schemeClr val="bg1"/>
+              </a:solidFill>
+              <a:latin typeface="Calibri" panose="020F0502020204030204"/>
+            </a:endParaRPr>
+          </a:p>
+        </p:txBody>
+      </p:sp>
+    </p:spTree>
+    <p:extLst>
+      <p:ext uri="{BB962C8B-B14F-4D97-AF65-F5344CB8AC3E}">
+        <p14:creationId xmlns:p14="http://schemas.microsoft.com/office/powerpoint/2010/main" val="3651749"/>
       </p:ext>
     </p:extLst>
   </p:cSld>
@@ -18366,7 +20128,7 @@
           <a:p>
             <a:fld id="{E2EF3061-6619-4689-9D6D-9C470E2125D9}" type="datetime1">
               <a:rPr lang="pt-PT" smtClean="0"/>
-              <a:t>06/01/2025</a:t>
+              <a:t>07/01/2025</a:t>
             </a:fld>
             <a:endParaRPr lang="en-US"/>
           </a:p>
@@ -18885,7 +20647,7 @@
                   <a:spcPts val="600"/>
                 </a:spcAft>
               </a:pPr>
-              <a:t>06/01/2025</a:t>
+              <a:t>07/01/2025</a:t>
             </a:fld>
             <a:endParaRPr lang="en-US">
               <a:solidFill>
@@ -19276,7 +21038,7 @@
                   <a:spcPts val="600"/>
                 </a:spcAft>
               </a:pPr>
-              <a:t>06/01/2025</a:t>
+              <a:t>07/01/2025</a:t>
             </a:fld>
             <a:endParaRPr lang="en-US">
               <a:solidFill>
@@ -19992,7 +21754,7 @@
                   </a:schemeClr>
                 </a:solidFill>
               </a:rPr>
-              <a:t>06/01/2025</a:t>
+              <a:t>07/01/2025</a:t>
             </a:fld>
             <a:endParaRPr lang="en-US">
               <a:solidFill>
@@ -20076,6 +21838,1216 @@
 </file>
 
 <file path=ppt/slides/slide6.xml><?xml version="1.0" encoding="utf-8"?>
+<p:sld xmlns:a="http://schemas.openxmlformats.org/drawingml/2006/main" xmlns:r="http://schemas.openxmlformats.org/officeDocument/2006/relationships" xmlns:p="http://schemas.openxmlformats.org/presentationml/2006/main">
+  <p:cSld>
+    <p:bg>
+      <p:bgPr>
+        <a:solidFill>
+          <a:schemeClr val="bg1"/>
+        </a:solidFill>
+        <a:effectLst/>
+      </p:bgPr>
+    </p:bg>
+    <p:spTree>
+      <p:nvGrpSpPr>
+        <p:cNvPr id="1" name="">
+          <a:extLst>
+            <a:ext uri="{FF2B5EF4-FFF2-40B4-BE49-F238E27FC236}">
+              <a16:creationId xmlns:a16="http://schemas.microsoft.com/office/drawing/2014/main" id="{BE4EC437-D1E1-5FD5-DCA6-6AA23D5E99FB}"/>
+            </a:ext>
+          </a:extLst>
+        </p:cNvPr>
+        <p:cNvGrpSpPr/>
+        <p:nvPr/>
+      </p:nvGrpSpPr>
+      <p:grpSpPr>
+        <a:xfrm>
+          <a:off x="0" y="0"/>
+          <a:ext cx="0" cy="0"/>
+          <a:chOff x="0" y="0"/>
+          <a:chExt cx="0" cy="0"/>
+        </a:xfrm>
+      </p:grpSpPr>
+      <p:sp useBgFill="1">
+        <p:nvSpPr>
+          <p:cNvPr id="24" name="Rectangle 23">
+            <a:extLst>
+              <a:ext uri="{FF2B5EF4-FFF2-40B4-BE49-F238E27FC236}">
+                <a16:creationId xmlns:a16="http://schemas.microsoft.com/office/drawing/2014/main" id="{84ECDE7A-6944-466D-8FFE-149A29BA6BAE}"/>
+              </a:ext>
+              <a:ext uri="{C183D7F6-B498-43B3-948B-1728B52AA6E4}">
+                <adec:decorative xmlns:adec="http://schemas.microsoft.com/office/drawing/2017/decorative" val="1"/>
+              </a:ext>
+            </a:extLst>
+          </p:cNvPr>
+          <p:cNvSpPr>
+            <a:spLocks noGrp="1" noRot="1" noChangeAspect="1" noMove="1" noResize="1" noEditPoints="1" noAdjustHandles="1" noChangeArrowheads="1" noChangeShapeType="1" noTextEdit="1"/>
+          </p:cNvSpPr>
+          <p:nvPr>
+            <p:extLst>
+              <p:ext uri="{386F3935-93C4-4BCD-93E2-E3B085C9AB24}">
+                <p16:designElem xmlns:p16="http://schemas.microsoft.com/office/powerpoint/2015/main" val="1"/>
+              </p:ext>
+            </p:extLst>
+          </p:nvPr>
+        </p:nvSpPr>
+        <p:spPr>
+          <a:xfrm>
+            <a:off x="0" y="0"/>
+            <a:ext cx="12192000" cy="6858000"/>
+          </a:xfrm>
+          <a:prstGeom prst="rect">
+            <a:avLst/>
+          </a:prstGeom>
+          <a:ln>
+            <a:noFill/>
+          </a:ln>
+        </p:spPr>
+        <p:style>
+          <a:lnRef idx="2">
+            <a:schemeClr val="accent1">
+              <a:shade val="50000"/>
+            </a:schemeClr>
+          </a:lnRef>
+          <a:fillRef idx="1">
+            <a:schemeClr val="accent1"/>
+          </a:fillRef>
+          <a:effectRef idx="0">
+            <a:schemeClr val="accent1"/>
+          </a:effectRef>
+          <a:fontRef idx="minor">
+            <a:schemeClr val="lt1"/>
+          </a:fontRef>
+        </p:style>
+        <p:txBody>
+          <a:bodyPr rtlCol="0" anchor="ctr"/>
+          <a:lstStyle/>
+          <a:p>
+            <a:pPr algn="ctr"/>
+            <a:endParaRPr lang="en-US"/>
+          </a:p>
+        </p:txBody>
+      </p:sp>
+      <p:sp useBgFill="1">
+        <p:nvSpPr>
+          <p:cNvPr id="26" name="Rectangle 25">
+            <a:extLst>
+              <a:ext uri="{FF2B5EF4-FFF2-40B4-BE49-F238E27FC236}">
+                <a16:creationId xmlns:a16="http://schemas.microsoft.com/office/drawing/2014/main" id="{B3420082-9415-44EC-802E-C77D71D59C57}"/>
+              </a:ext>
+              <a:ext uri="{C183D7F6-B498-43B3-948B-1728B52AA6E4}">
+                <adec:decorative xmlns:adec="http://schemas.microsoft.com/office/drawing/2017/decorative" val="1"/>
+              </a:ext>
+            </a:extLst>
+          </p:cNvPr>
+          <p:cNvSpPr>
+            <a:spLocks noGrp="1" noRot="1" noChangeAspect="1" noMove="1" noResize="1" noEditPoints="1" noAdjustHandles="1" noChangeArrowheads="1" noChangeShapeType="1" noTextEdit="1"/>
+          </p:cNvSpPr>
+          <p:nvPr>
+            <p:extLst>
+              <p:ext uri="{386F3935-93C4-4BCD-93E2-E3B085C9AB24}">
+                <p16:designElem xmlns:p16="http://schemas.microsoft.com/office/powerpoint/2015/main" val="1"/>
+              </p:ext>
+            </p:extLst>
+          </p:nvPr>
+        </p:nvSpPr>
+        <p:spPr>
+          <a:xfrm>
+            <a:off x="558209" y="0"/>
+            <a:ext cx="11167447" cy="2018806"/>
+          </a:xfrm>
+          <a:prstGeom prst="rect">
+            <a:avLst/>
+          </a:prstGeom>
+          <a:ln w="12700">
+            <a:solidFill>
+              <a:srgbClr val="E1E1E1"/>
+            </a:solidFill>
+          </a:ln>
+          <a:effectLst>
+            <a:outerShdw blurRad="50800" dist="38100" dir="2700000" algn="tl" rotWithShape="0">
+              <a:schemeClr val="bg1">
+                <a:lumMod val="85000"/>
+                <a:alpha val="50000"/>
+              </a:schemeClr>
+            </a:outerShdw>
+          </a:effectLst>
+        </p:spPr>
+        <p:style>
+          <a:lnRef idx="2">
+            <a:schemeClr val="accent1">
+              <a:shade val="50000"/>
+            </a:schemeClr>
+          </a:lnRef>
+          <a:fillRef idx="1">
+            <a:schemeClr val="accent1"/>
+          </a:fillRef>
+          <a:effectRef idx="0">
+            <a:schemeClr val="accent1"/>
+          </a:effectRef>
+          <a:fontRef idx="minor">
+            <a:schemeClr val="lt1"/>
+          </a:fontRef>
+        </p:style>
+        <p:txBody>
+          <a:bodyPr rtlCol="0" anchor="ctr"/>
+          <a:lstStyle/>
+          <a:p>
+            <a:pPr marL="0" marR="0" lvl="0" indent="0" algn="ctr" defTabSz="914400" rtl="0" eaLnBrk="1" fontAlgn="auto" latinLnBrk="0" hangingPunct="1">
+              <a:lnSpc>
+                <a:spcPct val="100000"/>
+              </a:lnSpc>
+              <a:spcBef>
+                <a:spcPts val="0"/>
+              </a:spcBef>
+              <a:spcAft>
+                <a:spcPts val="0"/>
+              </a:spcAft>
+              <a:buClrTx/>
+              <a:buSzTx/>
+              <a:buFontTx/>
+              <a:buNone/>
+              <a:tabLst/>
+              <a:defRPr/>
+            </a:pPr>
+            <a:endParaRPr kumimoji="0" lang="en-US" sz="1800" b="0" i="0" u="none" strike="noStrike" kern="1200" cap="none" spc="0" normalizeH="0" baseline="0" noProof="0">
+              <a:ln>
+                <a:noFill/>
+              </a:ln>
+              <a:solidFill>
+                <a:prstClr val="white"/>
+              </a:solidFill>
+              <a:effectLst/>
+              <a:uLnTx/>
+              <a:uFillTx/>
+              <a:latin typeface="Calibri" panose="020F0502020204030204"/>
+              <a:ea typeface="+mn-ea"/>
+              <a:cs typeface="+mn-cs"/>
+            </a:endParaRPr>
+          </a:p>
+        </p:txBody>
+      </p:sp>
+      <p:sp useBgFill="1">
+        <p:nvSpPr>
+          <p:cNvPr id="28" name="Rectangle 27">
+            <a:extLst>
+              <a:ext uri="{FF2B5EF4-FFF2-40B4-BE49-F238E27FC236}">
+                <a16:creationId xmlns:a16="http://schemas.microsoft.com/office/drawing/2014/main" id="{55A52C45-1FCB-4636-A80F-2849B8226C01}"/>
+              </a:ext>
+              <a:ext uri="{C183D7F6-B498-43B3-948B-1728B52AA6E4}">
+                <adec:decorative xmlns:adec="http://schemas.microsoft.com/office/drawing/2017/decorative" val="1"/>
+              </a:ext>
+            </a:extLst>
+          </p:cNvPr>
+          <p:cNvSpPr>
+            <a:spLocks noGrp="1" noRot="1" noChangeAspect="1" noMove="1" noResize="1" noEditPoints="1" noAdjustHandles="1" noChangeArrowheads="1" noChangeShapeType="1" noTextEdit="1"/>
+          </p:cNvSpPr>
+          <p:nvPr>
+            <p:extLst>
+              <p:ext uri="{386F3935-93C4-4BCD-93E2-E3B085C9AB24}">
+                <p16:designElem xmlns:p16="http://schemas.microsoft.com/office/powerpoint/2015/main" val="1"/>
+              </p:ext>
+            </p:extLst>
+          </p:nvPr>
+        </p:nvSpPr>
+        <p:spPr>
+          <a:xfrm>
+            <a:off x="566928" y="0"/>
+            <a:ext cx="11155680" cy="2011680"/>
+          </a:xfrm>
+          <a:prstGeom prst="rect">
+            <a:avLst/>
+          </a:prstGeom>
+          <a:ln w="12700">
+            <a:noFill/>
+          </a:ln>
+          <a:effectLst/>
+        </p:spPr>
+        <p:style>
+          <a:lnRef idx="2">
+            <a:schemeClr val="accent1">
+              <a:shade val="50000"/>
+            </a:schemeClr>
+          </a:lnRef>
+          <a:fillRef idx="1">
+            <a:schemeClr val="accent1"/>
+          </a:fillRef>
+          <a:effectRef idx="0">
+            <a:schemeClr val="accent1"/>
+          </a:effectRef>
+          <a:fontRef idx="minor">
+            <a:schemeClr val="lt1"/>
+          </a:fontRef>
+        </p:style>
+        <p:txBody>
+          <a:bodyPr rtlCol="0" anchor="ctr"/>
+          <a:lstStyle/>
+          <a:p>
+            <a:pPr marL="0" marR="0" lvl="0" indent="0" algn="ctr" defTabSz="914400" rtl="0" eaLnBrk="1" fontAlgn="auto" latinLnBrk="0" hangingPunct="1">
+              <a:lnSpc>
+                <a:spcPct val="100000"/>
+              </a:lnSpc>
+              <a:spcBef>
+                <a:spcPts val="0"/>
+              </a:spcBef>
+              <a:spcAft>
+                <a:spcPts val="0"/>
+              </a:spcAft>
+              <a:buClrTx/>
+              <a:buSzTx/>
+              <a:buFontTx/>
+              <a:buNone/>
+              <a:tabLst/>
+              <a:defRPr/>
+            </a:pPr>
+            <a:endParaRPr kumimoji="0" lang="en-US" sz="1800" b="0" i="0" u="none" strike="noStrike" kern="1200" cap="none" spc="0" normalizeH="0" baseline="0" noProof="0">
+              <a:ln>
+                <a:noFill/>
+              </a:ln>
+              <a:solidFill>
+                <a:prstClr val="white"/>
+              </a:solidFill>
+              <a:effectLst/>
+              <a:uLnTx/>
+              <a:uFillTx/>
+              <a:latin typeface="Calibri" panose="020F0502020204030204"/>
+              <a:ea typeface="+mn-ea"/>
+              <a:cs typeface="+mn-cs"/>
+            </a:endParaRPr>
+          </a:p>
+        </p:txBody>
+      </p:sp>
+      <p:sp>
+        <p:nvSpPr>
+          <p:cNvPr id="2" name="Título 1">
+            <a:extLst>
+              <a:ext uri="{FF2B5EF4-FFF2-40B4-BE49-F238E27FC236}">
+                <a16:creationId xmlns:a16="http://schemas.microsoft.com/office/drawing/2014/main" id="{1EF67C6C-3B88-B723-9912-DD1B46C70ED4}"/>
+              </a:ext>
+            </a:extLst>
+          </p:cNvPr>
+          <p:cNvSpPr>
+            <a:spLocks noGrp="1"/>
+          </p:cNvSpPr>
+          <p:nvPr>
+            <p:ph type="title"/>
+          </p:nvPr>
+        </p:nvSpPr>
+        <p:spPr>
+          <a:xfrm>
+            <a:off x="1115568" y="548640"/>
+            <a:ext cx="10168128" cy="1179576"/>
+          </a:xfrm>
+        </p:spPr>
+        <p:txBody>
+          <a:bodyPr>
+            <a:normAutofit/>
+          </a:bodyPr>
+          <a:lstStyle/>
+          <a:p>
+            <a:r>
+              <a:rPr lang="en-US" sz="4000" dirty="0"/>
+              <a:t>RAG Example</a:t>
+            </a:r>
+          </a:p>
+        </p:txBody>
+      </p:sp>
+      <p:sp>
+        <p:nvSpPr>
+          <p:cNvPr id="30" name="Rectangle 29">
+            <a:extLst>
+              <a:ext uri="{FF2B5EF4-FFF2-40B4-BE49-F238E27FC236}">
+                <a16:creationId xmlns:a16="http://schemas.microsoft.com/office/drawing/2014/main" id="{768EB4DD-3704-43AD-92B3-C4E0C6EA92CB}"/>
+              </a:ext>
+              <a:ext uri="{C183D7F6-B498-43B3-948B-1728B52AA6E4}">
+                <adec:decorative xmlns:adec="http://schemas.microsoft.com/office/drawing/2017/decorative" val="1"/>
+              </a:ext>
+            </a:extLst>
+          </p:cNvPr>
+          <p:cNvSpPr>
+            <a:spLocks noGrp="1" noRot="1" noChangeAspect="1" noMove="1" noResize="1" noEditPoints="1" noAdjustHandles="1" noChangeArrowheads="1" noChangeShapeType="1" noTextEdit="1"/>
+          </p:cNvSpPr>
+          <p:nvPr>
+            <p:extLst>
+              <p:ext uri="{386F3935-93C4-4BCD-93E2-E3B085C9AB24}">
+                <p16:designElem xmlns:p16="http://schemas.microsoft.com/office/powerpoint/2015/main" val="1"/>
+              </p:ext>
+            </p:extLst>
+          </p:nvPr>
+        </p:nvSpPr>
+        <p:spPr>
+          <a:xfrm>
+            <a:off x="498834" y="770799"/>
+            <a:ext cx="128016" cy="704088"/>
+          </a:xfrm>
+          <a:prstGeom prst="rect">
+            <a:avLst/>
+          </a:prstGeom>
+          <a:solidFill>
+            <a:schemeClr val="accent2"/>
+          </a:solidFill>
+          <a:ln>
+            <a:noFill/>
+          </a:ln>
+        </p:spPr>
+        <p:style>
+          <a:lnRef idx="2">
+            <a:schemeClr val="accent1">
+              <a:shade val="50000"/>
+            </a:schemeClr>
+          </a:lnRef>
+          <a:fillRef idx="1">
+            <a:schemeClr val="accent1"/>
+          </a:fillRef>
+          <a:effectRef idx="0">
+            <a:schemeClr val="accent1"/>
+          </a:effectRef>
+          <a:fontRef idx="minor">
+            <a:schemeClr val="lt1"/>
+          </a:fontRef>
+        </p:style>
+        <p:txBody>
+          <a:bodyPr rtlCol="0" anchor="ctr"/>
+          <a:lstStyle/>
+          <a:p>
+            <a:pPr marL="0" marR="0" lvl="0" indent="0" algn="ctr" defTabSz="914400" rtl="0" eaLnBrk="1" fontAlgn="auto" latinLnBrk="0" hangingPunct="1">
+              <a:lnSpc>
+                <a:spcPct val="100000"/>
+              </a:lnSpc>
+              <a:spcBef>
+                <a:spcPts val="0"/>
+              </a:spcBef>
+              <a:spcAft>
+                <a:spcPts val="0"/>
+              </a:spcAft>
+              <a:buClrTx/>
+              <a:buSzTx/>
+              <a:buFontTx/>
+              <a:buNone/>
+              <a:tabLst/>
+              <a:defRPr/>
+            </a:pPr>
+            <a:endParaRPr kumimoji="0" lang="en-US" sz="1800" b="0" i="0" u="none" strike="noStrike" kern="1200" cap="none" spc="0" normalizeH="0" baseline="0" noProof="0">
+              <a:ln>
+                <a:noFill/>
+              </a:ln>
+              <a:solidFill>
+                <a:prstClr val="white"/>
+              </a:solidFill>
+              <a:effectLst/>
+              <a:uLnTx/>
+              <a:uFillTx/>
+              <a:latin typeface="Calibri" panose="020F0502020204030204"/>
+              <a:ea typeface="+mn-ea"/>
+              <a:cs typeface="+mn-cs"/>
+            </a:endParaRPr>
+          </a:p>
+        </p:txBody>
+      </p:sp>
+      <p:pic>
+        <p:nvPicPr>
+          <p:cNvPr id="9" name="Marcador de Posição de Conteúdo 8" descr="Uma imagem com texto, captura de ecrã, Tipo de letra&#10;&#10;Descrição gerada automaticamente">
+            <a:extLst>
+              <a:ext uri="{FF2B5EF4-FFF2-40B4-BE49-F238E27FC236}">
+                <a16:creationId xmlns:a16="http://schemas.microsoft.com/office/drawing/2014/main" id="{52F90540-04B7-C318-FF31-EB244ABF5B8A}"/>
+              </a:ext>
+            </a:extLst>
+          </p:cNvPr>
+          <p:cNvPicPr>
+            <a:picLocks noChangeAspect="1"/>
+          </p:cNvPicPr>
+          <p:nvPr/>
+        </p:nvPicPr>
+        <p:blipFill>
+          <a:blip r:embed="rId2">
+            <a:extLst>
+              <a:ext uri="{28A0092B-C50C-407E-A947-70E740481C1C}">
+                <a14:useLocalDpi xmlns:a14="http://schemas.microsoft.com/office/drawing/2010/main" val="0"/>
+              </a:ext>
+            </a:extLst>
+          </a:blip>
+          <a:srcRect t="51" r="2" b="2"/>
+          <a:stretch/>
+        </p:blipFill>
+        <p:spPr>
+          <a:xfrm>
+            <a:off x="2607450" y="2121926"/>
+            <a:ext cx="6812310" cy="4187434"/>
+          </a:xfrm>
+          <a:prstGeom prst="rect">
+            <a:avLst/>
+          </a:prstGeom>
+        </p:spPr>
+      </p:pic>
+      <p:sp>
+        <p:nvSpPr>
+          <p:cNvPr id="4" name="Marcador de Posição da Data 3">
+            <a:extLst>
+              <a:ext uri="{FF2B5EF4-FFF2-40B4-BE49-F238E27FC236}">
+                <a16:creationId xmlns:a16="http://schemas.microsoft.com/office/drawing/2014/main" id="{134980A2-7317-F491-8B9C-ECF19736286D}"/>
+              </a:ext>
+            </a:extLst>
+          </p:cNvPr>
+          <p:cNvSpPr>
+            <a:spLocks noGrp="1"/>
+          </p:cNvSpPr>
+          <p:nvPr>
+            <p:ph type="dt" sz="half" idx="10"/>
+          </p:nvPr>
+        </p:nvSpPr>
+        <p:spPr>
+          <a:xfrm>
+            <a:off x="838200" y="6356350"/>
+            <a:ext cx="2743200" cy="365125"/>
+          </a:xfrm>
+        </p:spPr>
+        <p:txBody>
+          <a:bodyPr>
+            <a:normAutofit/>
+          </a:bodyPr>
+          <a:lstStyle/>
+          <a:p>
+            <a:pPr>
+              <a:spcAft>
+                <a:spcPts val="600"/>
+              </a:spcAft>
+            </a:pPr>
+            <a:fld id="{678963C3-A4A7-490D-BC7C-0C1727FA616F}" type="datetime1">
+              <a:rPr lang="pt-PT">
+                <a:solidFill>
+                  <a:schemeClr val="tx1">
+                    <a:lumMod val="50000"/>
+                    <a:lumOff val="50000"/>
+                  </a:schemeClr>
+                </a:solidFill>
+              </a:rPr>
+              <a:pPr>
+                <a:spcAft>
+                  <a:spcPts val="600"/>
+                </a:spcAft>
+              </a:pPr>
+              <a:t>07/01/2025</a:t>
+            </a:fld>
+            <a:endParaRPr lang="en-US">
+              <a:solidFill>
+                <a:schemeClr val="tx1">
+                  <a:lumMod val="50000"/>
+                  <a:lumOff val="50000"/>
+                </a:schemeClr>
+              </a:solidFill>
+            </a:endParaRPr>
+          </a:p>
+        </p:txBody>
+      </p:sp>
+      <p:sp>
+        <p:nvSpPr>
+          <p:cNvPr id="5" name="Marcador de Posição do Número do Diapositivo 4">
+            <a:extLst>
+              <a:ext uri="{FF2B5EF4-FFF2-40B4-BE49-F238E27FC236}">
+                <a16:creationId xmlns:a16="http://schemas.microsoft.com/office/drawing/2014/main" id="{7FA9D856-31E4-76EE-8B8B-05647C180FF0}"/>
+              </a:ext>
+            </a:extLst>
+          </p:cNvPr>
+          <p:cNvSpPr>
+            <a:spLocks noGrp="1"/>
+          </p:cNvSpPr>
+          <p:nvPr>
+            <p:ph type="sldNum" sz="quarter" idx="12"/>
+          </p:nvPr>
+        </p:nvSpPr>
+        <p:spPr>
+          <a:xfrm>
+            <a:off x="8610600" y="6356350"/>
+            <a:ext cx="2743200" cy="365125"/>
+          </a:xfrm>
+        </p:spPr>
+        <p:txBody>
+          <a:bodyPr>
+            <a:normAutofit/>
+          </a:bodyPr>
+          <a:lstStyle/>
+          <a:p>
+            <a:pPr>
+              <a:spcAft>
+                <a:spcPts val="600"/>
+              </a:spcAft>
+            </a:pPr>
+            <a:fld id="{7CE2990B-2BD6-473B-898B-9D3C32B6543D}" type="slidenum">
+              <a:rPr lang="en-US">
+                <a:solidFill>
+                  <a:schemeClr val="tx1">
+                    <a:lumMod val="50000"/>
+                    <a:lumOff val="50000"/>
+                  </a:schemeClr>
+                </a:solidFill>
+              </a:rPr>
+              <a:pPr>
+                <a:spcAft>
+                  <a:spcPts val="600"/>
+                </a:spcAft>
+              </a:pPr>
+              <a:t>6</a:t>
+            </a:fld>
+            <a:endParaRPr lang="en-US">
+              <a:solidFill>
+                <a:schemeClr val="tx1">
+                  <a:lumMod val="50000"/>
+                  <a:lumOff val="50000"/>
+                </a:schemeClr>
+              </a:solidFill>
+            </a:endParaRPr>
+          </a:p>
+        </p:txBody>
+      </p:sp>
+    </p:spTree>
+    <p:extLst>
+      <p:ext uri="{BB962C8B-B14F-4D97-AF65-F5344CB8AC3E}">
+        <p14:creationId xmlns:p14="http://schemas.microsoft.com/office/powerpoint/2010/main" val="3297851708"/>
+      </p:ext>
+    </p:extLst>
+  </p:cSld>
+  <p:clrMapOvr>
+    <a:masterClrMapping/>
+  </p:clrMapOvr>
+</p:sld>
+</file>
+
+<file path=ppt/slides/slide7.xml><?xml version="1.0" encoding="utf-8"?>
+<p:sld xmlns:a="http://schemas.openxmlformats.org/drawingml/2006/main" xmlns:r="http://schemas.openxmlformats.org/officeDocument/2006/relationships" xmlns:p="http://schemas.openxmlformats.org/presentationml/2006/main">
+  <p:cSld>
+    <p:bg>
+      <p:bgPr>
+        <a:solidFill>
+          <a:schemeClr val="bg1"/>
+        </a:solidFill>
+        <a:effectLst/>
+      </p:bgPr>
+    </p:bg>
+    <p:spTree>
+      <p:nvGrpSpPr>
+        <p:cNvPr id="1" name="">
+          <a:extLst>
+            <a:ext uri="{FF2B5EF4-FFF2-40B4-BE49-F238E27FC236}">
+              <a16:creationId xmlns:a16="http://schemas.microsoft.com/office/drawing/2014/main" id="{242C82D7-D26D-D02B-E87F-DAB8BF1B278B}"/>
+            </a:ext>
+          </a:extLst>
+        </p:cNvPr>
+        <p:cNvGrpSpPr/>
+        <p:nvPr/>
+      </p:nvGrpSpPr>
+      <p:grpSpPr>
+        <a:xfrm>
+          <a:off x="0" y="0"/>
+          <a:ext cx="0" cy="0"/>
+          <a:chOff x="0" y="0"/>
+          <a:chExt cx="0" cy="0"/>
+        </a:xfrm>
+      </p:grpSpPr>
+      <p:sp useBgFill="1">
+        <p:nvSpPr>
+          <p:cNvPr id="24" name="Rectangle 23">
+            <a:extLst>
+              <a:ext uri="{FF2B5EF4-FFF2-40B4-BE49-F238E27FC236}">
+                <a16:creationId xmlns:a16="http://schemas.microsoft.com/office/drawing/2014/main" id="{41CA4B0A-BDF1-D32A-5FC2-5D05BAA6767E}"/>
+              </a:ext>
+              <a:ext uri="{C183D7F6-B498-43B3-948B-1728B52AA6E4}">
+                <adec:decorative xmlns:adec="http://schemas.microsoft.com/office/drawing/2017/decorative" val="1"/>
+              </a:ext>
+            </a:extLst>
+          </p:cNvPr>
+          <p:cNvSpPr>
+            <a:spLocks noGrp="1" noRot="1" noChangeAspect="1" noMove="1" noResize="1" noEditPoints="1" noAdjustHandles="1" noChangeArrowheads="1" noChangeShapeType="1" noTextEdit="1"/>
+          </p:cNvSpPr>
+          <p:nvPr>
+            <p:extLst>
+              <p:ext uri="{386F3935-93C4-4BCD-93E2-E3B085C9AB24}">
+                <p16:designElem xmlns:p16="http://schemas.microsoft.com/office/powerpoint/2015/main" val="1"/>
+              </p:ext>
+            </p:extLst>
+          </p:nvPr>
+        </p:nvSpPr>
+        <p:spPr>
+          <a:xfrm>
+            <a:off x="0" y="0"/>
+            <a:ext cx="12192000" cy="6858000"/>
+          </a:xfrm>
+          <a:prstGeom prst="rect">
+            <a:avLst/>
+          </a:prstGeom>
+          <a:ln>
+            <a:noFill/>
+          </a:ln>
+        </p:spPr>
+        <p:style>
+          <a:lnRef idx="2">
+            <a:schemeClr val="accent1">
+              <a:shade val="50000"/>
+            </a:schemeClr>
+          </a:lnRef>
+          <a:fillRef idx="1">
+            <a:schemeClr val="accent1"/>
+          </a:fillRef>
+          <a:effectRef idx="0">
+            <a:schemeClr val="accent1"/>
+          </a:effectRef>
+          <a:fontRef idx="minor">
+            <a:schemeClr val="lt1"/>
+          </a:fontRef>
+        </p:style>
+        <p:txBody>
+          <a:bodyPr rtlCol="0" anchor="ctr"/>
+          <a:lstStyle/>
+          <a:p>
+            <a:pPr algn="ctr"/>
+            <a:endParaRPr lang="en-US"/>
+          </a:p>
+        </p:txBody>
+      </p:sp>
+      <p:sp useBgFill="1">
+        <p:nvSpPr>
+          <p:cNvPr id="26" name="Rectangle 25">
+            <a:extLst>
+              <a:ext uri="{FF2B5EF4-FFF2-40B4-BE49-F238E27FC236}">
+                <a16:creationId xmlns:a16="http://schemas.microsoft.com/office/drawing/2014/main" id="{998B47B9-68E1-A149-FB5B-068D936F7D90}"/>
+              </a:ext>
+              <a:ext uri="{C183D7F6-B498-43B3-948B-1728B52AA6E4}">
+                <adec:decorative xmlns:adec="http://schemas.microsoft.com/office/drawing/2017/decorative" val="1"/>
+              </a:ext>
+            </a:extLst>
+          </p:cNvPr>
+          <p:cNvSpPr>
+            <a:spLocks noGrp="1" noRot="1" noChangeAspect="1" noMove="1" noResize="1" noEditPoints="1" noAdjustHandles="1" noChangeArrowheads="1" noChangeShapeType="1" noTextEdit="1"/>
+          </p:cNvSpPr>
+          <p:nvPr>
+            <p:extLst>
+              <p:ext uri="{386F3935-93C4-4BCD-93E2-E3B085C9AB24}">
+                <p16:designElem xmlns:p16="http://schemas.microsoft.com/office/powerpoint/2015/main" val="1"/>
+              </p:ext>
+            </p:extLst>
+          </p:nvPr>
+        </p:nvSpPr>
+        <p:spPr>
+          <a:xfrm>
+            <a:off x="558209" y="0"/>
+            <a:ext cx="11167447" cy="2018806"/>
+          </a:xfrm>
+          <a:prstGeom prst="rect">
+            <a:avLst/>
+          </a:prstGeom>
+          <a:ln w="12700">
+            <a:solidFill>
+              <a:srgbClr val="E1E1E1"/>
+            </a:solidFill>
+          </a:ln>
+          <a:effectLst>
+            <a:outerShdw blurRad="50800" dist="38100" dir="2700000" algn="tl" rotWithShape="0">
+              <a:schemeClr val="bg1">
+                <a:lumMod val="85000"/>
+                <a:alpha val="50000"/>
+              </a:schemeClr>
+            </a:outerShdw>
+          </a:effectLst>
+        </p:spPr>
+        <p:style>
+          <a:lnRef idx="2">
+            <a:schemeClr val="accent1">
+              <a:shade val="50000"/>
+            </a:schemeClr>
+          </a:lnRef>
+          <a:fillRef idx="1">
+            <a:schemeClr val="accent1"/>
+          </a:fillRef>
+          <a:effectRef idx="0">
+            <a:schemeClr val="accent1"/>
+          </a:effectRef>
+          <a:fontRef idx="minor">
+            <a:schemeClr val="lt1"/>
+          </a:fontRef>
+        </p:style>
+        <p:txBody>
+          <a:bodyPr rtlCol="0" anchor="ctr"/>
+          <a:lstStyle/>
+          <a:p>
+            <a:pPr marL="0" marR="0" lvl="0" indent="0" algn="ctr" defTabSz="914400" rtl="0" eaLnBrk="1" fontAlgn="auto" latinLnBrk="0" hangingPunct="1">
+              <a:lnSpc>
+                <a:spcPct val="100000"/>
+              </a:lnSpc>
+              <a:spcBef>
+                <a:spcPts val="0"/>
+              </a:spcBef>
+              <a:spcAft>
+                <a:spcPts val="0"/>
+              </a:spcAft>
+              <a:buClrTx/>
+              <a:buSzTx/>
+              <a:buFontTx/>
+              <a:buNone/>
+              <a:tabLst/>
+              <a:defRPr/>
+            </a:pPr>
+            <a:endParaRPr kumimoji="0" lang="en-US" sz="1800" b="0" i="0" u="none" strike="noStrike" kern="1200" cap="none" spc="0" normalizeH="0" baseline="0" noProof="0">
+              <a:ln>
+                <a:noFill/>
+              </a:ln>
+              <a:solidFill>
+                <a:prstClr val="white"/>
+              </a:solidFill>
+              <a:effectLst/>
+              <a:uLnTx/>
+              <a:uFillTx/>
+              <a:latin typeface="Calibri" panose="020F0502020204030204"/>
+              <a:ea typeface="+mn-ea"/>
+              <a:cs typeface="+mn-cs"/>
+            </a:endParaRPr>
+          </a:p>
+        </p:txBody>
+      </p:sp>
+      <p:sp useBgFill="1">
+        <p:nvSpPr>
+          <p:cNvPr id="28" name="Rectangle 27">
+            <a:extLst>
+              <a:ext uri="{FF2B5EF4-FFF2-40B4-BE49-F238E27FC236}">
+                <a16:creationId xmlns:a16="http://schemas.microsoft.com/office/drawing/2014/main" id="{908B7184-021E-F5C1-3EBF-C14E26F0D52E}"/>
+              </a:ext>
+              <a:ext uri="{C183D7F6-B498-43B3-948B-1728B52AA6E4}">
+                <adec:decorative xmlns:adec="http://schemas.microsoft.com/office/drawing/2017/decorative" val="1"/>
+              </a:ext>
+            </a:extLst>
+          </p:cNvPr>
+          <p:cNvSpPr>
+            <a:spLocks noGrp="1" noRot="1" noChangeAspect="1" noMove="1" noResize="1" noEditPoints="1" noAdjustHandles="1" noChangeArrowheads="1" noChangeShapeType="1" noTextEdit="1"/>
+          </p:cNvSpPr>
+          <p:nvPr>
+            <p:extLst>
+              <p:ext uri="{386F3935-93C4-4BCD-93E2-E3B085C9AB24}">
+                <p16:designElem xmlns:p16="http://schemas.microsoft.com/office/powerpoint/2015/main" val="1"/>
+              </p:ext>
+            </p:extLst>
+          </p:nvPr>
+        </p:nvSpPr>
+        <p:spPr>
+          <a:xfrm>
+            <a:off x="566928" y="0"/>
+            <a:ext cx="11155680" cy="2011680"/>
+          </a:xfrm>
+          <a:prstGeom prst="rect">
+            <a:avLst/>
+          </a:prstGeom>
+          <a:ln w="12700">
+            <a:noFill/>
+          </a:ln>
+          <a:effectLst/>
+        </p:spPr>
+        <p:style>
+          <a:lnRef idx="2">
+            <a:schemeClr val="accent1">
+              <a:shade val="50000"/>
+            </a:schemeClr>
+          </a:lnRef>
+          <a:fillRef idx="1">
+            <a:schemeClr val="accent1"/>
+          </a:fillRef>
+          <a:effectRef idx="0">
+            <a:schemeClr val="accent1"/>
+          </a:effectRef>
+          <a:fontRef idx="minor">
+            <a:schemeClr val="lt1"/>
+          </a:fontRef>
+        </p:style>
+        <p:txBody>
+          <a:bodyPr rtlCol="0" anchor="ctr"/>
+          <a:lstStyle/>
+          <a:p>
+            <a:pPr marL="0" marR="0" lvl="0" indent="0" algn="ctr" defTabSz="914400" rtl="0" eaLnBrk="1" fontAlgn="auto" latinLnBrk="0" hangingPunct="1">
+              <a:lnSpc>
+                <a:spcPct val="100000"/>
+              </a:lnSpc>
+              <a:spcBef>
+                <a:spcPts val="0"/>
+              </a:spcBef>
+              <a:spcAft>
+                <a:spcPts val="0"/>
+              </a:spcAft>
+              <a:buClrTx/>
+              <a:buSzTx/>
+              <a:buFontTx/>
+              <a:buNone/>
+              <a:tabLst/>
+              <a:defRPr/>
+            </a:pPr>
+            <a:endParaRPr kumimoji="0" lang="en-US" sz="1800" b="0" i="0" u="none" strike="noStrike" kern="1200" cap="none" spc="0" normalizeH="0" baseline="0" noProof="0">
+              <a:ln>
+                <a:noFill/>
+              </a:ln>
+              <a:solidFill>
+                <a:prstClr val="white"/>
+              </a:solidFill>
+              <a:effectLst/>
+              <a:uLnTx/>
+              <a:uFillTx/>
+              <a:latin typeface="Calibri" panose="020F0502020204030204"/>
+              <a:ea typeface="+mn-ea"/>
+              <a:cs typeface="+mn-cs"/>
+            </a:endParaRPr>
+          </a:p>
+        </p:txBody>
+      </p:sp>
+      <p:sp>
+        <p:nvSpPr>
+          <p:cNvPr id="2" name="Título 1">
+            <a:extLst>
+              <a:ext uri="{FF2B5EF4-FFF2-40B4-BE49-F238E27FC236}">
+                <a16:creationId xmlns:a16="http://schemas.microsoft.com/office/drawing/2014/main" id="{366C0B40-354E-9157-DE5E-01BF2CED5021}"/>
+              </a:ext>
+            </a:extLst>
+          </p:cNvPr>
+          <p:cNvSpPr>
+            <a:spLocks noGrp="1"/>
+          </p:cNvSpPr>
+          <p:nvPr>
+            <p:ph type="title"/>
+          </p:nvPr>
+        </p:nvSpPr>
+        <p:spPr>
+          <a:xfrm>
+            <a:off x="1115568" y="548640"/>
+            <a:ext cx="10168128" cy="1179576"/>
+          </a:xfrm>
+        </p:spPr>
+        <p:txBody>
+          <a:bodyPr>
+            <a:normAutofit/>
+          </a:bodyPr>
+          <a:lstStyle/>
+          <a:p>
+            <a:r>
+              <a:rPr lang="en-US" sz="4000" dirty="0"/>
+              <a:t>RAG Example</a:t>
+            </a:r>
+          </a:p>
+        </p:txBody>
+      </p:sp>
+      <p:sp>
+        <p:nvSpPr>
+          <p:cNvPr id="30" name="Rectangle 29">
+            <a:extLst>
+              <a:ext uri="{FF2B5EF4-FFF2-40B4-BE49-F238E27FC236}">
+                <a16:creationId xmlns:a16="http://schemas.microsoft.com/office/drawing/2014/main" id="{E885B235-9A53-A94D-3ADE-B9C7A895575D}"/>
+              </a:ext>
+              <a:ext uri="{C183D7F6-B498-43B3-948B-1728B52AA6E4}">
+                <adec:decorative xmlns:adec="http://schemas.microsoft.com/office/drawing/2017/decorative" val="1"/>
+              </a:ext>
+            </a:extLst>
+          </p:cNvPr>
+          <p:cNvSpPr>
+            <a:spLocks noGrp="1" noRot="1" noChangeAspect="1" noMove="1" noResize="1" noEditPoints="1" noAdjustHandles="1" noChangeArrowheads="1" noChangeShapeType="1" noTextEdit="1"/>
+          </p:cNvSpPr>
+          <p:nvPr>
+            <p:extLst>
+              <p:ext uri="{386F3935-93C4-4BCD-93E2-E3B085C9AB24}">
+                <p16:designElem xmlns:p16="http://schemas.microsoft.com/office/powerpoint/2015/main" val="1"/>
+              </p:ext>
+            </p:extLst>
+          </p:nvPr>
+        </p:nvSpPr>
+        <p:spPr>
+          <a:xfrm>
+            <a:off x="498834" y="770799"/>
+            <a:ext cx="128016" cy="704088"/>
+          </a:xfrm>
+          <a:prstGeom prst="rect">
+            <a:avLst/>
+          </a:prstGeom>
+          <a:solidFill>
+            <a:schemeClr val="accent2"/>
+          </a:solidFill>
+          <a:ln>
+            <a:noFill/>
+          </a:ln>
+        </p:spPr>
+        <p:style>
+          <a:lnRef idx="2">
+            <a:schemeClr val="accent1">
+              <a:shade val="50000"/>
+            </a:schemeClr>
+          </a:lnRef>
+          <a:fillRef idx="1">
+            <a:schemeClr val="accent1"/>
+          </a:fillRef>
+          <a:effectRef idx="0">
+            <a:schemeClr val="accent1"/>
+          </a:effectRef>
+          <a:fontRef idx="minor">
+            <a:schemeClr val="lt1"/>
+          </a:fontRef>
+        </p:style>
+        <p:txBody>
+          <a:bodyPr rtlCol="0" anchor="ctr"/>
+          <a:lstStyle/>
+          <a:p>
+            <a:pPr marL="0" marR="0" lvl="0" indent="0" algn="ctr" defTabSz="914400" rtl="0" eaLnBrk="1" fontAlgn="auto" latinLnBrk="0" hangingPunct="1">
+              <a:lnSpc>
+                <a:spcPct val="100000"/>
+              </a:lnSpc>
+              <a:spcBef>
+                <a:spcPts val="0"/>
+              </a:spcBef>
+              <a:spcAft>
+                <a:spcPts val="0"/>
+              </a:spcAft>
+              <a:buClrTx/>
+              <a:buSzTx/>
+              <a:buFontTx/>
+              <a:buNone/>
+              <a:tabLst/>
+              <a:defRPr/>
+            </a:pPr>
+            <a:endParaRPr kumimoji="0" lang="en-US" sz="1800" b="0" i="0" u="none" strike="noStrike" kern="1200" cap="none" spc="0" normalizeH="0" baseline="0" noProof="0">
+              <a:ln>
+                <a:noFill/>
+              </a:ln>
+              <a:solidFill>
+                <a:prstClr val="white"/>
+              </a:solidFill>
+              <a:effectLst/>
+              <a:uLnTx/>
+              <a:uFillTx/>
+              <a:latin typeface="Calibri" panose="020F0502020204030204"/>
+              <a:ea typeface="+mn-ea"/>
+              <a:cs typeface="+mn-cs"/>
+            </a:endParaRPr>
+          </a:p>
+        </p:txBody>
+      </p:sp>
+      <p:sp>
+        <p:nvSpPr>
+          <p:cNvPr id="4" name="Marcador de Posição da Data 3">
+            <a:extLst>
+              <a:ext uri="{FF2B5EF4-FFF2-40B4-BE49-F238E27FC236}">
+                <a16:creationId xmlns:a16="http://schemas.microsoft.com/office/drawing/2014/main" id="{1BE59413-81C4-233E-CBEE-7023DF4A3184}"/>
+              </a:ext>
+            </a:extLst>
+          </p:cNvPr>
+          <p:cNvSpPr>
+            <a:spLocks noGrp="1"/>
+          </p:cNvSpPr>
+          <p:nvPr>
+            <p:ph type="dt" sz="half" idx="10"/>
+          </p:nvPr>
+        </p:nvSpPr>
+        <p:spPr>
+          <a:xfrm>
+            <a:off x="838200" y="6356350"/>
+            <a:ext cx="2743200" cy="365125"/>
+          </a:xfrm>
+        </p:spPr>
+        <p:txBody>
+          <a:bodyPr>
+            <a:normAutofit/>
+          </a:bodyPr>
+          <a:lstStyle/>
+          <a:p>
+            <a:pPr>
+              <a:spcAft>
+                <a:spcPts val="600"/>
+              </a:spcAft>
+            </a:pPr>
+            <a:fld id="{678963C3-A4A7-490D-BC7C-0C1727FA616F}" type="datetime1">
+              <a:rPr lang="pt-PT">
+                <a:solidFill>
+                  <a:schemeClr val="tx1">
+                    <a:lumMod val="50000"/>
+                    <a:lumOff val="50000"/>
+                  </a:schemeClr>
+                </a:solidFill>
+              </a:rPr>
+              <a:pPr>
+                <a:spcAft>
+                  <a:spcPts val="600"/>
+                </a:spcAft>
+              </a:pPr>
+              <a:t>07/01/2025</a:t>
+            </a:fld>
+            <a:endParaRPr lang="en-US">
+              <a:solidFill>
+                <a:schemeClr val="tx1">
+                  <a:lumMod val="50000"/>
+                  <a:lumOff val="50000"/>
+                </a:schemeClr>
+              </a:solidFill>
+            </a:endParaRPr>
+          </a:p>
+        </p:txBody>
+      </p:sp>
+      <p:sp>
+        <p:nvSpPr>
+          <p:cNvPr id="5" name="Marcador de Posição do Número do Diapositivo 4">
+            <a:extLst>
+              <a:ext uri="{FF2B5EF4-FFF2-40B4-BE49-F238E27FC236}">
+                <a16:creationId xmlns:a16="http://schemas.microsoft.com/office/drawing/2014/main" id="{41D9654A-EAA3-880A-5AB5-F5708A1BF56C}"/>
+              </a:ext>
+            </a:extLst>
+          </p:cNvPr>
+          <p:cNvSpPr>
+            <a:spLocks noGrp="1"/>
+          </p:cNvSpPr>
+          <p:nvPr>
+            <p:ph type="sldNum" sz="quarter" idx="12"/>
+          </p:nvPr>
+        </p:nvSpPr>
+        <p:spPr>
+          <a:xfrm>
+            <a:off x="8610600" y="6356350"/>
+            <a:ext cx="2743200" cy="365125"/>
+          </a:xfrm>
+        </p:spPr>
+        <p:txBody>
+          <a:bodyPr>
+            <a:normAutofit/>
+          </a:bodyPr>
+          <a:lstStyle/>
+          <a:p>
+            <a:pPr>
+              <a:spcAft>
+                <a:spcPts val="600"/>
+              </a:spcAft>
+            </a:pPr>
+            <a:fld id="{7CE2990B-2BD6-473B-898B-9D3C32B6543D}" type="slidenum">
+              <a:rPr lang="en-US">
+                <a:solidFill>
+                  <a:schemeClr val="tx1">
+                    <a:lumMod val="50000"/>
+                    <a:lumOff val="50000"/>
+                  </a:schemeClr>
+                </a:solidFill>
+              </a:rPr>
+              <a:pPr>
+                <a:spcAft>
+                  <a:spcPts val="600"/>
+                </a:spcAft>
+              </a:pPr>
+              <a:t>7</a:t>
+            </a:fld>
+            <a:endParaRPr lang="en-US">
+              <a:solidFill>
+                <a:schemeClr val="tx1">
+                  <a:lumMod val="50000"/>
+                  <a:lumOff val="50000"/>
+                </a:schemeClr>
+              </a:solidFill>
+            </a:endParaRPr>
+          </a:p>
+        </p:txBody>
+      </p:sp>
+      <p:sp>
+        <p:nvSpPr>
+          <p:cNvPr id="11" name="CaixaDeTexto 10">
+            <a:extLst>
+              <a:ext uri="{FF2B5EF4-FFF2-40B4-BE49-F238E27FC236}">
+                <a16:creationId xmlns:a16="http://schemas.microsoft.com/office/drawing/2014/main" id="{125FF264-5543-F9CA-106D-3B91D4CEC193}"/>
+              </a:ext>
+            </a:extLst>
+          </p:cNvPr>
+          <p:cNvSpPr txBox="1"/>
+          <p:nvPr/>
+        </p:nvSpPr>
+        <p:spPr>
+          <a:xfrm>
+            <a:off x="626850" y="6047750"/>
+            <a:ext cx="4508320" cy="261610"/>
+          </a:xfrm>
+          <a:prstGeom prst="rect">
+            <a:avLst/>
+          </a:prstGeom>
+          <a:noFill/>
+        </p:spPr>
+        <p:txBody>
+          <a:bodyPr wrap="square">
+            <a:spAutoFit/>
+          </a:bodyPr>
+          <a:lstStyle/>
+          <a:p>
+            <a:r>
+              <a:rPr lang="en-US" sz="1100" dirty="0"/>
+              <a:t>https://en.wikipedia.org/wiki/2024_United_States_presidential_election</a:t>
+            </a:r>
+          </a:p>
+        </p:txBody>
+      </p:sp>
+      <p:pic>
+        <p:nvPicPr>
+          <p:cNvPr id="17" name="Imagem 16">
+            <a:extLst>
+              <a:ext uri="{FF2B5EF4-FFF2-40B4-BE49-F238E27FC236}">
+                <a16:creationId xmlns:a16="http://schemas.microsoft.com/office/drawing/2014/main" id="{650F0548-9272-A27B-DD71-E8578DF66378}"/>
+              </a:ext>
+            </a:extLst>
+          </p:cNvPr>
+          <p:cNvPicPr>
+            <a:picLocks noChangeAspect="1"/>
+          </p:cNvPicPr>
+          <p:nvPr/>
+        </p:nvPicPr>
+        <p:blipFill>
+          <a:blip r:embed="rId2"/>
+          <a:stretch>
+            <a:fillRect/>
+          </a:stretch>
+        </p:blipFill>
+        <p:spPr>
+          <a:xfrm>
+            <a:off x="7275704" y="2147967"/>
+            <a:ext cx="4508319" cy="4079221"/>
+          </a:xfrm>
+          <a:prstGeom prst="rect">
+            <a:avLst/>
+          </a:prstGeom>
+        </p:spPr>
+      </p:pic>
+      <p:pic>
+        <p:nvPicPr>
+          <p:cNvPr id="19" name="Imagem 18">
+            <a:extLst>
+              <a:ext uri="{FF2B5EF4-FFF2-40B4-BE49-F238E27FC236}">
+                <a16:creationId xmlns:a16="http://schemas.microsoft.com/office/drawing/2014/main" id="{9D26B6EB-ED4C-5215-823F-51579706B3D1}"/>
+              </a:ext>
+            </a:extLst>
+          </p:cNvPr>
+          <p:cNvPicPr>
+            <a:picLocks noChangeAspect="1"/>
+          </p:cNvPicPr>
+          <p:nvPr/>
+        </p:nvPicPr>
+        <p:blipFill>
+          <a:blip r:embed="rId3"/>
+          <a:stretch>
+            <a:fillRect/>
+          </a:stretch>
+        </p:blipFill>
+        <p:spPr>
+          <a:xfrm>
+            <a:off x="626850" y="2273205"/>
+            <a:ext cx="5057633" cy="3765392"/>
+          </a:xfrm>
+          <a:prstGeom prst="rect">
+            <a:avLst/>
+          </a:prstGeom>
+        </p:spPr>
+      </p:pic>
+    </p:spTree>
+    <p:extLst>
+      <p:ext uri="{BB962C8B-B14F-4D97-AF65-F5344CB8AC3E}">
+        <p14:creationId xmlns:p14="http://schemas.microsoft.com/office/powerpoint/2010/main" val="1380006923"/>
+      </p:ext>
+    </p:extLst>
+  </p:cSld>
+  <p:clrMapOvr>
+    <a:masterClrMapping/>
+  </p:clrMapOvr>
+</p:sld>
+</file>
+
+<file path=ppt/slides/slide8.xml><?xml version="1.0" encoding="utf-8"?>
 <p:sld xmlns:a="http://schemas.openxmlformats.org/drawingml/2006/main" xmlns:r="http://schemas.openxmlformats.org/officeDocument/2006/relationships" xmlns:p="http://schemas.openxmlformats.org/presentationml/2006/main">
   <p:cSld>
     <p:bg>
@@ -20556,7 +23528,7 @@
                   <a:spcPts val="600"/>
                 </a:spcAft>
               </a:pPr>
-              <a:t>06/01/2025</a:t>
+              <a:t>07/01/2025</a:t>
             </a:fld>
             <a:endParaRPr lang="en-US"/>
           </a:p>
@@ -20606,7 +23578,7 @@
                   <a:spcPts val="600"/>
                 </a:spcAft>
               </a:pPr>
-              <a:t>6</a:t>
+              <a:t>8</a:t>
             </a:fld>
             <a:endParaRPr lang="en-US">
               <a:solidFill>
@@ -20694,7 +23666,7 @@
 </p:sld>
 </file>
 
-<file path=ppt/slides/slide7.xml><?xml version="1.0" encoding="utf-8"?>
+<file path=ppt/slides/slide9.xml><?xml version="1.0" encoding="utf-8"?>
 <p:sld xmlns:a="http://schemas.openxmlformats.org/drawingml/2006/main" xmlns:r="http://schemas.openxmlformats.org/officeDocument/2006/relationships" xmlns:p="http://schemas.openxmlformats.org/presentationml/2006/main">
   <p:cSld>
     <p:bg>
@@ -20886,7 +23858,7 @@
           <a:p>
             <a:r>
               <a:rPr lang="en-US" sz="2000" dirty="0"/>
-              <a:t>Reduced Hallucination</a:t>
+              <a:t>Reduced LLMs Hallucinations</a:t>
             </a:r>
           </a:p>
           <a:p>
@@ -21063,7 +24035,7 @@
                   <a:spcPts val="600"/>
                 </a:spcAft>
               </a:pPr>
-              <a:t>06/01/2025</a:t>
+              <a:t>07/01/2025</a:t>
             </a:fld>
             <a:endParaRPr lang="en-US">
               <a:solidFill>
@@ -21115,7 +24087,7 @@
                   <a:spcPts val="600"/>
                 </a:spcAft>
               </a:pPr>
-              <a:t>7</a:t>
+              <a:t>9</a:t>
             </a:fld>
             <a:endParaRPr lang="en-US"/>
           </a:p>
@@ -21125,1234 +24097,6 @@
     <p:extLst>
       <p:ext uri="{BB962C8B-B14F-4D97-AF65-F5344CB8AC3E}">
         <p14:creationId xmlns:p14="http://schemas.microsoft.com/office/powerpoint/2010/main" val="378954944"/>
-      </p:ext>
-    </p:extLst>
-  </p:cSld>
-  <p:clrMapOvr>
-    <a:masterClrMapping/>
-  </p:clrMapOvr>
-</p:sld>
-</file>
-
-<file path=ppt/slides/slide8.xml><?xml version="1.0" encoding="utf-8"?>
-<p:sld xmlns:a="http://schemas.openxmlformats.org/drawingml/2006/main" xmlns:r="http://schemas.openxmlformats.org/officeDocument/2006/relationships" xmlns:p="http://schemas.openxmlformats.org/presentationml/2006/main">
-  <p:cSld>
-    <p:bg>
-      <p:bgPr>
-        <a:solidFill>
-          <a:schemeClr val="bg1"/>
-        </a:solidFill>
-        <a:effectLst/>
-      </p:bgPr>
-    </p:bg>
-    <p:spTree>
-      <p:nvGrpSpPr>
-        <p:cNvPr id="1" name=""/>
-        <p:cNvGrpSpPr/>
-        <p:nvPr/>
-      </p:nvGrpSpPr>
-      <p:grpSpPr>
-        <a:xfrm>
-          <a:off x="0" y="0"/>
-          <a:ext cx="0" cy="0"/>
-          <a:chOff x="0" y="0"/>
-          <a:chExt cx="0" cy="0"/>
-        </a:xfrm>
-      </p:grpSpPr>
-      <p:sp useBgFill="1">
-        <p:nvSpPr>
-          <p:cNvPr id="11" name="Rectangle 10">
-            <a:extLst>
-              <a:ext uri="{FF2B5EF4-FFF2-40B4-BE49-F238E27FC236}">
-                <a16:creationId xmlns:a16="http://schemas.microsoft.com/office/drawing/2014/main" id="{89A320C9-9735-4D13-8279-C1C674841392}"/>
-              </a:ext>
-              <a:ext uri="{C183D7F6-B498-43B3-948B-1728B52AA6E4}">
-                <adec:decorative xmlns:adec="http://schemas.microsoft.com/office/drawing/2017/decorative" val="1"/>
-              </a:ext>
-            </a:extLst>
-          </p:cNvPr>
-          <p:cNvSpPr>
-            <a:spLocks noGrp="1" noRot="1" noChangeAspect="1" noMove="1" noResize="1" noEditPoints="1" noAdjustHandles="1" noChangeArrowheads="1" noChangeShapeType="1" noTextEdit="1"/>
-          </p:cNvSpPr>
-          <p:nvPr>
-            <p:extLst>
-              <p:ext uri="{386F3935-93C4-4BCD-93E2-E3B085C9AB24}">
-                <p16:designElem xmlns:p16="http://schemas.microsoft.com/office/powerpoint/2015/main" val="1"/>
-              </p:ext>
-            </p:extLst>
-          </p:nvPr>
-        </p:nvSpPr>
-        <p:spPr>
-          <a:xfrm>
-            <a:off x="0" y="0"/>
-            <a:ext cx="12192000" cy="6858000"/>
-          </a:xfrm>
-          <a:prstGeom prst="rect">
-            <a:avLst/>
-          </a:prstGeom>
-          <a:ln>
-            <a:noFill/>
-          </a:ln>
-        </p:spPr>
-        <p:style>
-          <a:lnRef idx="2">
-            <a:schemeClr val="accent1">
-              <a:shade val="50000"/>
-            </a:schemeClr>
-          </a:lnRef>
-          <a:fillRef idx="1">
-            <a:schemeClr val="accent1"/>
-          </a:fillRef>
-          <a:effectRef idx="0">
-            <a:schemeClr val="accent1"/>
-          </a:effectRef>
-          <a:fontRef idx="minor">
-            <a:schemeClr val="lt1"/>
-          </a:fontRef>
-        </p:style>
-        <p:txBody>
-          <a:bodyPr rtlCol="0" anchor="ctr"/>
-          <a:lstStyle/>
-          <a:p>
-            <a:pPr algn="ctr"/>
-            <a:endParaRPr lang="en-US"/>
-          </a:p>
-        </p:txBody>
-      </p:sp>
-      <p:sp useBgFill="1">
-        <p:nvSpPr>
-          <p:cNvPr id="13" name="Rectangle 12">
-            <a:extLst>
-              <a:ext uri="{FF2B5EF4-FFF2-40B4-BE49-F238E27FC236}">
-                <a16:creationId xmlns:a16="http://schemas.microsoft.com/office/drawing/2014/main" id="{92544CF4-9B52-4A7B-A4B3-88C72729B77D}"/>
-              </a:ext>
-              <a:ext uri="{C183D7F6-B498-43B3-948B-1728B52AA6E4}">
-                <adec:decorative xmlns:adec="http://schemas.microsoft.com/office/drawing/2017/decorative" val="1"/>
-              </a:ext>
-            </a:extLst>
-          </p:cNvPr>
-          <p:cNvSpPr>
-            <a:spLocks noGrp="1" noRot="1" noChangeAspect="1" noMove="1" noResize="1" noEditPoints="1" noAdjustHandles="1" noChangeArrowheads="1" noChangeShapeType="1" noTextEdit="1"/>
-          </p:cNvSpPr>
-          <p:nvPr>
-            <p:extLst>
-              <p:ext uri="{386F3935-93C4-4BCD-93E2-E3B085C9AB24}">
-                <p16:designElem xmlns:p16="http://schemas.microsoft.com/office/powerpoint/2015/main" val="1"/>
-              </p:ext>
-            </p:extLst>
-          </p:nvPr>
-        </p:nvSpPr>
-        <p:spPr>
-          <a:xfrm>
-            <a:off x="558209" y="7126"/>
-            <a:ext cx="11167447" cy="2018806"/>
-          </a:xfrm>
-          <a:prstGeom prst="rect">
-            <a:avLst/>
-          </a:prstGeom>
-          <a:ln w="9525">
-            <a:solidFill>
-              <a:srgbClr val="DEDEDE"/>
-            </a:solidFill>
-          </a:ln>
-          <a:effectLst>
-            <a:outerShdw blurRad="50800" dist="38100" dir="2700000" algn="tl" rotWithShape="0">
-              <a:schemeClr val="bg1">
-                <a:lumMod val="85000"/>
-                <a:alpha val="50000"/>
-              </a:schemeClr>
-            </a:outerShdw>
-          </a:effectLst>
-        </p:spPr>
-        <p:style>
-          <a:lnRef idx="2">
-            <a:schemeClr val="accent1">
-              <a:shade val="50000"/>
-            </a:schemeClr>
-          </a:lnRef>
-          <a:fillRef idx="1">
-            <a:schemeClr val="accent1"/>
-          </a:fillRef>
-          <a:effectRef idx="0">
-            <a:schemeClr val="accent1"/>
-          </a:effectRef>
-          <a:fontRef idx="minor">
-            <a:schemeClr val="lt1"/>
-          </a:fontRef>
-        </p:style>
-        <p:txBody>
-          <a:bodyPr rtlCol="0" anchor="ctr"/>
-          <a:lstStyle/>
-          <a:p>
-            <a:pPr marL="0" marR="0" lvl="0" indent="0" algn="ctr" defTabSz="914400" rtl="0" eaLnBrk="1" fontAlgn="auto" latinLnBrk="0" hangingPunct="1">
-              <a:lnSpc>
-                <a:spcPct val="100000"/>
-              </a:lnSpc>
-              <a:spcBef>
-                <a:spcPts val="0"/>
-              </a:spcBef>
-              <a:spcAft>
-                <a:spcPts val="0"/>
-              </a:spcAft>
-              <a:buClrTx/>
-              <a:buSzTx/>
-              <a:buFontTx/>
-              <a:buNone/>
-              <a:tabLst/>
-              <a:defRPr/>
-            </a:pPr>
-            <a:endParaRPr kumimoji="0" lang="en-US" sz="1800" b="0" i="0" u="none" strike="noStrike" kern="1200" cap="none" spc="0" normalizeH="0" baseline="0" noProof="0">
-              <a:ln>
-                <a:noFill/>
-              </a:ln>
-              <a:solidFill>
-                <a:prstClr val="white"/>
-              </a:solidFill>
-              <a:effectLst/>
-              <a:uLnTx/>
-              <a:uFillTx/>
-              <a:latin typeface="Calibri" panose="020F0502020204030204"/>
-              <a:ea typeface="+mn-ea"/>
-              <a:cs typeface="+mn-cs"/>
-            </a:endParaRPr>
-          </a:p>
-        </p:txBody>
-      </p:sp>
-      <p:sp useBgFill="1">
-        <p:nvSpPr>
-          <p:cNvPr id="15" name="Rectangle 14">
-            <a:extLst>
-              <a:ext uri="{FF2B5EF4-FFF2-40B4-BE49-F238E27FC236}">
-                <a16:creationId xmlns:a16="http://schemas.microsoft.com/office/drawing/2014/main" id="{E75862C5-5C00-4421-BC7B-9B7B86DBC80D}"/>
-              </a:ext>
-              <a:ext uri="{C183D7F6-B498-43B3-948B-1728B52AA6E4}">
-                <adec:decorative xmlns:adec="http://schemas.microsoft.com/office/drawing/2017/decorative" val="1"/>
-              </a:ext>
-            </a:extLst>
-          </p:cNvPr>
-          <p:cNvSpPr>
-            <a:spLocks noGrp="1" noRot="1" noChangeAspect="1" noMove="1" noResize="1" noEditPoints="1" noAdjustHandles="1" noChangeArrowheads="1" noChangeShapeType="1" noTextEdit="1"/>
-          </p:cNvSpPr>
-          <p:nvPr>
-            <p:extLst>
-              <p:ext uri="{386F3935-93C4-4BCD-93E2-E3B085C9AB24}">
-                <p16:designElem xmlns:p16="http://schemas.microsoft.com/office/powerpoint/2015/main" val="1"/>
-              </p:ext>
-            </p:extLst>
-          </p:nvPr>
-        </p:nvSpPr>
-        <p:spPr>
-          <a:xfrm>
-            <a:off x="566928" y="0"/>
-            <a:ext cx="11155680" cy="2011680"/>
-          </a:xfrm>
-          <a:prstGeom prst="rect">
-            <a:avLst/>
-          </a:prstGeom>
-          <a:ln w="9525">
-            <a:noFill/>
-          </a:ln>
-          <a:effectLst/>
-        </p:spPr>
-        <p:style>
-          <a:lnRef idx="2">
-            <a:schemeClr val="accent1">
-              <a:shade val="50000"/>
-            </a:schemeClr>
-          </a:lnRef>
-          <a:fillRef idx="1">
-            <a:schemeClr val="accent1"/>
-          </a:fillRef>
-          <a:effectRef idx="0">
-            <a:schemeClr val="accent1"/>
-          </a:effectRef>
-          <a:fontRef idx="minor">
-            <a:schemeClr val="lt1"/>
-          </a:fontRef>
-        </p:style>
-        <p:txBody>
-          <a:bodyPr rtlCol="0" anchor="ctr"/>
-          <a:lstStyle/>
-          <a:p>
-            <a:pPr marL="0" marR="0" lvl="0" indent="0" algn="ctr" defTabSz="914400" rtl="0" eaLnBrk="1" fontAlgn="auto" latinLnBrk="0" hangingPunct="1">
-              <a:lnSpc>
-                <a:spcPct val="100000"/>
-              </a:lnSpc>
-              <a:spcBef>
-                <a:spcPts val="0"/>
-              </a:spcBef>
-              <a:spcAft>
-                <a:spcPts val="0"/>
-              </a:spcAft>
-              <a:buClrTx/>
-              <a:buSzTx/>
-              <a:buFontTx/>
-              <a:buNone/>
-              <a:tabLst/>
-              <a:defRPr/>
-            </a:pPr>
-            <a:endParaRPr kumimoji="0" lang="en-US" sz="1800" b="0" i="0" u="none" strike="noStrike" kern="1200" cap="none" spc="0" normalizeH="0" baseline="0" noProof="0">
-              <a:ln>
-                <a:noFill/>
-              </a:ln>
-              <a:solidFill>
-                <a:prstClr val="white"/>
-              </a:solidFill>
-              <a:effectLst/>
-              <a:uLnTx/>
-              <a:uFillTx/>
-              <a:latin typeface="Calibri" panose="020F0502020204030204"/>
-              <a:ea typeface="+mn-ea"/>
-              <a:cs typeface="+mn-cs"/>
-            </a:endParaRPr>
-          </a:p>
-        </p:txBody>
-      </p:sp>
-      <p:sp>
-        <p:nvSpPr>
-          <p:cNvPr id="2" name="Título 1">
-            <a:extLst>
-              <a:ext uri="{FF2B5EF4-FFF2-40B4-BE49-F238E27FC236}">
-                <a16:creationId xmlns:a16="http://schemas.microsoft.com/office/drawing/2014/main" id="{4D2E0B97-BC45-0EB7-84D7-9E7FFEAC951C}"/>
-              </a:ext>
-            </a:extLst>
-          </p:cNvPr>
-          <p:cNvSpPr>
-            <a:spLocks noGrp="1"/>
-          </p:cNvSpPr>
-          <p:nvPr>
-            <p:ph type="title"/>
-          </p:nvPr>
-        </p:nvSpPr>
-        <p:spPr>
-          <a:xfrm>
-            <a:off x="1115568" y="548640"/>
-            <a:ext cx="10168128" cy="1179576"/>
-          </a:xfrm>
-        </p:spPr>
-        <p:txBody>
-          <a:bodyPr>
-            <a:normAutofit/>
-          </a:bodyPr>
-          <a:lstStyle/>
-          <a:p>
-            <a:r>
-              <a:rPr lang="en-US" sz="4000"/>
-              <a:t>RAG Use Cases</a:t>
-            </a:r>
-          </a:p>
-        </p:txBody>
-      </p:sp>
-      <p:sp>
-        <p:nvSpPr>
-          <p:cNvPr id="17" name="Rectangle 16">
-            <a:extLst>
-              <a:ext uri="{FF2B5EF4-FFF2-40B4-BE49-F238E27FC236}">
-                <a16:creationId xmlns:a16="http://schemas.microsoft.com/office/drawing/2014/main" id="{089440EF-9BE9-4AE9-8C28-00B02296CDB6}"/>
-              </a:ext>
-              <a:ext uri="{C183D7F6-B498-43B3-948B-1728B52AA6E4}">
-                <adec:decorative xmlns:adec="http://schemas.microsoft.com/office/drawing/2017/decorative" val="1"/>
-              </a:ext>
-            </a:extLst>
-          </p:cNvPr>
-          <p:cNvSpPr>
-            <a:spLocks noGrp="1" noRot="1" noChangeAspect="1" noMove="1" noResize="1" noEditPoints="1" noAdjustHandles="1" noChangeArrowheads="1" noChangeShapeType="1" noTextEdit="1"/>
-          </p:cNvSpPr>
-          <p:nvPr>
-            <p:extLst>
-              <p:ext uri="{386F3935-93C4-4BCD-93E2-E3B085C9AB24}">
-                <p16:designElem xmlns:p16="http://schemas.microsoft.com/office/powerpoint/2015/main" val="1"/>
-              </p:ext>
-            </p:extLst>
-          </p:nvPr>
-        </p:nvSpPr>
-        <p:spPr>
-          <a:xfrm>
-            <a:off x="498834" y="758952"/>
-            <a:ext cx="128016" cy="704088"/>
-          </a:xfrm>
-          <a:prstGeom prst="rect">
-            <a:avLst/>
-          </a:prstGeom>
-          <a:solidFill>
-            <a:schemeClr val="accent2"/>
-          </a:solidFill>
-          <a:ln>
-            <a:noFill/>
-          </a:ln>
-        </p:spPr>
-        <p:style>
-          <a:lnRef idx="2">
-            <a:schemeClr val="accent1">
-              <a:shade val="50000"/>
-            </a:schemeClr>
-          </a:lnRef>
-          <a:fillRef idx="1">
-            <a:schemeClr val="accent1"/>
-          </a:fillRef>
-          <a:effectRef idx="0">
-            <a:schemeClr val="accent1"/>
-          </a:effectRef>
-          <a:fontRef idx="minor">
-            <a:schemeClr val="lt1"/>
-          </a:fontRef>
-        </p:style>
-        <p:txBody>
-          <a:bodyPr rtlCol="0" anchor="ctr"/>
-          <a:lstStyle/>
-          <a:p>
-            <a:pPr algn="ctr"/>
-            <a:endParaRPr lang="en-US">
-              <a:solidFill>
-                <a:prstClr val="white"/>
-              </a:solidFill>
-              <a:latin typeface="Calibri" panose="020F0502020204030204"/>
-            </a:endParaRPr>
-          </a:p>
-        </p:txBody>
-      </p:sp>
-      <p:sp>
-        <p:nvSpPr>
-          <p:cNvPr id="4" name="Marcador de Posição da Data 3">
-            <a:extLst>
-              <a:ext uri="{FF2B5EF4-FFF2-40B4-BE49-F238E27FC236}">
-                <a16:creationId xmlns:a16="http://schemas.microsoft.com/office/drawing/2014/main" id="{4D7D4788-FCFF-4456-AA36-D07FCB4562D3}"/>
-              </a:ext>
-            </a:extLst>
-          </p:cNvPr>
-          <p:cNvSpPr>
-            <a:spLocks noGrp="1"/>
-          </p:cNvSpPr>
-          <p:nvPr>
-            <p:ph type="dt" sz="half" idx="10"/>
-          </p:nvPr>
-        </p:nvSpPr>
-        <p:spPr>
-          <a:xfrm>
-            <a:off x="1115568" y="6356350"/>
-            <a:ext cx="2743200" cy="365125"/>
-          </a:xfrm>
-        </p:spPr>
-        <p:txBody>
-          <a:bodyPr>
-            <a:normAutofit/>
-          </a:bodyPr>
-          <a:lstStyle/>
-          <a:p>
-            <a:pPr>
-              <a:spcAft>
-                <a:spcPts val="600"/>
-              </a:spcAft>
-            </a:pPr>
-            <a:fld id="{678963C3-A4A7-490D-BC7C-0C1727FA616F}" type="datetime1">
-              <a:rPr lang="pt-PT">
-                <a:solidFill>
-                  <a:schemeClr val="tx1">
-                    <a:lumMod val="50000"/>
-                    <a:lumOff val="50000"/>
-                  </a:schemeClr>
-                </a:solidFill>
-              </a:rPr>
-              <a:pPr>
-                <a:spcAft>
-                  <a:spcPts val="600"/>
-                </a:spcAft>
-              </a:pPr>
-              <a:t>06/01/2025</a:t>
-            </a:fld>
-            <a:endParaRPr lang="en-US">
-              <a:solidFill>
-                <a:schemeClr val="tx1">
-                  <a:lumMod val="50000"/>
-                  <a:lumOff val="50000"/>
-                </a:schemeClr>
-              </a:solidFill>
-            </a:endParaRPr>
-          </a:p>
-        </p:txBody>
-      </p:sp>
-      <p:sp>
-        <p:nvSpPr>
-          <p:cNvPr id="5" name="Marcador de Posição do Número do Diapositivo 4">
-            <a:extLst>
-              <a:ext uri="{FF2B5EF4-FFF2-40B4-BE49-F238E27FC236}">
-                <a16:creationId xmlns:a16="http://schemas.microsoft.com/office/drawing/2014/main" id="{21D12795-3FE9-87E2-B087-46D382F297CA}"/>
-              </a:ext>
-            </a:extLst>
-          </p:cNvPr>
-          <p:cNvSpPr>
-            <a:spLocks noGrp="1"/>
-          </p:cNvSpPr>
-          <p:nvPr>
-            <p:ph type="sldNum" sz="quarter" idx="12"/>
-          </p:nvPr>
-        </p:nvSpPr>
-        <p:spPr>
-          <a:xfrm>
-            <a:off x="8540496" y="6356350"/>
-            <a:ext cx="2743200" cy="365125"/>
-          </a:xfrm>
-        </p:spPr>
-        <p:txBody>
-          <a:bodyPr>
-            <a:normAutofit/>
-          </a:bodyPr>
-          <a:lstStyle/>
-          <a:p>
-            <a:pPr>
-              <a:spcAft>
-                <a:spcPts val="600"/>
-              </a:spcAft>
-            </a:pPr>
-            <a:fld id="{7CE2990B-2BD6-473B-898B-9D3C32B6543D}" type="slidenum">
-              <a:rPr lang="en-US">
-                <a:solidFill>
-                  <a:schemeClr val="tx1">
-                    <a:lumMod val="50000"/>
-                    <a:lumOff val="50000"/>
-                  </a:schemeClr>
-                </a:solidFill>
-              </a:rPr>
-              <a:pPr>
-                <a:spcAft>
-                  <a:spcPts val="600"/>
-                </a:spcAft>
-              </a:pPr>
-              <a:t>8</a:t>
-            </a:fld>
-            <a:endParaRPr lang="en-US">
-              <a:solidFill>
-                <a:schemeClr val="tx1">
-                  <a:lumMod val="50000"/>
-                  <a:lumOff val="50000"/>
-                </a:schemeClr>
-              </a:solidFill>
-            </a:endParaRPr>
-          </a:p>
-        </p:txBody>
-      </p:sp>
-      <p:graphicFrame>
-        <p:nvGraphicFramePr>
-          <p:cNvPr id="7" name="Marcador de Posição de Conteúdo 2">
-            <a:extLst>
-              <a:ext uri="{FF2B5EF4-FFF2-40B4-BE49-F238E27FC236}">
-                <a16:creationId xmlns:a16="http://schemas.microsoft.com/office/drawing/2014/main" id="{E32D5D97-13E1-94BA-A327-6553055B8C24}"/>
-              </a:ext>
-            </a:extLst>
-          </p:cNvPr>
-          <p:cNvGraphicFramePr>
-            <a:graphicFrameLocks noGrp="1"/>
-          </p:cNvGraphicFramePr>
-          <p:nvPr>
-            <p:ph idx="1"/>
-            <p:extLst>
-              <p:ext uri="{D42A27DB-BD31-4B8C-83A1-F6EECF244321}">
-                <p14:modId xmlns:p14="http://schemas.microsoft.com/office/powerpoint/2010/main" val="138854078"/>
-              </p:ext>
-            </p:extLst>
-          </p:nvPr>
-        </p:nvGraphicFramePr>
-        <p:xfrm>
-          <a:off x="1115568" y="2269730"/>
-          <a:ext cx="10168128" cy="3993910"/>
-        </p:xfrm>
-        <a:graphic>
-          <a:graphicData uri="http://schemas.openxmlformats.org/drawingml/2006/diagram">
-            <dgm:relIds xmlns:dgm="http://schemas.openxmlformats.org/drawingml/2006/diagram" xmlns:r="http://schemas.openxmlformats.org/officeDocument/2006/relationships" r:dm="rId2" r:lo="rId3" r:qs="rId4" r:cs="rId5"/>
-          </a:graphicData>
-        </a:graphic>
-      </p:graphicFrame>
-    </p:spTree>
-    <p:extLst>
-      <p:ext uri="{BB962C8B-B14F-4D97-AF65-F5344CB8AC3E}">
-        <p14:creationId xmlns:p14="http://schemas.microsoft.com/office/powerpoint/2010/main" val="919802635"/>
-      </p:ext>
-    </p:extLst>
-  </p:cSld>
-  <p:clrMapOvr>
-    <a:masterClrMapping/>
-  </p:clrMapOvr>
-</p:sld>
-</file>
-
-<file path=ppt/slides/slide9.xml><?xml version="1.0" encoding="utf-8"?>
-<p:sld xmlns:a="http://schemas.openxmlformats.org/drawingml/2006/main" xmlns:r="http://schemas.openxmlformats.org/officeDocument/2006/relationships" xmlns:p="http://schemas.openxmlformats.org/presentationml/2006/main">
-  <p:cSld>
-    <p:bg>
-      <p:bgPr>
-        <a:solidFill>
-          <a:schemeClr val="bg1"/>
-        </a:solidFill>
-        <a:effectLst/>
-      </p:bgPr>
-    </p:bg>
-    <p:spTree>
-      <p:nvGrpSpPr>
-        <p:cNvPr id="1" name=""/>
-        <p:cNvGrpSpPr/>
-        <p:nvPr/>
-      </p:nvGrpSpPr>
-      <p:grpSpPr>
-        <a:xfrm>
-          <a:off x="0" y="0"/>
-          <a:ext cx="0" cy="0"/>
-          <a:chOff x="0" y="0"/>
-          <a:chExt cx="0" cy="0"/>
-        </a:xfrm>
-      </p:grpSpPr>
-      <p:sp useBgFill="1">
-        <p:nvSpPr>
-          <p:cNvPr id="11" name="Rectangle 10">
-            <a:extLst>
-              <a:ext uri="{FF2B5EF4-FFF2-40B4-BE49-F238E27FC236}">
-                <a16:creationId xmlns:a16="http://schemas.microsoft.com/office/drawing/2014/main" id="{7517A47C-B2E5-4B79-8061-D74B1311AF6E}"/>
-              </a:ext>
-              <a:ext uri="{C183D7F6-B498-43B3-948B-1728B52AA6E4}">
-                <adec:decorative xmlns:adec="http://schemas.microsoft.com/office/drawing/2017/decorative" val="1"/>
-              </a:ext>
-            </a:extLst>
-          </p:cNvPr>
-          <p:cNvSpPr>
-            <a:spLocks noGrp="1" noRot="1" noChangeAspect="1" noMove="1" noResize="1" noEditPoints="1" noAdjustHandles="1" noChangeArrowheads="1" noChangeShapeType="1" noTextEdit="1"/>
-          </p:cNvSpPr>
-          <p:nvPr>
-            <p:extLst>
-              <p:ext uri="{386F3935-93C4-4BCD-93E2-E3B085C9AB24}">
-                <p16:designElem xmlns:p16="http://schemas.microsoft.com/office/powerpoint/2015/main" val="1"/>
-              </p:ext>
-            </p:extLst>
-          </p:nvPr>
-        </p:nvSpPr>
-        <p:spPr>
-          <a:xfrm>
-            <a:off x="0" y="0"/>
-            <a:ext cx="12192000" cy="6858000"/>
-          </a:xfrm>
-          <a:prstGeom prst="rect">
-            <a:avLst/>
-          </a:prstGeom>
-          <a:ln>
-            <a:noFill/>
-          </a:ln>
-        </p:spPr>
-        <p:style>
-          <a:lnRef idx="2">
-            <a:schemeClr val="accent1">
-              <a:shade val="50000"/>
-            </a:schemeClr>
-          </a:lnRef>
-          <a:fillRef idx="1">
-            <a:schemeClr val="accent1"/>
-          </a:fillRef>
-          <a:effectRef idx="0">
-            <a:schemeClr val="accent1"/>
-          </a:effectRef>
-          <a:fontRef idx="minor">
-            <a:schemeClr val="lt1"/>
-          </a:fontRef>
-        </p:style>
-        <p:txBody>
-          <a:bodyPr rtlCol="0" anchor="ctr"/>
-          <a:lstStyle/>
-          <a:p>
-            <a:pPr algn="ctr"/>
-            <a:endParaRPr lang="en-US"/>
-          </a:p>
-        </p:txBody>
-      </p:sp>
-      <p:sp useBgFill="1">
-        <p:nvSpPr>
-          <p:cNvPr id="13" name="Freeform: Shape 12">
-            <a:extLst>
-              <a:ext uri="{FF2B5EF4-FFF2-40B4-BE49-F238E27FC236}">
-                <a16:creationId xmlns:a16="http://schemas.microsoft.com/office/drawing/2014/main" id="{C505E780-2083-4CB5-A42A-5E0E2908ECC3}"/>
-              </a:ext>
-              <a:ext uri="{C183D7F6-B498-43B3-948B-1728B52AA6E4}">
-                <adec:decorative xmlns:adec="http://schemas.microsoft.com/office/drawing/2017/decorative" val="1"/>
-              </a:ext>
-            </a:extLst>
-          </p:cNvPr>
-          <p:cNvSpPr>
-            <a:spLocks noGrp="1" noRot="1" noChangeAspect="1" noMove="1" noResize="1" noEditPoints="1" noAdjustHandles="1" noChangeArrowheads="1" noChangeShapeType="1" noTextEdit="1"/>
-          </p:cNvSpPr>
-          <p:nvPr>
-            <p:extLst>
-              <p:ext uri="{386F3935-93C4-4BCD-93E2-E3B085C9AB24}">
-                <p16:designElem xmlns:p16="http://schemas.microsoft.com/office/powerpoint/2015/main" val="1"/>
-              </p:ext>
-            </p:extLst>
-          </p:nvPr>
-        </p:nvSpPr>
-        <p:spPr>
-          <a:xfrm>
-            <a:off x="-1" y="0"/>
-            <a:ext cx="4818889" cy="6858000"/>
-          </a:xfrm>
-          <a:custGeom>
-            <a:avLst/>
-            <a:gdLst>
-              <a:gd name="connsiteX0" fmla="*/ 0 w 4818889"/>
-              <a:gd name="connsiteY0" fmla="*/ 0 h 6858000"/>
-              <a:gd name="connsiteX1" fmla="*/ 3605911 w 4818889"/>
-              <a:gd name="connsiteY1" fmla="*/ 0 h 6858000"/>
-              <a:gd name="connsiteX2" fmla="*/ 3668894 w 4818889"/>
-              <a:gd name="connsiteY2" fmla="*/ 69271 h 6858000"/>
-              <a:gd name="connsiteX3" fmla="*/ 4818889 w 4818889"/>
-              <a:gd name="connsiteY3" fmla="*/ 3429000 h 6858000"/>
-              <a:gd name="connsiteX4" fmla="*/ 3668894 w 4818889"/>
-              <a:gd name="connsiteY4" fmla="*/ 6788730 h 6858000"/>
-              <a:gd name="connsiteX5" fmla="*/ 3605911 w 4818889"/>
-              <a:gd name="connsiteY5" fmla="*/ 6858000 h 6858000"/>
-              <a:gd name="connsiteX6" fmla="*/ 0 w 4818889"/>
-              <a:gd name="connsiteY6" fmla="*/ 6858000 h 6858000"/>
-            </a:gdLst>
-            <a:ahLst/>
-            <a:cxnLst>
-              <a:cxn ang="0">
-                <a:pos x="connsiteX0" y="connsiteY0"/>
-              </a:cxn>
-              <a:cxn ang="0">
-                <a:pos x="connsiteX1" y="connsiteY1"/>
-              </a:cxn>
-              <a:cxn ang="0">
-                <a:pos x="connsiteX2" y="connsiteY2"/>
-              </a:cxn>
-              <a:cxn ang="0">
-                <a:pos x="connsiteX3" y="connsiteY3"/>
-              </a:cxn>
-              <a:cxn ang="0">
-                <a:pos x="connsiteX4" y="connsiteY4"/>
-              </a:cxn>
-              <a:cxn ang="0">
-                <a:pos x="connsiteX5" y="connsiteY5"/>
-              </a:cxn>
-              <a:cxn ang="0">
-                <a:pos x="connsiteX6" y="connsiteY6"/>
-              </a:cxn>
-            </a:cxnLst>
-            <a:rect l="l" t="t" r="r" b="b"/>
-            <a:pathLst>
-              <a:path w="4818889" h="6858000">
-                <a:moveTo>
-                  <a:pt x="0" y="0"/>
-                </a:moveTo>
-                <a:lnTo>
-                  <a:pt x="3605911" y="0"/>
-                </a:lnTo>
-                <a:lnTo>
-                  <a:pt x="3668894" y="69271"/>
-                </a:lnTo>
-                <a:cubicBezTo>
-                  <a:pt x="4379420" y="929100"/>
-                  <a:pt x="4818889" y="2116944"/>
-                  <a:pt x="4818889" y="3429000"/>
-                </a:cubicBezTo>
-                <a:cubicBezTo>
-                  <a:pt x="4818889" y="4741056"/>
-                  <a:pt x="4379420" y="5928900"/>
-                  <a:pt x="3668894" y="6788730"/>
-                </a:cubicBezTo>
-                <a:lnTo>
-                  <a:pt x="3605911" y="6858000"/>
-                </a:lnTo>
-                <a:lnTo>
-                  <a:pt x="0" y="6858000"/>
-                </a:lnTo>
-                <a:close/>
-              </a:path>
-            </a:pathLst>
-          </a:custGeom>
-          <a:ln w="9525">
-            <a:solidFill>
-              <a:srgbClr val="EFEFEF"/>
-            </a:solidFill>
-          </a:ln>
-          <a:effectLst>
-            <a:outerShdw blurRad="88900" dist="38100" algn="l" rotWithShape="0">
-              <a:schemeClr val="bg1">
-                <a:lumMod val="85000"/>
-                <a:alpha val="50000"/>
-              </a:schemeClr>
-            </a:outerShdw>
-          </a:effectLst>
-        </p:spPr>
-        <p:style>
-          <a:lnRef idx="2">
-            <a:schemeClr val="accent1">
-              <a:shade val="50000"/>
-            </a:schemeClr>
-          </a:lnRef>
-          <a:fillRef idx="1">
-            <a:schemeClr val="accent1"/>
-          </a:fillRef>
-          <a:effectRef idx="0">
-            <a:schemeClr val="accent1"/>
-          </a:effectRef>
-          <a:fontRef idx="minor">
-            <a:schemeClr val="lt1"/>
-          </a:fontRef>
-        </p:style>
-        <p:txBody>
-          <a:bodyPr wrap="square" rtlCol="0" anchor="ctr">
-            <a:noAutofit/>
-          </a:bodyPr>
-          <a:lstStyle/>
-          <a:p>
-            <a:pPr marL="0" marR="0" lvl="0" indent="0" algn="ctr" defTabSz="914400" rtl="0" eaLnBrk="1" fontAlgn="auto" latinLnBrk="0" hangingPunct="1">
-              <a:lnSpc>
-                <a:spcPct val="100000"/>
-              </a:lnSpc>
-              <a:spcBef>
-                <a:spcPts val="0"/>
-              </a:spcBef>
-              <a:spcAft>
-                <a:spcPts val="0"/>
-              </a:spcAft>
-              <a:buClrTx/>
-              <a:buSzTx/>
-              <a:buFontTx/>
-              <a:buNone/>
-              <a:tabLst/>
-              <a:defRPr/>
-            </a:pPr>
-            <a:endParaRPr kumimoji="0" lang="en-US" sz="1800" b="0" i="0" u="none" strike="noStrike" kern="1200" cap="none" spc="0" normalizeH="0" baseline="0" noProof="0">
-              <a:ln>
-                <a:noFill/>
-              </a:ln>
-              <a:solidFill>
-                <a:prstClr val="white"/>
-              </a:solidFill>
-              <a:effectLst/>
-              <a:uLnTx/>
-              <a:uFillTx/>
-              <a:latin typeface="Calibri" panose="020F0502020204030204"/>
-              <a:ea typeface="+mn-ea"/>
-              <a:cs typeface="+mn-cs"/>
-            </a:endParaRPr>
-          </a:p>
-        </p:txBody>
-      </p:sp>
-      <p:sp useBgFill="1">
-        <p:nvSpPr>
-          <p:cNvPr id="15" name="Freeform: Shape 14">
-            <a:extLst>
-              <a:ext uri="{FF2B5EF4-FFF2-40B4-BE49-F238E27FC236}">
-                <a16:creationId xmlns:a16="http://schemas.microsoft.com/office/drawing/2014/main" id="{D2C0AE1C-0118-41AE-8A10-7CDCBF10E96F}"/>
-              </a:ext>
-              <a:ext uri="{C183D7F6-B498-43B3-948B-1728B52AA6E4}">
-                <adec:decorative xmlns:adec="http://schemas.microsoft.com/office/drawing/2017/decorative" val="1"/>
-              </a:ext>
-            </a:extLst>
-          </p:cNvPr>
-          <p:cNvSpPr>
-            <a:spLocks noGrp="1" noRot="1" noChangeAspect="1" noMove="1" noResize="1" noEditPoints="1" noAdjustHandles="1" noChangeArrowheads="1" noChangeShapeType="1" noTextEdit="1"/>
-          </p:cNvSpPr>
-          <p:nvPr>
-            <p:extLst>
-              <p:ext uri="{386F3935-93C4-4BCD-93E2-E3B085C9AB24}">
-                <p16:designElem xmlns:p16="http://schemas.microsoft.com/office/powerpoint/2015/main" val="1"/>
-              </p:ext>
-            </p:extLst>
-          </p:nvPr>
-        </p:nvSpPr>
-        <p:spPr>
-          <a:xfrm>
-            <a:off x="1" y="0"/>
-            <a:ext cx="4811477" cy="6858000"/>
-          </a:xfrm>
-          <a:custGeom>
-            <a:avLst/>
-            <a:gdLst>
-              <a:gd name="connsiteX0" fmla="*/ 0 w 4811477"/>
-              <a:gd name="connsiteY0" fmla="*/ 0 h 6858000"/>
-              <a:gd name="connsiteX1" fmla="*/ 3598499 w 4811477"/>
-              <a:gd name="connsiteY1" fmla="*/ 0 h 6858000"/>
-              <a:gd name="connsiteX2" fmla="*/ 3661482 w 4811477"/>
-              <a:gd name="connsiteY2" fmla="*/ 69271 h 6858000"/>
-              <a:gd name="connsiteX3" fmla="*/ 4811477 w 4811477"/>
-              <a:gd name="connsiteY3" fmla="*/ 3429000 h 6858000"/>
-              <a:gd name="connsiteX4" fmla="*/ 3661482 w 4811477"/>
-              <a:gd name="connsiteY4" fmla="*/ 6788730 h 6858000"/>
-              <a:gd name="connsiteX5" fmla="*/ 3598499 w 4811477"/>
-              <a:gd name="connsiteY5" fmla="*/ 6858000 h 6858000"/>
-              <a:gd name="connsiteX6" fmla="*/ 0 w 4811477"/>
-              <a:gd name="connsiteY6" fmla="*/ 6858000 h 6858000"/>
-            </a:gdLst>
-            <a:ahLst/>
-            <a:cxnLst>
-              <a:cxn ang="0">
-                <a:pos x="connsiteX0" y="connsiteY0"/>
-              </a:cxn>
-              <a:cxn ang="0">
-                <a:pos x="connsiteX1" y="connsiteY1"/>
-              </a:cxn>
-              <a:cxn ang="0">
-                <a:pos x="connsiteX2" y="connsiteY2"/>
-              </a:cxn>
-              <a:cxn ang="0">
-                <a:pos x="connsiteX3" y="connsiteY3"/>
-              </a:cxn>
-              <a:cxn ang="0">
-                <a:pos x="connsiteX4" y="connsiteY4"/>
-              </a:cxn>
-              <a:cxn ang="0">
-                <a:pos x="connsiteX5" y="connsiteY5"/>
-              </a:cxn>
-              <a:cxn ang="0">
-                <a:pos x="connsiteX6" y="connsiteY6"/>
-              </a:cxn>
-            </a:cxnLst>
-            <a:rect l="l" t="t" r="r" b="b"/>
-            <a:pathLst>
-              <a:path w="4811477" h="6858000">
-                <a:moveTo>
-                  <a:pt x="0" y="0"/>
-                </a:moveTo>
-                <a:lnTo>
-                  <a:pt x="3598499" y="0"/>
-                </a:lnTo>
-                <a:lnTo>
-                  <a:pt x="3661482" y="69271"/>
-                </a:lnTo>
-                <a:cubicBezTo>
-                  <a:pt x="4372008" y="929100"/>
-                  <a:pt x="4811477" y="2116944"/>
-                  <a:pt x="4811477" y="3429000"/>
-                </a:cubicBezTo>
-                <a:cubicBezTo>
-                  <a:pt x="4811477" y="4741056"/>
-                  <a:pt x="4372008" y="5928900"/>
-                  <a:pt x="3661482" y="6788730"/>
-                </a:cubicBezTo>
-                <a:lnTo>
-                  <a:pt x="3598499" y="6858000"/>
-                </a:lnTo>
-                <a:lnTo>
-                  <a:pt x="0" y="6858000"/>
-                </a:lnTo>
-                <a:close/>
-              </a:path>
-            </a:pathLst>
-          </a:custGeom>
-          <a:ln w="9525">
-            <a:noFill/>
-          </a:ln>
-          <a:effectLst/>
-        </p:spPr>
-        <p:style>
-          <a:lnRef idx="2">
-            <a:schemeClr val="accent1">
-              <a:shade val="50000"/>
-            </a:schemeClr>
-          </a:lnRef>
-          <a:fillRef idx="1">
-            <a:schemeClr val="accent1"/>
-          </a:fillRef>
-          <a:effectRef idx="0">
-            <a:schemeClr val="accent1"/>
-          </a:effectRef>
-          <a:fontRef idx="minor">
-            <a:schemeClr val="lt1"/>
-          </a:fontRef>
-        </p:style>
-        <p:txBody>
-          <a:bodyPr wrap="square" rtlCol="0" anchor="ctr">
-            <a:noAutofit/>
-          </a:bodyPr>
-          <a:lstStyle/>
-          <a:p>
-            <a:pPr marL="0" marR="0" lvl="0" indent="0" algn="ctr" defTabSz="914400" rtl="0" eaLnBrk="1" fontAlgn="auto" latinLnBrk="0" hangingPunct="1">
-              <a:lnSpc>
-                <a:spcPct val="100000"/>
-              </a:lnSpc>
-              <a:spcBef>
-                <a:spcPts val="0"/>
-              </a:spcBef>
-              <a:spcAft>
-                <a:spcPts val="0"/>
-              </a:spcAft>
-              <a:buClrTx/>
-              <a:buSzTx/>
-              <a:buFontTx/>
-              <a:buNone/>
-              <a:tabLst/>
-              <a:defRPr/>
-            </a:pPr>
-            <a:endParaRPr kumimoji="0" lang="en-US" sz="1800" b="0" i="0" u="none" strike="noStrike" kern="1200" cap="none" spc="0" normalizeH="0" baseline="0" noProof="0">
-              <a:ln>
-                <a:noFill/>
-              </a:ln>
-              <a:solidFill>
-                <a:prstClr val="white"/>
-              </a:solidFill>
-              <a:effectLst/>
-              <a:uLnTx/>
-              <a:uFillTx/>
-              <a:latin typeface="Calibri" panose="020F0502020204030204"/>
-              <a:ea typeface="+mn-ea"/>
-              <a:cs typeface="+mn-cs"/>
-            </a:endParaRPr>
-          </a:p>
-        </p:txBody>
-      </p:sp>
-      <p:sp>
-        <p:nvSpPr>
-          <p:cNvPr id="2" name="Título 1">
-            <a:extLst>
-              <a:ext uri="{FF2B5EF4-FFF2-40B4-BE49-F238E27FC236}">
-                <a16:creationId xmlns:a16="http://schemas.microsoft.com/office/drawing/2014/main" id="{0D46C4FD-1C27-CD85-FB15-8172CB5F19DA}"/>
-              </a:ext>
-            </a:extLst>
-          </p:cNvPr>
-          <p:cNvSpPr>
-            <a:spLocks noGrp="1"/>
-          </p:cNvSpPr>
-          <p:nvPr>
-            <p:ph type="title"/>
-          </p:nvPr>
-        </p:nvSpPr>
-        <p:spPr>
-          <a:xfrm>
-            <a:off x="621792" y="1161288"/>
-            <a:ext cx="3602736" cy="4526280"/>
-          </a:xfrm>
-        </p:spPr>
-        <p:txBody>
-          <a:bodyPr>
-            <a:normAutofit/>
-          </a:bodyPr>
-          <a:lstStyle/>
-          <a:p>
-            <a:r>
-              <a:rPr lang="en-US" sz="4000"/>
-              <a:t>Future of RAG</a:t>
-            </a:r>
-          </a:p>
-        </p:txBody>
-      </p:sp>
-      <p:sp>
-        <p:nvSpPr>
-          <p:cNvPr id="17" name="Rectangle 16">
-            <a:extLst>
-              <a:ext uri="{FF2B5EF4-FFF2-40B4-BE49-F238E27FC236}">
-                <a16:creationId xmlns:a16="http://schemas.microsoft.com/office/drawing/2014/main" id="{463EEC44-1BA3-44ED-81FC-A644B04B2A44}"/>
-              </a:ext>
-              <a:ext uri="{C183D7F6-B498-43B3-948B-1728B52AA6E4}">
-                <adec:decorative xmlns:adec="http://schemas.microsoft.com/office/drawing/2017/decorative" val="1"/>
-              </a:ext>
-            </a:extLst>
-          </p:cNvPr>
-          <p:cNvSpPr>
-            <a:spLocks noGrp="1" noRot="1" noChangeAspect="1" noMove="1" noResize="1" noEditPoints="1" noAdjustHandles="1" noChangeArrowheads="1" noChangeShapeType="1" noTextEdit="1"/>
-          </p:cNvSpPr>
-          <p:nvPr>
-            <p:extLst>
-              <p:ext uri="{386F3935-93C4-4BCD-93E2-E3B085C9AB24}">
-                <p16:designElem xmlns:p16="http://schemas.microsoft.com/office/powerpoint/2015/main" val="1"/>
-              </p:ext>
-            </p:extLst>
-          </p:nvPr>
-        </p:nvSpPr>
-        <p:spPr>
-          <a:xfrm>
-            <a:off x="0" y="3081528"/>
-            <a:ext cx="128016" cy="704088"/>
-          </a:xfrm>
-          <a:prstGeom prst="rect">
-            <a:avLst/>
-          </a:prstGeom>
-          <a:solidFill>
-            <a:schemeClr val="accent2"/>
-          </a:solidFill>
-          <a:ln>
-            <a:noFill/>
-          </a:ln>
-        </p:spPr>
-        <p:style>
-          <a:lnRef idx="2">
-            <a:schemeClr val="accent1">
-              <a:shade val="50000"/>
-            </a:schemeClr>
-          </a:lnRef>
-          <a:fillRef idx="1">
-            <a:schemeClr val="accent1"/>
-          </a:fillRef>
-          <a:effectRef idx="0">
-            <a:schemeClr val="accent1"/>
-          </a:effectRef>
-          <a:fontRef idx="minor">
-            <a:schemeClr val="lt1"/>
-          </a:fontRef>
-        </p:style>
-        <p:txBody>
-          <a:bodyPr rtlCol="0" anchor="ctr"/>
-          <a:lstStyle/>
-          <a:p>
-            <a:pPr algn="ctr"/>
-            <a:endParaRPr lang="en-US">
-              <a:solidFill>
-                <a:prstClr val="white"/>
-              </a:solidFill>
-              <a:latin typeface="Calibri" panose="020F0502020204030204"/>
-            </a:endParaRPr>
-          </a:p>
-        </p:txBody>
-      </p:sp>
-      <p:sp>
-        <p:nvSpPr>
-          <p:cNvPr id="4" name="Marcador de Posição da Data 3">
-            <a:extLst>
-              <a:ext uri="{FF2B5EF4-FFF2-40B4-BE49-F238E27FC236}">
-                <a16:creationId xmlns:a16="http://schemas.microsoft.com/office/drawing/2014/main" id="{9319B61A-DBC9-0EF9-85C1-467932CB5D6E}"/>
-              </a:ext>
-            </a:extLst>
-          </p:cNvPr>
-          <p:cNvSpPr>
-            <a:spLocks noGrp="1"/>
-          </p:cNvSpPr>
-          <p:nvPr>
-            <p:ph type="dt" sz="half" idx="10"/>
-          </p:nvPr>
-        </p:nvSpPr>
-        <p:spPr>
-          <a:xfrm>
-            <a:off x="621792" y="6356350"/>
-            <a:ext cx="2743200" cy="365125"/>
-          </a:xfrm>
-        </p:spPr>
-        <p:txBody>
-          <a:bodyPr>
-            <a:normAutofit/>
-          </a:bodyPr>
-          <a:lstStyle/>
-          <a:p>
-            <a:pPr>
-              <a:spcAft>
-                <a:spcPts val="600"/>
-              </a:spcAft>
-            </a:pPr>
-            <a:fld id="{678963C3-A4A7-490D-BC7C-0C1727FA616F}" type="datetime1">
-              <a:rPr lang="pt-PT">
-                <a:solidFill>
-                  <a:schemeClr val="tx1">
-                    <a:lumMod val="50000"/>
-                    <a:lumOff val="50000"/>
-                  </a:schemeClr>
-                </a:solidFill>
-              </a:rPr>
-              <a:pPr>
-                <a:spcAft>
-                  <a:spcPts val="600"/>
-                </a:spcAft>
-              </a:pPr>
-              <a:t>06/01/2025</a:t>
-            </a:fld>
-            <a:endParaRPr lang="en-US">
-              <a:solidFill>
-                <a:schemeClr val="tx1">
-                  <a:lumMod val="50000"/>
-                  <a:lumOff val="50000"/>
-                </a:schemeClr>
-              </a:solidFill>
-            </a:endParaRPr>
-          </a:p>
-        </p:txBody>
-      </p:sp>
-      <p:sp>
-        <p:nvSpPr>
-          <p:cNvPr id="5" name="Marcador de Posição do Número do Diapositivo 4">
-            <a:extLst>
-              <a:ext uri="{FF2B5EF4-FFF2-40B4-BE49-F238E27FC236}">
-                <a16:creationId xmlns:a16="http://schemas.microsoft.com/office/drawing/2014/main" id="{1825CB70-104A-729E-4D6D-928CAB0CEA5B}"/>
-              </a:ext>
-            </a:extLst>
-          </p:cNvPr>
-          <p:cNvSpPr>
-            <a:spLocks noGrp="1"/>
-          </p:cNvSpPr>
-          <p:nvPr>
-            <p:ph type="sldNum" sz="quarter" idx="12"/>
-          </p:nvPr>
-        </p:nvSpPr>
-        <p:spPr>
-          <a:xfrm>
-            <a:off x="8801100" y="6356350"/>
-            <a:ext cx="2743200" cy="365125"/>
-          </a:xfrm>
-        </p:spPr>
-        <p:txBody>
-          <a:bodyPr>
-            <a:normAutofit/>
-          </a:bodyPr>
-          <a:lstStyle/>
-          <a:p>
-            <a:pPr>
-              <a:spcAft>
-                <a:spcPts val="600"/>
-              </a:spcAft>
-            </a:pPr>
-            <a:fld id="{7CE2990B-2BD6-473B-898B-9D3C32B6543D}" type="slidenum">
-              <a:rPr lang="en-US">
-                <a:solidFill>
-                  <a:schemeClr val="tx1">
-                    <a:lumMod val="50000"/>
-                    <a:lumOff val="50000"/>
-                  </a:schemeClr>
-                </a:solidFill>
-              </a:rPr>
-              <a:pPr>
-                <a:spcAft>
-                  <a:spcPts val="600"/>
-                </a:spcAft>
-              </a:pPr>
-              <a:t>9</a:t>
-            </a:fld>
-            <a:endParaRPr lang="en-US">
-              <a:solidFill>
-                <a:schemeClr val="tx1">
-                  <a:lumMod val="50000"/>
-                  <a:lumOff val="50000"/>
-                </a:schemeClr>
-              </a:solidFill>
-            </a:endParaRPr>
-          </a:p>
-        </p:txBody>
-      </p:sp>
-      <p:graphicFrame>
-        <p:nvGraphicFramePr>
-          <p:cNvPr id="7" name="Marcador de Posição de Conteúdo 2">
-            <a:extLst>
-              <a:ext uri="{FF2B5EF4-FFF2-40B4-BE49-F238E27FC236}">
-                <a16:creationId xmlns:a16="http://schemas.microsoft.com/office/drawing/2014/main" id="{2A1CEF7E-ACC0-1F5F-F390-5F95ED7A2E0A}"/>
-              </a:ext>
-            </a:extLst>
-          </p:cNvPr>
-          <p:cNvGraphicFramePr>
-            <a:graphicFrameLocks noGrp="1"/>
-          </p:cNvGraphicFramePr>
-          <p:nvPr>
-            <p:ph idx="1"/>
-            <p:extLst>
-              <p:ext uri="{D42A27DB-BD31-4B8C-83A1-F6EECF244321}">
-                <p14:modId xmlns:p14="http://schemas.microsoft.com/office/powerpoint/2010/main" val="777714790"/>
-              </p:ext>
-            </p:extLst>
-          </p:nvPr>
-        </p:nvGraphicFramePr>
-        <p:xfrm>
-          <a:off x="5303520" y="676656"/>
-          <a:ext cx="6364224" cy="5513832"/>
-        </p:xfrm>
-        <a:graphic>
-          <a:graphicData uri="http://schemas.openxmlformats.org/drawingml/2006/diagram">
-            <dgm:relIds xmlns:dgm="http://schemas.openxmlformats.org/drawingml/2006/diagram" xmlns:r="http://schemas.openxmlformats.org/officeDocument/2006/relationships" r:dm="rId2" r:lo="rId3" r:qs="rId4" r:cs="rId5"/>
-          </a:graphicData>
-        </a:graphic>
-      </p:graphicFrame>
-    </p:spTree>
-    <p:extLst>
-      <p:ext uri="{BB962C8B-B14F-4D97-AF65-F5344CB8AC3E}">
-        <p14:creationId xmlns:p14="http://schemas.microsoft.com/office/powerpoint/2010/main" val="529962619"/>
       </p:ext>
     </p:extLst>
   </p:cSld>

</xml_diff>

<commit_message>
Revise section title and expand on RAG advantages and limitations
</commit_message>
<xml_diff>
--- a/presentation.pptx
+++ b/presentation.pptx
@@ -4757,11 +4757,27 @@
         <a:lstStyle/>
         <a:p>
           <a:r>
-            <a:rPr lang="pt-PT"/>
-            <a:t>Multimodal data (images, vídeo, sound etc...)</a:t>
+            <a:rPr lang="pt-PT" dirty="0"/>
+            <a:t>Multimodal data (</a:t>
           </a:r>
           <a:r>
-            <a:rPr lang="en-US"/>
+            <a:rPr lang="pt-PT" dirty="0" err="1"/>
+            <a:t>images</a:t>
+          </a:r>
+          <a:r>
+            <a:rPr lang="pt-PT" dirty="0"/>
+            <a:t>, vídeo, </a:t>
+          </a:r>
+          <a:r>
+            <a:rPr lang="pt-PT" dirty="0" err="1"/>
+            <a:t>sound</a:t>
+          </a:r>
+          <a:r>
+            <a:rPr lang="pt-PT" dirty="0"/>
+            <a:t> etc...)</a:t>
+          </a:r>
+          <a:r>
+            <a:rPr lang="en-US" dirty="0"/>
             <a:t> support</a:t>
           </a:r>
         </a:p>
@@ -4797,7 +4813,7 @@
         <a:lstStyle/>
         <a:p>
           <a:r>
-            <a:rPr lang="en-US"/>
+            <a:rPr lang="en-US" dirty="0"/>
             <a:t>Smaller Models with External Knowledge</a:t>
           </a:r>
         </a:p>
@@ -7054,11 +7070,27 @@
             <a:buNone/>
           </a:pPr>
           <a:r>
-            <a:rPr lang="pt-PT" sz="2100" kern="1200"/>
-            <a:t>Multimodal data (images, vídeo, sound etc...)</a:t>
+            <a:rPr lang="pt-PT" sz="2100" kern="1200" dirty="0"/>
+            <a:t>Multimodal data (</a:t>
           </a:r>
           <a:r>
-            <a:rPr lang="en-US" sz="2100" kern="1200"/>
+            <a:rPr lang="pt-PT" sz="2100" kern="1200" dirty="0" err="1"/>
+            <a:t>images</a:t>
+          </a:r>
+          <a:r>
+            <a:rPr lang="pt-PT" sz="2100" kern="1200" dirty="0"/>
+            <a:t>, vídeo, </a:t>
+          </a:r>
+          <a:r>
+            <a:rPr lang="pt-PT" sz="2100" kern="1200" dirty="0" err="1"/>
+            <a:t>sound</a:t>
+          </a:r>
+          <a:r>
+            <a:rPr lang="pt-PT" sz="2100" kern="1200" dirty="0"/>
+            <a:t> etc...)</a:t>
+          </a:r>
+          <a:r>
+            <a:rPr lang="en-US" sz="2100" kern="1200" dirty="0"/>
             <a:t> support</a:t>
           </a:r>
         </a:p>
@@ -7209,7 +7241,7 @@
             <a:buNone/>
           </a:pPr>
           <a:r>
-            <a:rPr lang="en-US" sz="2100" kern="1200"/>
+            <a:rPr lang="en-US" sz="2100" kern="1200" dirty="0"/>
             <a:t>Smaller Models with External Knowledge</a:t>
           </a:r>
         </a:p>
@@ -12722,7 +12754,7 @@
           <a:p>
             <a:fld id="{8BE58E95-EC7B-40AC-BB93-DEEA60F90372}" type="datetimeFigureOut">
               <a:rPr lang="en-US" smtClean="0"/>
-              <a:t>1/7/2025</a:t>
+              <a:t>1/8/2025</a:t>
             </a:fld>
             <a:endParaRPr lang="en-US"/>
           </a:p>
@@ -13139,7 +13171,7 @@
           <a:p>
             <a:fld id="{DB9CD3E3-4554-45C0-BDBE-EFE41514EE60}" type="datetime1">
               <a:rPr lang="pt-PT" smtClean="0"/>
-              <a:t>07/01/2025</a:t>
+              <a:t>08/01/2025</a:t>
             </a:fld>
             <a:endParaRPr lang="en-US"/>
           </a:p>
@@ -13339,7 +13371,7 @@
           <a:p>
             <a:fld id="{FC2B05B8-5F77-4821-AC28-FB433D40C7EA}" type="datetime1">
               <a:rPr lang="pt-PT" smtClean="0"/>
-              <a:t>07/01/2025</a:t>
+              <a:t>08/01/2025</a:t>
             </a:fld>
             <a:endParaRPr lang="en-US"/>
           </a:p>
@@ -13549,7 +13581,7 @@
           <a:p>
             <a:fld id="{290F7819-3EAC-483F-B2F1-E6AE3D8038B8}" type="datetime1">
               <a:rPr lang="pt-PT" smtClean="0"/>
-              <a:t>07/01/2025</a:t>
+              <a:t>08/01/2025</a:t>
             </a:fld>
             <a:endParaRPr lang="en-US"/>
           </a:p>
@@ -13749,7 +13781,7 @@
           <a:p>
             <a:fld id="{678963C3-A4A7-490D-BC7C-0C1727FA616F}" type="datetime1">
               <a:rPr lang="pt-PT" smtClean="0"/>
-              <a:t>07/01/2025</a:t>
+              <a:t>08/01/2025</a:t>
             </a:fld>
             <a:endParaRPr lang="en-US"/>
           </a:p>
@@ -14025,7 +14057,7 @@
           <a:p>
             <a:fld id="{F6568116-F47A-4DBF-B3B1-4938B9F9DAF9}" type="datetime1">
               <a:rPr lang="pt-PT" smtClean="0"/>
-              <a:t>07/01/2025</a:t>
+              <a:t>08/01/2025</a:t>
             </a:fld>
             <a:endParaRPr lang="en-US"/>
           </a:p>
@@ -14293,7 +14325,7 @@
           <a:p>
             <a:fld id="{C72430AF-CE08-4344-B806-C4819C764FEE}" type="datetime1">
               <a:rPr lang="pt-PT" smtClean="0"/>
-              <a:t>07/01/2025</a:t>
+              <a:t>08/01/2025</a:t>
             </a:fld>
             <a:endParaRPr lang="en-US"/>
           </a:p>
@@ -14708,7 +14740,7 @@
           <a:p>
             <a:fld id="{165A4BD1-92BE-408E-A68B-6FA644E1C80F}" type="datetime1">
               <a:rPr lang="pt-PT" smtClean="0"/>
-              <a:t>07/01/2025</a:t>
+              <a:t>08/01/2025</a:t>
             </a:fld>
             <a:endParaRPr lang="en-US"/>
           </a:p>
@@ -14850,7 +14882,7 @@
           <a:p>
             <a:fld id="{8323F8A4-7545-46F5-A793-1A1F73A30A67}" type="datetime1">
               <a:rPr lang="pt-PT" smtClean="0"/>
-              <a:t>07/01/2025</a:t>
+              <a:t>08/01/2025</a:t>
             </a:fld>
             <a:endParaRPr lang="en-US"/>
           </a:p>
@@ -14963,7 +14995,7 @@
           <a:p>
             <a:fld id="{CD6E6FA4-7F46-48B2-9EF1-97841FDFCDE1}" type="datetime1">
               <a:rPr lang="pt-PT" smtClean="0"/>
-              <a:t>07/01/2025</a:t>
+              <a:t>08/01/2025</a:t>
             </a:fld>
             <a:endParaRPr lang="en-US"/>
           </a:p>
@@ -15276,7 +15308,7 @@
           <a:p>
             <a:fld id="{AFB509F4-78C6-43A5-906C-E86E5CD4B474}" type="datetime1">
               <a:rPr lang="pt-PT" smtClean="0"/>
-              <a:t>07/01/2025</a:t>
+              <a:t>08/01/2025</a:t>
             </a:fld>
             <a:endParaRPr lang="en-US"/>
           </a:p>
@@ -15565,7 +15597,7 @@
           <a:p>
             <a:fld id="{17D103B2-7B84-4B05-A5EF-B837ADA66F3D}" type="datetime1">
               <a:rPr lang="pt-PT" smtClean="0"/>
-              <a:t>07/01/2025</a:t>
+              <a:t>08/01/2025</a:t>
             </a:fld>
             <a:endParaRPr lang="en-US"/>
           </a:p>
@@ -15808,7 +15840,7 @@
           <a:p>
             <a:fld id="{B038CF50-A468-4267-BAC2-474E7695B37E}" type="datetime1">
               <a:rPr lang="pt-PT" smtClean="0"/>
-              <a:t>07/01/2025</a:t>
+              <a:t>08/01/2025</a:t>
             </a:fld>
             <a:endParaRPr lang="en-US"/>
           </a:p>
@@ -16894,7 +16926,7 @@
                   <a:spcPts val="600"/>
                 </a:spcAft>
               </a:pPr>
-              <a:t>07/01/2025</a:t>
+              <a:t>08/01/2025</a:t>
             </a:fld>
             <a:endParaRPr lang="en-US">
               <a:solidFill>
@@ -17543,7 +17575,7 @@
                   <a:spcPts val="600"/>
                 </a:spcAft>
               </a:pPr>
-              <a:t>07/01/2025</a:t>
+              <a:t>08/01/2025</a:t>
             </a:fld>
             <a:endParaRPr lang="en-US">
               <a:solidFill>
@@ -18230,7 +18262,7 @@
                   <a:spcPts val="600"/>
                 </a:spcAft>
               </a:pPr>
-              <a:t>07/01/2025</a:t>
+              <a:t>08/01/2025</a:t>
             </a:fld>
             <a:endParaRPr lang="en-US">
               <a:solidFill>
@@ -18964,7 +18996,7 @@
                   <a:spcPts val="600"/>
                 </a:spcAft>
               </a:pPr>
-              <a:t>07/01/2025</a:t>
+              <a:t>08/01/2025</a:t>
             </a:fld>
             <a:endParaRPr lang="en-US">
               <a:solidFill>
@@ -19496,7 +19528,7 @@
                 </a:spcAft>
                 <a:defRPr/>
               </a:pPr>
-              <a:t>1/7/2025</a:t>
+              <a:t>1/8/2025</a:t>
             </a:fld>
             <a:endParaRPr lang="en-US">
               <a:solidFill>
@@ -20128,7 +20160,7 @@
           <a:p>
             <a:fld id="{E2EF3061-6619-4689-9D6D-9C470E2125D9}" type="datetime1">
               <a:rPr lang="pt-PT" smtClean="0"/>
-              <a:t>07/01/2025</a:t>
+              <a:t>08/01/2025</a:t>
             </a:fld>
             <a:endParaRPr lang="en-US"/>
           </a:p>
@@ -20647,7 +20679,7 @@
                   <a:spcPts val="600"/>
                 </a:spcAft>
               </a:pPr>
-              <a:t>07/01/2025</a:t>
+              <a:t>08/01/2025</a:t>
             </a:fld>
             <a:endParaRPr lang="en-US">
               <a:solidFill>
@@ -21038,7 +21070,7 @@
                   <a:spcPts val="600"/>
                 </a:spcAft>
               </a:pPr>
-              <a:t>07/01/2025</a:t>
+              <a:t>08/01/2025</a:t>
             </a:fld>
             <a:endParaRPr lang="en-US">
               <a:solidFill>
@@ -21754,7 +21786,7 @@
                   </a:schemeClr>
                 </a:solidFill>
               </a:rPr>
-              <a:t>07/01/2025</a:t>
+              <a:t>08/01/2025</a:t>
             </a:fld>
             <a:endParaRPr lang="en-US">
               <a:solidFill>
@@ -22326,7 +22358,7 @@
                   <a:spcPts val="600"/>
                 </a:spcAft>
               </a:pPr>
-              <a:t>07/01/2025</a:t>
+              <a:t>08/01/2025</a:t>
             </a:fld>
             <a:endParaRPr lang="en-US">
               <a:solidFill>
@@ -22866,7 +22898,7 @@
                   <a:spcPts val="600"/>
                 </a:spcAft>
               </a:pPr>
-              <a:t>07/01/2025</a:t>
+              <a:t>08/01/2025</a:t>
             </a:fld>
             <a:endParaRPr lang="en-US">
               <a:solidFill>
@@ -23528,7 +23560,7 @@
                   <a:spcPts val="600"/>
                 </a:spcAft>
               </a:pPr>
-              <a:t>07/01/2025</a:t>
+              <a:t>08/01/2025</a:t>
             </a:fld>
             <a:endParaRPr lang="en-US"/>
           </a:p>
@@ -24035,7 +24067,7 @@
                   <a:spcPts val="600"/>
                 </a:spcAft>
               </a:pPr>
-              <a:t>07/01/2025</a:t>
+              <a:t>08/01/2025</a:t>
             </a:fld>
             <a:endParaRPr lang="en-US">
               <a:solidFill>

</xml_diff>

<commit_message>
Update documentation for clarity and consistency
</commit_message>
<xml_diff>
--- a/presentation.pptx
+++ b/presentation.pptx
@@ -13169,7 +13169,7 @@
           <a:bodyPr/>
           <a:lstStyle/>
           <a:p>
-            <a:fld id="{DB9CD3E3-4554-45C0-BDBE-EFE41514EE60}" type="datetime1">
+            <a:fld id="{8342A9F5-E849-4A0F-84E9-39C29446E4AA}" type="datetime1">
               <a:rPr lang="pt-PT" smtClean="0"/>
               <a:t>08/01/2025</a:t>
             </a:fld>
@@ -13369,7 +13369,7 @@
           <a:bodyPr/>
           <a:lstStyle/>
           <a:p>
-            <a:fld id="{FC2B05B8-5F77-4821-AC28-FB433D40C7EA}" type="datetime1">
+            <a:fld id="{F5D45788-878D-42DD-9A54-64DFE68A8B56}" type="datetime1">
               <a:rPr lang="pt-PT" smtClean="0"/>
               <a:t>08/01/2025</a:t>
             </a:fld>
@@ -13579,7 +13579,7 @@
           <a:bodyPr/>
           <a:lstStyle/>
           <a:p>
-            <a:fld id="{290F7819-3EAC-483F-B2F1-E6AE3D8038B8}" type="datetime1">
+            <a:fld id="{557CAAB1-0B7A-4E59-BEDD-E066F2203CC6}" type="datetime1">
               <a:rPr lang="pt-PT" smtClean="0"/>
               <a:t>08/01/2025</a:t>
             </a:fld>
@@ -13779,7 +13779,7 @@
           <a:bodyPr/>
           <a:lstStyle/>
           <a:p>
-            <a:fld id="{678963C3-A4A7-490D-BC7C-0C1727FA616F}" type="datetime1">
+            <a:fld id="{D8A4F385-5E72-45CE-8898-EDC3F77D1CA3}" type="datetime1">
               <a:rPr lang="pt-PT" smtClean="0"/>
               <a:t>08/01/2025</a:t>
             </a:fld>
@@ -14055,7 +14055,7 @@
           <a:bodyPr/>
           <a:lstStyle/>
           <a:p>
-            <a:fld id="{F6568116-F47A-4DBF-B3B1-4938B9F9DAF9}" type="datetime1">
+            <a:fld id="{1BAA28C9-904B-4BCB-8E11-A273AECB043E}" type="datetime1">
               <a:rPr lang="pt-PT" smtClean="0"/>
               <a:t>08/01/2025</a:t>
             </a:fld>
@@ -14323,7 +14323,7 @@
           <a:bodyPr/>
           <a:lstStyle/>
           <a:p>
-            <a:fld id="{C72430AF-CE08-4344-B806-C4819C764FEE}" type="datetime1">
+            <a:fld id="{081CB69B-3E7A-4AEA-8596-D06B620324E5}" type="datetime1">
               <a:rPr lang="pt-PT" smtClean="0"/>
               <a:t>08/01/2025</a:t>
             </a:fld>
@@ -14738,7 +14738,7 @@
           <a:bodyPr/>
           <a:lstStyle/>
           <a:p>
-            <a:fld id="{165A4BD1-92BE-408E-A68B-6FA644E1C80F}" type="datetime1">
+            <a:fld id="{E1517128-2CD7-4827-8423-2CADF9AE4F77}" type="datetime1">
               <a:rPr lang="pt-PT" smtClean="0"/>
               <a:t>08/01/2025</a:t>
             </a:fld>
@@ -14880,7 +14880,7 @@
           <a:bodyPr/>
           <a:lstStyle/>
           <a:p>
-            <a:fld id="{8323F8A4-7545-46F5-A793-1A1F73A30A67}" type="datetime1">
+            <a:fld id="{D34B5740-FCE6-435D-88DC-1FB5D1F5E536}" type="datetime1">
               <a:rPr lang="pt-PT" smtClean="0"/>
               <a:t>08/01/2025</a:t>
             </a:fld>
@@ -14993,7 +14993,7 @@
           <a:bodyPr/>
           <a:lstStyle/>
           <a:p>
-            <a:fld id="{CD6E6FA4-7F46-48B2-9EF1-97841FDFCDE1}" type="datetime1">
+            <a:fld id="{AAD73CBB-5F84-473B-8ADD-4E0E61791E79}" type="datetime1">
               <a:rPr lang="pt-PT" smtClean="0"/>
               <a:t>08/01/2025</a:t>
             </a:fld>
@@ -15306,7 +15306,7 @@
           <a:bodyPr/>
           <a:lstStyle/>
           <a:p>
-            <a:fld id="{AFB509F4-78C6-43A5-906C-E86E5CD4B474}" type="datetime1">
+            <a:fld id="{53C33B7B-13D5-4B0F-9460-C11B925A1D84}" type="datetime1">
               <a:rPr lang="pt-PT" smtClean="0"/>
               <a:t>08/01/2025</a:t>
             </a:fld>
@@ -15595,7 +15595,7 @@
           <a:bodyPr/>
           <a:lstStyle/>
           <a:p>
-            <a:fld id="{17D103B2-7B84-4B05-A5EF-B837ADA66F3D}" type="datetime1">
+            <a:fld id="{9557CA7A-F17A-4D00-95B1-0A4FAEC7D868}" type="datetime1">
               <a:rPr lang="pt-PT" smtClean="0"/>
               <a:t>08/01/2025</a:t>
             </a:fld>
@@ -15838,7 +15838,7 @@
             </a:lvl1pPr>
           </a:lstStyle>
           <a:p>
-            <a:fld id="{B038CF50-A468-4267-BAC2-474E7695B37E}" type="datetime1">
+            <a:fld id="{DCD6F53B-BCF5-4641-A127-9D95C93ED3CB}" type="datetime1">
               <a:rPr lang="pt-PT" smtClean="0"/>
               <a:t>08/01/2025</a:t>
             </a:fld>
@@ -16912,8 +16912,8 @@
                 <a:spcPts val="600"/>
               </a:spcAft>
             </a:pPr>
-            <a:fld id="{BB983069-905E-4D8C-B61B-93F75F3AFB5C}" type="datetime1">
-              <a:rPr lang="pt-PT">
+            <a:fld id="{E86B67D2-F707-4D73-8529-3BC59CA3C08C}" type="datetime1">
+              <a:rPr lang="pt-PT" smtClean="0">
                 <a:solidFill>
                   <a:schemeClr val="tx1">
                     <a:lumMod val="50000"/>
@@ -16921,11 +16921,6 @@
                   </a:schemeClr>
                 </a:solidFill>
               </a:rPr>
-              <a:pPr>
-                <a:spcAft>
-                  <a:spcPts val="600"/>
-                </a:spcAft>
-              </a:pPr>
               <a:t>08/01/2025</a:t>
             </a:fld>
             <a:endParaRPr lang="en-US">
@@ -17561,8 +17556,8 @@
                 <a:spcPts val="600"/>
               </a:spcAft>
             </a:pPr>
-            <a:fld id="{678963C3-A4A7-490D-BC7C-0C1727FA616F}" type="datetime1">
-              <a:rPr lang="pt-PT">
+            <a:fld id="{DE244A2E-C944-4005-89B0-D9167515FE23}" type="datetime1">
+              <a:rPr lang="pt-PT" smtClean="0">
                 <a:solidFill>
                   <a:schemeClr val="tx1">
                     <a:lumMod val="50000"/>
@@ -17570,11 +17565,6 @@
                   </a:schemeClr>
                 </a:solidFill>
               </a:rPr>
-              <a:pPr>
-                <a:spcAft>
-                  <a:spcPts val="600"/>
-                </a:spcAft>
-              </a:pPr>
               <a:t>08/01/2025</a:t>
             </a:fld>
             <a:endParaRPr lang="en-US">
@@ -18248,8 +18238,8 @@
                 <a:spcPts val="600"/>
               </a:spcAft>
             </a:pPr>
-            <a:fld id="{678963C3-A4A7-490D-BC7C-0C1727FA616F}" type="datetime1">
-              <a:rPr lang="pt-PT">
+            <a:fld id="{EDD355BD-08AF-4DAB-B862-FE18B10955A8}" type="datetime1">
+              <a:rPr lang="pt-PT" smtClean="0">
                 <a:solidFill>
                   <a:schemeClr val="tx1">
                     <a:lumMod val="50000"/>
@@ -18257,11 +18247,6 @@
                   </a:schemeClr>
                 </a:solidFill>
               </a:rPr>
-              <a:pPr>
-                <a:spcAft>
-                  <a:spcPts val="600"/>
-                </a:spcAft>
-              </a:pPr>
               <a:t>08/01/2025</a:t>
             </a:fld>
             <a:endParaRPr lang="en-US">
@@ -18982,8 +18967,8 @@
                 <a:spcPts val="600"/>
               </a:spcAft>
             </a:pPr>
-            <a:fld id="{678963C3-A4A7-490D-BC7C-0C1727FA616F}" type="datetime1">
-              <a:rPr lang="pt-PT">
+            <a:fld id="{EDACB94E-288A-4997-B3D1-29C97E6F33E8}" type="datetime1">
+              <a:rPr lang="pt-PT" smtClean="0">
                 <a:solidFill>
                   <a:schemeClr val="tx1">
                     <a:lumMod val="50000"/>
@@ -18991,11 +18976,6 @@
                   </a:schemeClr>
                 </a:solidFill>
               </a:rPr>
-              <a:pPr>
-                <a:spcAft>
-                  <a:spcPts val="600"/>
-                </a:spcAft>
-              </a:pPr>
               <a:t>08/01/2025</a:t>
             </a:fld>
             <a:endParaRPr lang="en-US">
@@ -19512,8 +19492,8 @@
               </a:spcAft>
               <a:defRPr/>
             </a:pPr>
-            <a:fld id="{678963C3-A4A7-490D-BC7C-0C1727FA616F}" type="datetime1">
-              <a:rPr lang="en-US">
+            <a:fld id="{682C23D4-01D3-46E2-B145-8CABB514B237}" type="datetime1">
+              <a:rPr lang="pt-PT" smtClean="0">
                 <a:solidFill>
                   <a:schemeClr val="tx1">
                     <a:lumMod val="50000"/>
@@ -19522,13 +19502,7 @@
                 </a:solidFill>
                 <a:latin typeface="Calibri" panose="020F0502020204030204"/>
               </a:rPr>
-              <a:pPr>
-                <a:spcAft>
-                  <a:spcPts val="600"/>
-                </a:spcAft>
-                <a:defRPr/>
-              </a:pPr>
-              <a:t>1/8/2025</a:t>
+              <a:t>08/01/2025</a:t>
             </a:fld>
             <a:endParaRPr lang="en-US">
               <a:solidFill>
@@ -20158,7 +20132,7 @@
           <a:bodyPr/>
           <a:lstStyle/>
           <a:p>
-            <a:fld id="{E2EF3061-6619-4689-9D6D-9C470E2125D9}" type="datetime1">
+            <a:fld id="{17E35D00-57DD-4772-8DF7-2D7636140BEE}" type="datetime1">
               <a:rPr lang="pt-PT" smtClean="0"/>
               <a:t>08/01/2025</a:t>
             </a:fld>
@@ -20665,8 +20639,8 @@
                 <a:spcPts val="600"/>
               </a:spcAft>
             </a:pPr>
-            <a:fld id="{C879DFD8-E7E8-4D44-9BAF-6CD148787C97}" type="datetime1">
-              <a:rPr lang="pt-PT">
+            <a:fld id="{640F21A1-6483-4FAD-AC0D-4EE7967DBE90}" type="datetime1">
+              <a:rPr lang="pt-PT" smtClean="0">
                 <a:solidFill>
                   <a:schemeClr val="tx1">
                     <a:lumMod val="50000"/>
@@ -20674,11 +20648,6 @@
                   </a:schemeClr>
                 </a:solidFill>
               </a:rPr>
-              <a:pPr>
-                <a:spcAft>
-                  <a:spcPts val="600"/>
-                </a:spcAft>
-              </a:pPr>
               <a:t>08/01/2025</a:t>
             </a:fld>
             <a:endParaRPr lang="en-US">
@@ -21056,8 +21025,8 @@
                 <a:spcPts val="600"/>
               </a:spcAft>
             </a:pPr>
-            <a:fld id="{678963C3-A4A7-490D-BC7C-0C1727FA616F}" type="datetime1">
-              <a:rPr lang="pt-PT">
+            <a:fld id="{031E9378-2339-44AC-8337-2B86F423CE60}" type="datetime1">
+              <a:rPr lang="pt-PT" smtClean="0">
                 <a:solidFill>
                   <a:schemeClr val="tx1">
                     <a:lumMod val="50000"/>
@@ -21065,11 +21034,6 @@
                   </a:schemeClr>
                 </a:solidFill>
               </a:rPr>
-              <a:pPr>
-                <a:spcAft>
-                  <a:spcPts val="600"/>
-                </a:spcAft>
-              </a:pPr>
               <a:t>08/01/2025</a:t>
             </a:fld>
             <a:endParaRPr lang="en-US">
@@ -21778,7 +21742,7 @@
                 <a:spcPts val="600"/>
               </a:spcAft>
             </a:pPr>
-            <a:fld id="{DDCD1157-AAB6-430D-8E4D-6CB9154A1A2B}" type="datetime1">
+            <a:fld id="{BFB70002-5A81-44BC-B3A1-FF12392A3FC4}" type="datetime1">
               <a:rPr lang="pt-PT" smtClean="0">
                 <a:solidFill>
                   <a:schemeClr val="tx1">
@@ -22344,8 +22308,8 @@
                 <a:spcPts val="600"/>
               </a:spcAft>
             </a:pPr>
-            <a:fld id="{678963C3-A4A7-490D-BC7C-0C1727FA616F}" type="datetime1">
-              <a:rPr lang="pt-PT">
+            <a:fld id="{C2D92316-2DA7-43E7-83D8-C7D651281E85}" type="datetime1">
+              <a:rPr lang="pt-PT" smtClean="0">
                 <a:solidFill>
                   <a:schemeClr val="tx1">
                     <a:lumMod val="50000"/>
@@ -22353,11 +22317,6 @@
                   </a:schemeClr>
                 </a:solidFill>
               </a:rPr>
-              <a:pPr>
-                <a:spcAft>
-                  <a:spcPts val="600"/>
-                </a:spcAft>
-              </a:pPr>
               <a:t>08/01/2025</a:t>
             </a:fld>
             <a:endParaRPr lang="en-US">
@@ -22884,8 +22843,8 @@
                 <a:spcPts val="600"/>
               </a:spcAft>
             </a:pPr>
-            <a:fld id="{678963C3-A4A7-490D-BC7C-0C1727FA616F}" type="datetime1">
-              <a:rPr lang="pt-PT">
+            <a:fld id="{90A517A0-57B6-41DD-A6D5-89C2D0923175}" type="datetime1">
+              <a:rPr lang="pt-PT" smtClean="0">
                 <a:solidFill>
                   <a:schemeClr val="tx1">
                     <a:lumMod val="50000"/>
@@ -22893,11 +22852,6 @@
                   </a:schemeClr>
                 </a:solidFill>
               </a:rPr>
-              <a:pPr>
-                <a:spcAft>
-                  <a:spcPts val="600"/>
-                </a:spcAft>
-              </a:pPr>
               <a:t>08/01/2025</a:t>
             </a:fld>
             <a:endParaRPr lang="en-US">
@@ -23553,13 +23507,8 @@
                 <a:spcPts val="600"/>
               </a:spcAft>
             </a:pPr>
-            <a:fld id="{678963C3-A4A7-490D-BC7C-0C1727FA616F}" type="datetime1">
+            <a:fld id="{5F1EAC1C-9900-4F4F-BF1B-D818373997F5}" type="datetime1">
               <a:rPr lang="pt-PT" smtClean="0"/>
-              <a:pPr>
-                <a:spcAft>
-                  <a:spcPts val="600"/>
-                </a:spcAft>
-              </a:pPr>
               <a:t>08/01/2025</a:t>
             </a:fld>
             <a:endParaRPr lang="en-US"/>
@@ -23725,7 +23674,7 @@
       </p:grpSpPr>
       <p:sp>
         <p:nvSpPr>
-          <p:cNvPr id="11" name="Rectangle 10">
+          <p:cNvPr id="27" name="Rectangle 26">
             <a:extLst>
               <a:ext uri="{FF2B5EF4-FFF2-40B4-BE49-F238E27FC236}">
                 <a16:creationId xmlns:a16="http://schemas.microsoft.com/office/drawing/2014/main" id="{4C608BEB-860E-4094-8511-78603564A75E}"/>
@@ -23844,7 +23793,7 @@
           <a:lstStyle/>
           <a:p>
             <a:r>
-              <a:rPr lang="en-US" sz="4000" dirty="0">
+              <a:rPr lang="en-US" sz="4000">
                 <a:solidFill>
                   <a:srgbClr val="FFFFFF"/>
                 </a:solidFill>
@@ -23873,7 +23822,7 @@
         <p:spPr>
           <a:xfrm>
             <a:off x="4380855" y="1412489"/>
-            <a:ext cx="3427283" cy="4363844"/>
+            <a:ext cx="3749015" cy="4363844"/>
           </a:xfrm>
         </p:spPr>
         <p:txBody>
@@ -23915,7 +23864,7 @@
       </p:sp>
       <p:cxnSp>
         <p:nvCxnSpPr>
-          <p:cNvPr id="13" name="Straight Connector 12">
+          <p:cNvPr id="29" name="Straight Connector 28">
             <a:extLst>
               <a:ext uri="{FF2B5EF4-FFF2-40B4-BE49-F238E27FC236}">
                 <a16:creationId xmlns:a16="http://schemas.microsoft.com/office/drawing/2014/main" id="{1F16A8D4-FE87-4604-88B2-394B5D1EB437}"/>
@@ -23986,8 +23935,8 @@
         </p:nvSpPr>
         <p:spPr>
           <a:xfrm>
-            <a:off x="8399420" y="1412489"/>
-            <a:ext cx="3427282" cy="4363844"/>
+            <a:off x="8451604" y="1412489"/>
+            <a:ext cx="3197701" cy="4363844"/>
           </a:xfrm>
         </p:spPr>
         <p:txBody>
@@ -24054,7 +24003,7 @@
                 <a:spcPts val="600"/>
               </a:spcAft>
             </a:pPr>
-            <a:fld id="{C72430AF-CE08-4344-B806-C4819C764FEE}" type="datetime1">
+            <a:fld id="{C168603D-9B22-4A91-8C43-FF9C83CDD813}" type="datetime1">
               <a:rPr lang="pt-PT">
                 <a:solidFill>
                   <a:srgbClr val="FFFFFF">
@@ -24113,7 +24062,7 @@
               </a:spcAft>
             </a:pPr>
             <a:fld id="{7CE2990B-2BD6-473B-898B-9D3C32B6543D}" type="slidenum">
-              <a:rPr lang="en-US" smtClean="0"/>
+              <a:rPr lang="en-US"/>
               <a:pPr>
                 <a:spcAft>
                   <a:spcPts val="600"/>

</xml_diff>